<commit_message>
Added dwh and mobile app work
</commit_message>
<xml_diff>
--- a/data-warehouse-and-mining/wk6/Presentation6.pptx
+++ b/data-warehouse-and-mining/wk6/Presentation6.pptx
@@ -144,7 +144,18 @@
   </p:defaultTextStyle>
   <p:extLst>
     <p:ext uri="{EFAFB233-063F-42B5-8137-9DF3F51BA10A}">
-      <p15:sldGuideLst xmlns:p15="http://schemas.microsoft.com/office/powerpoint/2012/main" xmlns=""/>
+      <p15:sldGuideLst xmlns:p15="http://schemas.microsoft.com/office/powerpoint/2012/main">
+        <p15:guide id="1" orient="horz" pos="2160">
+          <p15:clr>
+            <a:srgbClr val="A4A3A4"/>
+          </p15:clr>
+        </p15:guide>
+        <p15:guide id="2" pos="3840">
+          <p15:clr>
+            <a:srgbClr val="A4A3A4"/>
+          </p15:clr>
+        </p15:guide>
+      </p15:sldGuideLst>
     </p:ext>
   </p:extLst>
 </p:presentation>
@@ -232,7 +243,7 @@
           <a:p>
             <a:fld id="{363E8B3B-6DCD-4CAA-AE63-6E3E0782F1C9}" type="datetimeFigureOut">
               <a:rPr lang="en-US" smtClean="0"/>
-              <a:t>10/9/2018</a:t>
+              <a:t>10/17/2018</a:t>
             </a:fld>
             <a:endParaRPr lang="en-US"/>
           </a:p>
@@ -544,56 +555,56 @@
           <a:lstStyle/>
           <a:p>
             <a:r>
-              <a:rPr lang="en-CA" dirty="0" smtClean="0"/>
+              <a:rPr lang="en-CA" dirty="0"/>
               <a:t>Review from last class (important concepts from ETL):</a:t>
             </a:r>
           </a:p>
           <a:p>
             <a:r>
-              <a:rPr lang="en-CA" dirty="0" smtClean="0"/>
+              <a:rPr lang="en-CA" dirty="0"/>
               <a:t>-most complex part of </a:t>
             </a:r>
             <a:r>
-              <a:rPr lang="en-CA" dirty="0" err="1" smtClean="0"/>
+              <a:rPr lang="en-CA" dirty="0" err="1"/>
               <a:t>dwh</a:t>
             </a:r>
-            <a:endParaRPr lang="en-CA" dirty="0" smtClean="0"/>
-          </a:p>
-          <a:p>
-            <a:endParaRPr lang="en-CA" dirty="0" smtClean="0"/>
-          </a:p>
-          <a:p>
-            <a:r>
-              <a:rPr lang="en-CA" dirty="0" smtClean="0"/>
+            <a:endParaRPr lang="en-CA" dirty="0"/>
+          </a:p>
+          <a:p>
+            <a:endParaRPr lang="en-CA" dirty="0"/>
+          </a:p>
+          <a:p>
+            <a:r>
+              <a:rPr lang="en-CA" dirty="0"/>
               <a:t>Cleansing “fuzzy” joins – where u</a:t>
             </a:r>
             <a:r>
-              <a:rPr lang="en-CA" baseline="0" dirty="0" smtClean="0"/>
+              <a:rPr lang="en-CA" baseline="0" dirty="0"/>
               <a:t> kind of know the stuff around the data but it is not exact, e.g. </a:t>
             </a:r>
             <a:r>
-              <a:rPr lang="en-CA" baseline="0" dirty="0" err="1" smtClean="0"/>
+              <a:rPr lang="en-CA" baseline="0" dirty="0" err="1"/>
               <a:t>joh</a:t>
             </a:r>
             <a:r>
-              <a:rPr lang="en-CA" baseline="0" dirty="0" smtClean="0"/>
+              <a:rPr lang="en-CA" baseline="0" dirty="0"/>
               <a:t> or </a:t>
             </a:r>
             <a:r>
-              <a:rPr lang="en-CA" baseline="0" dirty="0" err="1" smtClean="0"/>
+              <a:rPr lang="en-CA" baseline="0" dirty="0" err="1"/>
               <a:t>jon</a:t>
             </a:r>
             <a:r>
-              <a:rPr lang="en-CA" baseline="0" dirty="0" smtClean="0"/>
+              <a:rPr lang="en-CA" baseline="0" dirty="0"/>
               <a:t> instead of john</a:t>
             </a:r>
           </a:p>
           <a:p>
-            <a:endParaRPr lang="en-CA" baseline="0" dirty="0" smtClean="0"/>
-          </a:p>
-          <a:p>
-            <a:r>
-              <a:rPr lang="en-CA" baseline="0" dirty="0" smtClean="0"/>
+            <a:endParaRPr lang="en-CA" baseline="0" dirty="0"/>
+          </a:p>
+          <a:p>
+            <a:r>
+              <a:rPr lang="en-CA" baseline="0" dirty="0"/>
               <a:t>Types of data sources e.g. cooperative vs non cooperative</a:t>
             </a:r>
             <a:endParaRPr lang="en-CA" dirty="0"/>
@@ -960,47 +971,47 @@
           <a:lstStyle/>
           <a:p>
             <a:r>
-              <a:rPr lang="en-CA" dirty="0" smtClean="0"/>
+              <a:rPr lang="en-CA" dirty="0"/>
               <a:t>e.g. of a security role provided</a:t>
             </a:r>
             <a:r>
-              <a:rPr lang="en-CA" baseline="0" dirty="0" smtClean="0"/>
+              <a:rPr lang="en-CA" baseline="0" dirty="0"/>
               <a:t> by peter since he worked on this before</a:t>
             </a:r>
           </a:p>
           <a:p>
             <a:r>
-              <a:rPr lang="en-CA" baseline="0" dirty="0" smtClean="0"/>
+              <a:rPr lang="en-CA" baseline="0" dirty="0"/>
               <a:t>Sys administrator</a:t>
             </a:r>
           </a:p>
           <a:p>
             <a:r>
-              <a:rPr lang="en-CA" baseline="0" dirty="0" smtClean="0"/>
+              <a:rPr lang="en-CA" baseline="0" dirty="0"/>
               <a:t>Network</a:t>
             </a:r>
           </a:p>
           <a:p>
             <a:r>
-              <a:rPr lang="en-CA" baseline="0" dirty="0" smtClean="0"/>
+              <a:rPr lang="en-CA" baseline="0" dirty="0"/>
               <a:t>Services</a:t>
             </a:r>
           </a:p>
           <a:p>
-            <a:endParaRPr lang="en-CA" baseline="0" dirty="0" smtClean="0"/>
-          </a:p>
-          <a:p>
-            <a:r>
-              <a:rPr lang="en-CA" baseline="0" dirty="0" smtClean="0"/>
+            <a:endParaRPr lang="en-CA" baseline="0" dirty="0"/>
+          </a:p>
+          <a:p>
+            <a:r>
+              <a:rPr lang="en-CA" baseline="0" dirty="0"/>
               <a:t>Create users under each of these roles to grant them permissions to the reports</a:t>
             </a:r>
           </a:p>
           <a:p>
-            <a:endParaRPr lang="en-CA" baseline="0" dirty="0" smtClean="0"/>
-          </a:p>
-          <a:p>
-            <a:r>
-              <a:rPr lang="en-CA" baseline="0" dirty="0" smtClean="0"/>
+            <a:endParaRPr lang="en-CA" baseline="0" dirty="0"/>
+          </a:p>
+          <a:p>
+            <a:r>
+              <a:rPr lang="en-CA" baseline="0" dirty="0"/>
               <a:t>Security is a big problem as data is sensitive </a:t>
             </a:r>
           </a:p>
@@ -1104,7 +1115,7 @@
           <a:p>
             <a:pPr marL="228600" indent="-228600" defTabSz="914400" eaLnBrk="1" hangingPunct="1"/>
             <a:r>
-              <a:rPr lang="en-CA" sz="1200" b="1" i="0" kern="1200" dirty="0" smtClean="0">
+              <a:rPr lang="en-CA" sz="1200" b="1" i="0" kern="1200" dirty="0">
                 <a:solidFill>
                   <a:schemeClr val="tx1"/>
                 </a:solidFill>
@@ -1116,7 +1127,7 @@
               <a:t>OLE DB</a:t>
             </a:r>
             <a:r>
-              <a:rPr lang="en-CA" sz="1200" b="0" i="0" kern="1200" dirty="0" smtClean="0">
+              <a:rPr lang="en-CA" sz="1200" b="0" i="0" kern="1200" dirty="0">
                 <a:solidFill>
                   <a:schemeClr val="tx1"/>
                 </a:solidFill>
@@ -1128,7 +1139,7 @@
               <a:t> (Object Linking and Embedding, </a:t>
             </a:r>
             <a:r>
-              <a:rPr lang="en-CA" sz="1200" b="1" i="0" kern="1200" dirty="0" smtClean="0">
+              <a:rPr lang="en-CA" sz="1200" b="1" i="0" kern="1200" dirty="0">
                 <a:solidFill>
                   <a:schemeClr val="tx1"/>
                 </a:solidFill>
@@ -1140,7 +1151,7 @@
               <a:t>Database</a:t>
             </a:r>
             <a:r>
-              <a:rPr lang="en-CA" sz="1200" b="0" i="0" kern="1200" dirty="0" smtClean="0">
+              <a:rPr lang="en-CA" sz="1200" b="0" i="0" kern="1200" dirty="0">
                 <a:solidFill>
                   <a:schemeClr val="tx1"/>
                 </a:solidFill>
@@ -1152,7 +1163,7 @@
               <a:t>, sometimes written as </a:t>
             </a:r>
             <a:r>
-              <a:rPr lang="en-CA" sz="1200" b="1" i="0" kern="1200" dirty="0" smtClean="0">
+              <a:rPr lang="en-CA" sz="1200" b="1" i="0" kern="1200" dirty="0">
                 <a:solidFill>
                   <a:schemeClr val="tx1"/>
                 </a:solidFill>
@@ -1164,7 +1175,7 @@
               <a:t>OLEDB</a:t>
             </a:r>
             <a:r>
-              <a:rPr lang="en-CA" sz="1200" b="0" i="0" kern="1200" dirty="0" smtClean="0">
+              <a:rPr lang="en-CA" sz="1200" b="0" i="0" kern="1200" dirty="0">
                 <a:solidFill>
                   <a:schemeClr val="tx1"/>
                 </a:solidFill>
@@ -1176,7 +1187,7 @@
               <a:t> or </a:t>
             </a:r>
             <a:r>
-              <a:rPr lang="en-CA" sz="1200" b="1" i="0" kern="1200" dirty="0" smtClean="0">
+              <a:rPr lang="en-CA" sz="1200" b="1" i="0" kern="1200" dirty="0">
                 <a:solidFill>
                   <a:schemeClr val="tx1"/>
                 </a:solidFill>
@@ -1188,7 +1199,7 @@
               <a:t>OLE</a:t>
             </a:r>
             <a:r>
-              <a:rPr lang="en-CA" sz="1200" b="0" i="0" kern="1200" dirty="0" smtClean="0">
+              <a:rPr lang="en-CA" sz="1200" b="0" i="0" kern="1200" dirty="0">
                 <a:solidFill>
                   <a:schemeClr val="tx1"/>
                 </a:solidFill>
@@ -1200,7 +1211,7 @@
               <a:t>-</a:t>
             </a:r>
             <a:r>
-              <a:rPr lang="en-CA" sz="1200" b="1" i="0" kern="1200" dirty="0" smtClean="0">
+              <a:rPr lang="en-CA" sz="1200" b="1" i="0" kern="1200" dirty="0">
                 <a:solidFill>
                   <a:schemeClr val="tx1"/>
                 </a:solidFill>
@@ -1212,7 +1223,7 @@
               <a:t>DB</a:t>
             </a:r>
             <a:r>
-              <a:rPr lang="en-CA" sz="1200" b="0" i="0" kern="1200" dirty="0" smtClean="0">
+              <a:rPr lang="en-CA" sz="1200" b="0" i="0" kern="1200" dirty="0">
                 <a:solidFill>
                   <a:schemeClr val="tx1"/>
                 </a:solidFill>
@@ -1226,7 +1237,7 @@
           </a:p>
           <a:p>
             <a:pPr marL="228600" indent="-228600" defTabSz="914400" eaLnBrk="1" hangingPunct="1"/>
-            <a:endParaRPr lang="en-CA" sz="1200" b="0" i="0" kern="1200" dirty="0" smtClean="0">
+            <a:endParaRPr lang="en-CA" sz="1200" b="0" i="0" kern="1200" dirty="0">
               <a:solidFill>
                 <a:schemeClr val="tx1"/>
               </a:solidFill>
@@ -1239,7 +1250,7 @@
           <a:p>
             <a:pPr marL="228600" indent="-228600" defTabSz="914400" eaLnBrk="1" hangingPunct="1"/>
             <a:r>
-              <a:rPr lang="en-CA" sz="1200" b="0" i="0" kern="1200" dirty="0" smtClean="0">
+              <a:rPr lang="en-CA" sz="1200" b="0" i="0" kern="1200" dirty="0">
                 <a:solidFill>
                   <a:schemeClr val="tx1"/>
                 </a:solidFill>
@@ -1253,7 +1264,7 @@
           </a:p>
           <a:p>
             <a:pPr marL="228600" indent="-228600" defTabSz="914400" eaLnBrk="1" hangingPunct="1"/>
-            <a:endParaRPr lang="en-CA" sz="1200" b="0" i="0" kern="1200" dirty="0" smtClean="0">
+            <a:endParaRPr lang="en-CA" sz="1200" b="0" i="0" kern="1200" dirty="0">
               <a:solidFill>
                 <a:schemeClr val="tx1"/>
               </a:solidFill>
@@ -1266,7 +1277,7 @@
           <a:p>
             <a:pPr marL="228600" indent="-228600" defTabSz="914400" eaLnBrk="1" hangingPunct="1"/>
             <a:r>
-              <a:rPr lang="en-CA" sz="1200" b="0" i="0" kern="1200" dirty="0" smtClean="0">
+              <a:rPr lang="en-CA" sz="1200" b="0" i="0" kern="1200" dirty="0">
                 <a:solidFill>
                   <a:schemeClr val="tx1"/>
                 </a:solidFill>
@@ -1278,7 +1289,7 @@
               <a:t>Technically speaking, </a:t>
             </a:r>
             <a:r>
-              <a:rPr lang="en-CA" sz="1200" b="1" i="0" kern="1200" dirty="0" smtClean="0">
+              <a:rPr lang="en-CA" sz="1200" b="1" i="0" kern="1200" dirty="0">
                 <a:solidFill>
                   <a:schemeClr val="tx1"/>
                 </a:solidFill>
@@ -1290,7 +1301,7 @@
               <a:t>ODBC</a:t>
             </a:r>
             <a:r>
-              <a:rPr lang="en-CA" sz="1200" b="0" i="0" kern="1200" dirty="0" smtClean="0">
+              <a:rPr lang="en-CA" sz="1200" b="0" i="0" kern="1200" dirty="0">
                 <a:solidFill>
                   <a:schemeClr val="tx1"/>
                 </a:solidFill>
@@ -1302,7 +1313,7 @@
               <a:t> (Open Database Connectivity) is designed to provide access primarily to SQL data </a:t>
             </a:r>
             <a:r>
-              <a:rPr lang="en-CA" sz="1200" b="1" i="0" kern="1200" dirty="0" smtClean="0">
+              <a:rPr lang="en-CA" sz="1200" b="1" i="0" kern="1200" dirty="0">
                 <a:solidFill>
                   <a:schemeClr val="tx1"/>
                 </a:solidFill>
@@ -1314,7 +1325,7 @@
               <a:t>in a</a:t>
             </a:r>
             <a:r>
-              <a:rPr lang="en-CA" sz="1200" b="0" i="0" kern="1200" dirty="0" smtClean="0">
+              <a:rPr lang="en-CA" sz="1200" b="0" i="0" kern="1200" dirty="0">
                 <a:solidFill>
                   <a:schemeClr val="tx1"/>
                 </a:solidFill>
@@ -1326,7 +1337,7 @@
               <a:t> multi-platform environment. </a:t>
             </a:r>
             <a:r>
-              <a:rPr lang="en-CA" sz="1200" b="1" i="0" kern="1200" dirty="0" smtClean="0">
+              <a:rPr lang="en-CA" sz="1200" b="1" i="0" kern="1200" dirty="0">
                 <a:solidFill>
                   <a:schemeClr val="tx1"/>
                 </a:solidFill>
@@ -1338,7 +1349,7 @@
               <a:t>OLE DB</a:t>
             </a:r>
             <a:r>
-              <a:rPr lang="en-CA" sz="1200" b="0" i="0" kern="1200" dirty="0" smtClean="0">
+              <a:rPr lang="en-CA" sz="1200" b="0" i="0" kern="1200" dirty="0">
                 <a:solidFill>
                   <a:schemeClr val="tx1"/>
                 </a:solidFill>
@@ -1350,7 +1361,7 @@
               <a:t> (Object Linking and Embedding Database) is designed to provide access to all types of data </a:t>
             </a:r>
             <a:r>
-              <a:rPr lang="en-CA" sz="1200" b="1" i="0" kern="1200" dirty="0" smtClean="0">
+              <a:rPr lang="en-CA" sz="1200" b="1" i="0" kern="1200" dirty="0">
                 <a:solidFill>
                   <a:schemeClr val="tx1"/>
                 </a:solidFill>
@@ -1362,7 +1373,7 @@
               <a:t>in an</a:t>
             </a:r>
             <a:r>
-              <a:rPr lang="en-CA" sz="1200" b="0" i="0" kern="1200" dirty="0" smtClean="0">
+              <a:rPr lang="en-CA" sz="1200" b="0" i="0" kern="1200" dirty="0">
                 <a:solidFill>
                   <a:schemeClr val="tx1"/>
                 </a:solidFill>
@@ -1376,7 +1387,7 @@
           </a:p>
           <a:p>
             <a:pPr marL="228600" indent="-228600" defTabSz="914400" eaLnBrk="1" hangingPunct="1"/>
-            <a:endParaRPr lang="en-CA" sz="1200" b="0" i="0" kern="1200" dirty="0" smtClean="0">
+            <a:endParaRPr lang="en-CA" sz="1200" b="0" i="0" kern="1200" dirty="0">
               <a:solidFill>
                 <a:schemeClr val="tx1"/>
               </a:solidFill>
@@ -1389,7 +1400,7 @@
           <a:p>
             <a:pPr marL="228600" indent="-228600" defTabSz="914400" eaLnBrk="1" hangingPunct="1"/>
             <a:r>
-              <a:rPr lang="en-CA" sz="1200" b="0" i="0" kern="1200" dirty="0" smtClean="0">
+              <a:rPr lang="en-CA" sz="1200" b="0" i="0" kern="1200" dirty="0">
                 <a:solidFill>
                   <a:schemeClr val="tx1"/>
                 </a:solidFill>
@@ -1401,7 +1412,7 @@
               <a:t>Maybe ~80% of data is in XML –Peter </a:t>
             </a:r>
             <a:r>
-              <a:rPr lang="en-CA" sz="1200" b="0" i="0" kern="1200" dirty="0" err="1" smtClean="0">
+              <a:rPr lang="en-CA" sz="1200" b="0" i="0" kern="1200" dirty="0" err="1">
                 <a:solidFill>
                   <a:schemeClr val="tx1"/>
                 </a:solidFill>
@@ -1412,7 +1423,7 @@
               </a:rPr>
               <a:t>bhola</a:t>
             </a:r>
-            <a:endParaRPr lang="en-CA" sz="1200" b="0" i="0" kern="1200" dirty="0" smtClean="0">
+            <a:endParaRPr lang="en-CA" sz="1200" b="0" i="0" kern="1200" dirty="0">
               <a:solidFill>
                 <a:schemeClr val="tx1"/>
               </a:solidFill>
@@ -1425,7 +1436,7 @@
           <a:p>
             <a:pPr marL="228600" indent="-228600" defTabSz="914400" eaLnBrk="1" hangingPunct="1"/>
             <a:r>
-              <a:rPr lang="en-CA" sz="1200" b="0" i="0" kern="1200" dirty="0" smtClean="0">
+              <a:rPr lang="en-CA" sz="1200" b="0" i="0" kern="1200" dirty="0">
                 <a:solidFill>
                   <a:schemeClr val="tx1"/>
                 </a:solidFill>
@@ -1437,7 +1448,7 @@
               <a:t>Need</a:t>
             </a:r>
             <a:r>
-              <a:rPr lang="en-CA" sz="1200" b="0" i="0" kern="1200" baseline="0" dirty="0" smtClean="0">
+              <a:rPr lang="en-CA" sz="1200" b="0" i="0" kern="1200" baseline="0" dirty="0">
                 <a:solidFill>
                   <a:schemeClr val="tx1"/>
                 </a:solidFill>
@@ -1510,7 +1521,7 @@
           <a:lstStyle/>
           <a:p>
             <a:r>
-              <a:rPr lang="en-CA" sz="1200" b="1" i="0" kern="1200" dirty="0" smtClean="0">
+              <a:rPr lang="en-CA" sz="1200" b="1" i="0" kern="1200" dirty="0">
                 <a:solidFill>
                   <a:schemeClr val="tx1"/>
                 </a:solidFill>
@@ -1522,7 +1533,7 @@
               <a:t>MHTML</a:t>
             </a:r>
             <a:r>
-              <a:rPr lang="en-CA" sz="1200" b="0" i="0" kern="1200" dirty="0" smtClean="0">
+              <a:rPr lang="en-CA" sz="1200" b="0" i="0" kern="1200" dirty="0">
                 <a:solidFill>
                   <a:schemeClr val="tx1"/>
                 </a:solidFill>
@@ -1534,7 +1545,7 @@
               <a:t> (short for MIME HTML) is a file extension for a Web page archive file format as saved by Internet Explorer. The archived Web page is an </a:t>
             </a:r>
             <a:r>
-              <a:rPr lang="en-CA" sz="1200" b="1" i="0" kern="1200" dirty="0" smtClean="0">
+              <a:rPr lang="en-CA" sz="1200" b="1" i="0" kern="1200" dirty="0">
                 <a:solidFill>
                   <a:schemeClr val="tx1"/>
                 </a:solidFill>
@@ -1546,7 +1557,7 @@
               <a:t>MHTML</a:t>
             </a:r>
             <a:r>
-              <a:rPr lang="en-CA" sz="1200" b="0" i="0" kern="1200" dirty="0" smtClean="0">
+              <a:rPr lang="en-CA" sz="1200" b="0" i="0" kern="1200" dirty="0">
                 <a:solidFill>
                   <a:schemeClr val="tx1"/>
                 </a:solidFill>
@@ -1558,7 +1569,7 @@
               <a:t> </a:t>
             </a:r>
             <a:r>
-              <a:rPr lang="en-CA" sz="1200" b="0" i="0" kern="1200" dirty="0" err="1" smtClean="0">
+              <a:rPr lang="en-CA" sz="1200" b="0" i="0" kern="1200" dirty="0" err="1">
                 <a:solidFill>
                   <a:schemeClr val="tx1"/>
                 </a:solidFill>
@@ -1570,7 +1581,7 @@
               <a:t>document.</a:t>
             </a:r>
             <a:r>
-              <a:rPr lang="en-CA" sz="1200" b="1" i="0" kern="1200" dirty="0" err="1" smtClean="0">
+              <a:rPr lang="en-CA" sz="1200" b="1" i="0" kern="1200" dirty="0" err="1">
                 <a:solidFill>
                   <a:schemeClr val="tx1"/>
                 </a:solidFill>
@@ -1582,7 +1593,7 @@
               <a:t>MHTML</a:t>
             </a:r>
             <a:r>
-              <a:rPr lang="en-CA" sz="1200" b="0" i="0" kern="1200" dirty="0" smtClean="0">
+              <a:rPr lang="en-CA" sz="1200" b="0" i="0" kern="1200" dirty="0">
                 <a:solidFill>
                   <a:schemeClr val="tx1"/>
                 </a:solidFill>
@@ -1595,7 +1606,7 @@
             </a:r>
           </a:p>
           <a:p>
-            <a:endParaRPr lang="en-CA" sz="1200" b="0" i="0" kern="1200" dirty="0" smtClean="0">
+            <a:endParaRPr lang="en-CA" sz="1200" b="0" i="0" kern="1200" dirty="0">
               <a:solidFill>
                 <a:schemeClr val="tx1"/>
               </a:solidFill>
@@ -1607,7 +1618,7 @@
           </a:p>
           <a:p>
             <a:r>
-              <a:rPr lang="en-CA" sz="1200" b="0" i="0" kern="1200" dirty="0" smtClean="0">
+              <a:rPr lang="en-CA" sz="1200" b="0" i="0" kern="1200" dirty="0">
                 <a:solidFill>
                   <a:schemeClr val="tx1"/>
                 </a:solidFill>
@@ -1619,7 +1630,7 @@
               <a:t>Custom made format may be something like</a:t>
             </a:r>
             <a:r>
-              <a:rPr lang="en-CA" sz="1200" b="0" i="0" kern="1200" baseline="0" dirty="0" smtClean="0">
+              <a:rPr lang="en-CA" sz="1200" b="0" i="0" kern="1200" baseline="0" dirty="0">
                 <a:solidFill>
                   <a:schemeClr val="tx1"/>
                 </a:solidFill>
@@ -1631,7 +1642,7 @@
               <a:t> the format used by </a:t>
             </a:r>
             <a:r>
-              <a:rPr lang="en-CA" sz="1200" b="0" i="0" kern="1200" baseline="0" dirty="0" err="1" smtClean="0">
+              <a:rPr lang="en-CA" sz="1200" b="0" i="0" kern="1200" baseline="0" dirty="0" err="1">
                 <a:solidFill>
                   <a:schemeClr val="tx1"/>
                 </a:solidFill>
@@ -1643,7 +1654,7 @@
               <a:t>Quickbooks</a:t>
             </a:r>
             <a:r>
-              <a:rPr lang="en-CA" sz="1200" b="0" i="0" kern="1200" baseline="0" dirty="0" smtClean="0">
+              <a:rPr lang="en-CA" sz="1200" b="0" i="0" kern="1200" baseline="0" dirty="0">
                 <a:solidFill>
                   <a:schemeClr val="tx1"/>
                 </a:solidFill>
@@ -1654,7 +1665,7 @@
               </a:rPr>
               <a:t> (popular accounting/money management system used by banks)</a:t>
             </a:r>
-            <a:endParaRPr lang="en-CA" sz="1200" b="0" i="0" kern="1200" dirty="0" smtClean="0">
+            <a:endParaRPr lang="en-CA" sz="1200" b="0" i="0" kern="1200" dirty="0">
               <a:solidFill>
                 <a:schemeClr val="tx1"/>
               </a:solidFill>
@@ -1666,22 +1677,22 @@
           </a:p>
           <a:p>
             <a:r>
-              <a:rPr lang="en-CA" dirty="0" err="1" smtClean="0"/>
+              <a:rPr lang="en-CA" dirty="0" err="1"/>
               <a:t>Quickbooks</a:t>
             </a:r>
             <a:r>
-              <a:rPr lang="en-CA" dirty="0" smtClean="0"/>
+              <a:rPr lang="en-CA" dirty="0"/>
               <a:t> used for income</a:t>
             </a:r>
             <a:r>
-              <a:rPr lang="en-CA" baseline="0" dirty="0" smtClean="0"/>
+              <a:rPr lang="en-CA" baseline="0" dirty="0"/>
               <a:t> tax too, compatible with </a:t>
             </a:r>
             <a:r>
-              <a:rPr lang="en-CA" baseline="0" dirty="0" err="1" smtClean="0"/>
+              <a:rPr lang="en-CA" baseline="0" dirty="0" err="1"/>
               <a:t>turbotax</a:t>
             </a:r>
-            <a:endParaRPr lang="en-CA" baseline="0" dirty="0" smtClean="0"/>
+            <a:endParaRPr lang="en-CA" baseline="0" dirty="0"/>
           </a:p>
           <a:p>
             <a:endParaRPr lang="en-CA" dirty="0"/>
@@ -1777,7 +1788,7 @@
               </a:spcBef>
             </a:pPr>
             <a:r>
-              <a:rPr lang="en-US" altLang="ko-KR" sz="3200" b="1" dirty="0" smtClean="0"/>
+              <a:rPr lang="en-US" altLang="ko-KR" sz="3200" b="1" dirty="0"/>
               <a:t>Authoring</a:t>
             </a:r>
           </a:p>
@@ -1791,7 +1802,7 @@
               </a:spcBef>
             </a:pPr>
             <a:r>
-              <a:rPr lang="en-US" altLang="ko-KR" dirty="0" smtClean="0"/>
+              <a:rPr lang="en-US" altLang="ko-KR" dirty="0"/>
               <a:t>Wide range of supported data sources</a:t>
             </a:r>
           </a:p>
@@ -1805,7 +1816,7 @@
               </a:spcBef>
             </a:pPr>
             <a:r>
-              <a:rPr lang="en-US" altLang="ko-KR" dirty="0" smtClean="0"/>
+              <a:rPr lang="en-US" altLang="ko-KR" dirty="0"/>
               <a:t>Open report authoring options</a:t>
             </a:r>
           </a:p>
@@ -1819,7 +1830,7 @@
               </a:spcBef>
             </a:pPr>
             <a:r>
-              <a:rPr lang="en-US" altLang="ko-KR" dirty="0" smtClean="0"/>
+              <a:rPr lang="en-US" altLang="ko-KR" dirty="0"/>
               <a:t>Flexible report designs</a:t>
             </a:r>
           </a:p>
@@ -1833,7 +1844,7 @@
               </a:spcBef>
             </a:pPr>
             <a:r>
-              <a:rPr lang="en-US" altLang="ko-KR" sz="3200" b="1" dirty="0" smtClean="0"/>
+              <a:rPr lang="en-US" altLang="ko-KR" sz="3200" b="1" dirty="0"/>
               <a:t>Management</a:t>
             </a:r>
           </a:p>
@@ -1847,7 +1858,7 @@
               </a:spcBef>
             </a:pPr>
             <a:r>
-              <a:rPr lang="en-US" altLang="ko-KR" dirty="0" smtClean="0"/>
+              <a:rPr lang="en-US" altLang="ko-KR" dirty="0"/>
               <a:t>Parameterized reports</a:t>
             </a:r>
           </a:p>
@@ -1861,7 +1872,7 @@
               </a:spcBef>
             </a:pPr>
             <a:r>
-              <a:rPr lang="en-US" altLang="ko-KR" dirty="0" smtClean="0"/>
+              <a:rPr lang="en-US" altLang="ko-KR" dirty="0"/>
               <a:t>Execution properties</a:t>
             </a:r>
           </a:p>
@@ -1875,7 +1886,7 @@
               </a:spcBef>
             </a:pPr>
             <a:r>
-              <a:rPr lang="en-US" altLang="ko-KR" dirty="0" smtClean="0"/>
+              <a:rPr lang="en-US" altLang="ko-KR" dirty="0"/>
               <a:t>Report scheduling and history</a:t>
             </a:r>
           </a:p>
@@ -1889,7 +1900,7 @@
               </a:spcBef>
             </a:pPr>
             <a:r>
-              <a:rPr lang="en-US" altLang="ko-KR" dirty="0" smtClean="0"/>
+              <a:rPr lang="en-US" altLang="ko-KR" dirty="0"/>
               <a:t>Role-based security</a:t>
             </a:r>
           </a:p>
@@ -1903,7 +1914,7 @@
               </a:spcBef>
             </a:pPr>
             <a:r>
-              <a:rPr lang="en-US" altLang="ko-KR" sz="3200" b="1" dirty="0" smtClean="0"/>
+              <a:rPr lang="en-US" altLang="ko-KR" sz="3200" b="1" dirty="0"/>
               <a:t>Delivery</a:t>
             </a:r>
           </a:p>
@@ -1917,7 +1928,7 @@
               </a:spcBef>
             </a:pPr>
             <a:r>
-              <a:rPr lang="en-US" altLang="ko-KR" dirty="0" smtClean="0"/>
+              <a:rPr lang="en-US" altLang="ko-KR" dirty="0"/>
               <a:t>Range of rendering options</a:t>
             </a:r>
           </a:p>
@@ -1931,7 +1942,7 @@
               </a:spcBef>
             </a:pPr>
             <a:r>
-              <a:rPr lang="en-US" altLang="ko-KR" dirty="0" smtClean="0"/>
+              <a:rPr lang="en-US" altLang="ko-KR" dirty="0"/>
               <a:t>Flexible and extensible delivery</a:t>
             </a:r>
           </a:p>
@@ -1944,7 +1955,7 @@
                 <a:spcPct val="35000"/>
               </a:spcBef>
             </a:pPr>
-            <a:endParaRPr lang="en-US" altLang="ko-KR" dirty="0" smtClean="0"/>
+            <a:endParaRPr lang="en-US" altLang="ko-KR" dirty="0"/>
           </a:p>
           <a:p>
             <a:pPr lvl="1">
@@ -1956,14 +1967,14 @@
               </a:spcBef>
             </a:pPr>
             <a:r>
-              <a:rPr lang="en-US" altLang="ko-KR" dirty="0" smtClean="0"/>
+              <a:rPr lang="en-US" altLang="ko-KR" dirty="0"/>
               <a:t>Need to use VPN</a:t>
             </a:r>
             <a:r>
-              <a:rPr lang="en-US" altLang="ko-KR" baseline="0" dirty="0" smtClean="0"/>
+              <a:rPr lang="en-US" altLang="ko-KR" baseline="0" dirty="0"/>
               <a:t> for delivery, shouldn’t simply use email</a:t>
             </a:r>
-            <a:endParaRPr lang="en-US" altLang="ko-KR" dirty="0" smtClean="0"/>
+            <a:endParaRPr lang="en-US" altLang="ko-KR" dirty="0"/>
           </a:p>
           <a:p>
             <a:endParaRPr lang="en-CA" dirty="0"/>
@@ -2401,16 +2412,16 @@
           <a:lstStyle/>
           <a:p>
             <a:r>
-              <a:rPr lang="en-CA" dirty="0" smtClean="0"/>
+              <a:rPr lang="en-CA" dirty="0"/>
               <a:t>OLAP -&gt; historical reports, looking at trends, subj oriented</a:t>
             </a:r>
             <a:r>
-              <a:rPr lang="en-CA" baseline="0" dirty="0" smtClean="0"/>
+              <a:rPr lang="en-CA" baseline="0" dirty="0"/>
               <a:t> stuff, e.g. how we did last year, and the year before</a:t>
             </a:r>
           </a:p>
           <a:p>
-            <a:endParaRPr lang="en-CA" baseline="0" dirty="0" smtClean="0"/>
+            <a:endParaRPr lang="en-CA" baseline="0" dirty="0"/>
           </a:p>
           <a:p>
             <a:endParaRPr lang="en-CA" dirty="0"/>
@@ -2709,7 +2720,7 @@
           <p:cNvPr id="7" name="Rectangle 7">
             <a:extLst>
               <a:ext uri="{FF2B5EF4-FFF2-40B4-BE49-F238E27FC236}">
-                <a16:creationId xmlns:a16="http://schemas.microsoft.com/office/drawing/2014/main" xmlns="" id="{DBCCC997-5785-4D05-A3BE-942A377BA79C}"/>
+                <a16:creationId xmlns:a16="http://schemas.microsoft.com/office/drawing/2014/main" id="{DBCCC997-5785-4D05-A3BE-942A377BA79C}"/>
               </a:ext>
             </a:extLst>
           </p:cNvPr>
@@ -2741,7 +2752,7 @@
           <p:cNvPr id="53250" name="Rectangle 2">
             <a:extLst>
               <a:ext uri="{FF2B5EF4-FFF2-40B4-BE49-F238E27FC236}">
-                <a16:creationId xmlns:a16="http://schemas.microsoft.com/office/drawing/2014/main" xmlns="" id="{8944551E-AEAE-4AB3-BBC4-D52504155C48}"/>
+                <a16:creationId xmlns:a16="http://schemas.microsoft.com/office/drawing/2014/main" id="{8944551E-AEAE-4AB3-BBC4-D52504155C48}"/>
               </a:ext>
             </a:extLst>
           </p:cNvPr>
@@ -2761,7 +2772,7 @@
           <p:cNvPr id="53251" name="Rectangle 3">
             <a:extLst>
               <a:ext uri="{FF2B5EF4-FFF2-40B4-BE49-F238E27FC236}">
-                <a16:creationId xmlns:a16="http://schemas.microsoft.com/office/drawing/2014/main" xmlns="" id="{FAB65EED-3D2F-4AD4-B296-CE738A7DF6A7}"/>
+                <a16:creationId xmlns:a16="http://schemas.microsoft.com/office/drawing/2014/main" id="{FAB65EED-3D2F-4AD4-B296-CE738A7DF6A7}"/>
               </a:ext>
             </a:extLst>
           </p:cNvPr>
@@ -2816,7 +2827,7 @@
           <p:cNvPr id="7" name="Rectangle 7">
             <a:extLst>
               <a:ext uri="{FF2B5EF4-FFF2-40B4-BE49-F238E27FC236}">
-                <a16:creationId xmlns:a16="http://schemas.microsoft.com/office/drawing/2014/main" xmlns="" id="{52AEE195-E0CB-49BA-BF4A-CE65C16AD89F}"/>
+                <a16:creationId xmlns:a16="http://schemas.microsoft.com/office/drawing/2014/main" id="{52AEE195-E0CB-49BA-BF4A-CE65C16AD89F}"/>
               </a:ext>
             </a:extLst>
           </p:cNvPr>
@@ -2848,7 +2859,7 @@
           <p:cNvPr id="57346" name="Rectangle 2">
             <a:extLst>
               <a:ext uri="{FF2B5EF4-FFF2-40B4-BE49-F238E27FC236}">
-                <a16:creationId xmlns:a16="http://schemas.microsoft.com/office/drawing/2014/main" xmlns="" id="{89591579-A4F1-4BD5-814B-E9B5F747C8E4}"/>
+                <a16:creationId xmlns:a16="http://schemas.microsoft.com/office/drawing/2014/main" id="{89591579-A4F1-4BD5-814B-E9B5F747C8E4}"/>
               </a:ext>
             </a:extLst>
           </p:cNvPr>
@@ -2868,7 +2879,7 @@
           <p:cNvPr id="57347" name="Rectangle 3">
             <a:extLst>
               <a:ext uri="{FF2B5EF4-FFF2-40B4-BE49-F238E27FC236}">
-                <a16:creationId xmlns:a16="http://schemas.microsoft.com/office/drawing/2014/main" xmlns="" id="{6B39BA70-93AB-410D-B3AF-0DFFE50D61AF}"/>
+                <a16:creationId xmlns:a16="http://schemas.microsoft.com/office/drawing/2014/main" id="{6B39BA70-93AB-410D-B3AF-0DFFE50D61AF}"/>
               </a:ext>
             </a:extLst>
           </p:cNvPr>
@@ -2923,7 +2934,7 @@
           <p:cNvPr id="7" name="Rectangle 7">
             <a:extLst>
               <a:ext uri="{FF2B5EF4-FFF2-40B4-BE49-F238E27FC236}">
-                <a16:creationId xmlns:a16="http://schemas.microsoft.com/office/drawing/2014/main" xmlns="" id="{5CD0496B-F44D-4E34-A2AC-9BA55B2901FD}"/>
+                <a16:creationId xmlns:a16="http://schemas.microsoft.com/office/drawing/2014/main" id="{5CD0496B-F44D-4E34-A2AC-9BA55B2901FD}"/>
               </a:ext>
             </a:extLst>
           </p:cNvPr>
@@ -2955,7 +2966,7 @@
           <p:cNvPr id="59394" name="Rectangle 2">
             <a:extLst>
               <a:ext uri="{FF2B5EF4-FFF2-40B4-BE49-F238E27FC236}">
-                <a16:creationId xmlns:a16="http://schemas.microsoft.com/office/drawing/2014/main" xmlns="" id="{10B4F2D2-ED7C-4AA7-BD68-632A921DAB9F}"/>
+                <a16:creationId xmlns:a16="http://schemas.microsoft.com/office/drawing/2014/main" id="{10B4F2D2-ED7C-4AA7-BD68-632A921DAB9F}"/>
               </a:ext>
             </a:extLst>
           </p:cNvPr>
@@ -2975,7 +2986,7 @@
           <p:cNvPr id="59395" name="Rectangle 3">
             <a:extLst>
               <a:ext uri="{FF2B5EF4-FFF2-40B4-BE49-F238E27FC236}">
-                <a16:creationId xmlns:a16="http://schemas.microsoft.com/office/drawing/2014/main" xmlns="" id="{E01F3263-D3C3-4B2C-AF1C-8476E1F6CB9B}"/>
+                <a16:creationId xmlns:a16="http://schemas.microsoft.com/office/drawing/2014/main" id="{E01F3263-D3C3-4B2C-AF1C-8476E1F6CB9B}"/>
               </a:ext>
             </a:extLst>
           </p:cNvPr>
@@ -3030,7 +3041,7 @@
           <p:cNvPr id="7" name="Rectangle 7">
             <a:extLst>
               <a:ext uri="{FF2B5EF4-FFF2-40B4-BE49-F238E27FC236}">
-                <a16:creationId xmlns:a16="http://schemas.microsoft.com/office/drawing/2014/main" xmlns="" id="{A0737DC2-44BB-4212-803F-F4C7E546D12D}"/>
+                <a16:creationId xmlns:a16="http://schemas.microsoft.com/office/drawing/2014/main" id="{A0737DC2-44BB-4212-803F-F4C7E546D12D}"/>
               </a:ext>
             </a:extLst>
           </p:cNvPr>
@@ -3062,7 +3073,7 @@
           <p:cNvPr id="61442" name="Rectangle 2">
             <a:extLst>
               <a:ext uri="{FF2B5EF4-FFF2-40B4-BE49-F238E27FC236}">
-                <a16:creationId xmlns:a16="http://schemas.microsoft.com/office/drawing/2014/main" xmlns="" id="{A4DBB6E5-6077-431B-8C7A-3516FC75E815}"/>
+                <a16:creationId xmlns:a16="http://schemas.microsoft.com/office/drawing/2014/main" id="{A4DBB6E5-6077-431B-8C7A-3516FC75E815}"/>
               </a:ext>
             </a:extLst>
           </p:cNvPr>
@@ -3082,7 +3093,7 @@
           <p:cNvPr id="61443" name="Rectangle 3">
             <a:extLst>
               <a:ext uri="{FF2B5EF4-FFF2-40B4-BE49-F238E27FC236}">
-                <a16:creationId xmlns:a16="http://schemas.microsoft.com/office/drawing/2014/main" xmlns="" id="{3D6B0647-EBCA-4D7D-8289-D778AE962419}"/>
+                <a16:creationId xmlns:a16="http://schemas.microsoft.com/office/drawing/2014/main" id="{3D6B0647-EBCA-4D7D-8289-D778AE962419}"/>
               </a:ext>
             </a:extLst>
           </p:cNvPr>
@@ -3316,46 +3327,46 @@
           <a:lstStyle/>
           <a:p>
             <a:r>
-              <a:rPr lang="en-CA" dirty="0" smtClean="0"/>
+              <a:rPr lang="en-CA" dirty="0"/>
               <a:t>Briefly review AD</a:t>
             </a:r>
           </a:p>
           <a:p>
             <a:r>
-              <a:rPr lang="en-CA" dirty="0" smtClean="0"/>
+              <a:rPr lang="en-CA" dirty="0"/>
               <a:t>This</a:t>
             </a:r>
             <a:r>
-              <a:rPr lang="en-CA" baseline="0" dirty="0" smtClean="0"/>
+              <a:rPr lang="en-CA" baseline="0" dirty="0"/>
               <a:t> is where virtual servers, configured alongside security permissions for accounts</a:t>
             </a:r>
           </a:p>
           <a:p>
-            <a:endParaRPr lang="en-CA" baseline="0" dirty="0" smtClean="0"/>
-          </a:p>
-          <a:p>
-            <a:r>
-              <a:rPr lang="en-CA" baseline="0" dirty="0" smtClean="0"/>
+            <a:endParaRPr lang="en-CA" baseline="0" dirty="0"/>
+          </a:p>
+          <a:p>
+            <a:r>
+              <a:rPr lang="en-CA" baseline="0" dirty="0"/>
               <a:t>Lookup </a:t>
             </a:r>
             <a:r>
-              <a:rPr lang="en-CA" baseline="0" dirty="0" err="1" smtClean="0"/>
+              <a:rPr lang="en-CA" baseline="0" dirty="0" err="1"/>
               <a:t>heatmaps</a:t>
             </a:r>
             <a:r>
-              <a:rPr lang="en-CA" baseline="0" dirty="0" smtClean="0"/>
+              <a:rPr lang="en-CA" baseline="0" dirty="0"/>
               <a:t>, </a:t>
             </a:r>
             <a:r>
-              <a:rPr lang="en-CA" baseline="0" dirty="0" err="1" smtClean="0"/>
+              <a:rPr lang="en-CA" baseline="0" dirty="0" err="1"/>
               <a:t>treemaps</a:t>
             </a:r>
             <a:r>
-              <a:rPr lang="en-CA" baseline="0" dirty="0" smtClean="0"/>
+              <a:rPr lang="en-CA" baseline="0" dirty="0"/>
               <a:t> and other </a:t>
             </a:r>
             <a:r>
-              <a:rPr lang="en-CA" baseline="0" smtClean="0"/>
+              <a:rPr lang="en-CA" baseline="0"/>
               <a:t>visualization techniques </a:t>
             </a:r>
             <a:endParaRPr lang="en-CA" dirty="0"/>
@@ -3443,23 +3454,23 @@
           <a:lstStyle/>
           <a:p>
             <a:r>
-              <a:rPr lang="en-CA" dirty="0" smtClean="0"/>
+              <a:rPr lang="en-CA" dirty="0"/>
               <a:t>Hospital sample report</a:t>
             </a:r>
           </a:p>
           <a:p>
             <a:r>
-              <a:rPr lang="en-CA" dirty="0" err="1" smtClean="0"/>
+              <a:rPr lang="en-CA" dirty="0" err="1"/>
               <a:t>EoD</a:t>
             </a:r>
             <a:r>
-              <a:rPr lang="en-CA" baseline="0" dirty="0" smtClean="0"/>
+              <a:rPr lang="en-CA" baseline="0" dirty="0"/>
               <a:t> report</a:t>
             </a:r>
           </a:p>
           <a:p>
             <a:r>
-              <a:rPr lang="en-CA" baseline="0" dirty="0" smtClean="0"/>
+              <a:rPr lang="en-CA" baseline="0" dirty="0"/>
               <a:t>Back end programming/processing</a:t>
             </a:r>
             <a:endParaRPr lang="en-CA" dirty="0"/>
@@ -3547,17 +3558,17 @@
           <a:lstStyle/>
           <a:p>
             <a:r>
-              <a:rPr lang="en-CA" dirty="0" smtClean="0"/>
+              <a:rPr lang="en-CA" dirty="0"/>
               <a:t>Dashboard report</a:t>
             </a:r>
           </a:p>
           <a:p>
             <a:r>
-              <a:rPr lang="en-CA" dirty="0" smtClean="0"/>
+              <a:rPr lang="en-CA" dirty="0"/>
               <a:t>Provides</a:t>
             </a:r>
             <a:r>
-              <a:rPr lang="en-CA" baseline="0" dirty="0" smtClean="0"/>
+              <a:rPr lang="en-CA" baseline="0" dirty="0"/>
               <a:t> alerts, shows health of system, shows jobs running/ran statuses</a:t>
             </a:r>
             <a:endParaRPr lang="en-CA" dirty="0"/>
@@ -3645,11 +3656,11 @@
           <a:lstStyle/>
           <a:p>
             <a:r>
-              <a:rPr lang="en-CA" dirty="0" smtClean="0"/>
+              <a:rPr lang="en-CA" dirty="0"/>
               <a:t>need to layout report first, set up the view with</a:t>
             </a:r>
             <a:r>
-              <a:rPr lang="en-CA" baseline="0" dirty="0" smtClean="0"/>
+              <a:rPr lang="en-CA" baseline="0" dirty="0"/>
               <a:t> placeholders</a:t>
             </a:r>
             <a:endParaRPr lang="en-CA" dirty="0"/>
@@ -3737,20 +3748,20 @@
           <a:lstStyle/>
           <a:p>
             <a:r>
-              <a:rPr lang="en-CA" dirty="0" smtClean="0"/>
+              <a:rPr lang="en-CA" dirty="0"/>
               <a:t>As a dev, u build packages and provide them to customers e.g. a resort/hotel</a:t>
             </a:r>
           </a:p>
           <a:p>
-            <a:endParaRPr lang="en-CA" dirty="0" smtClean="0"/>
-          </a:p>
-          <a:p>
-            <a:r>
-              <a:rPr lang="en-CA" dirty="0" smtClean="0"/>
+            <a:endParaRPr lang="en-CA" dirty="0"/>
+          </a:p>
+          <a:p>
+            <a:r>
+              <a:rPr lang="en-CA" dirty="0"/>
               <a:t>Ur</a:t>
             </a:r>
             <a:r>
-              <a:rPr lang="en-CA" baseline="0" dirty="0" smtClean="0"/>
+              <a:rPr lang="en-CA" baseline="0" dirty="0"/>
               <a:t> packages need to be able to generate reports such as these</a:t>
             </a:r>
             <a:endParaRPr lang="en-CA" dirty="0"/>
@@ -3838,56 +3849,56 @@
           <a:lstStyle/>
           <a:p>
             <a:r>
-              <a:rPr lang="en-CA" dirty="0" smtClean="0"/>
+              <a:rPr lang="en-CA" dirty="0"/>
               <a:t>Missing more</a:t>
             </a:r>
             <a:r>
-              <a:rPr lang="en-CA" baseline="0" dirty="0" smtClean="0"/>
+              <a:rPr lang="en-CA" baseline="0" dirty="0"/>
               <a:t> info from slide, look this up online</a:t>
             </a:r>
           </a:p>
           <a:p>
-            <a:endParaRPr lang="en-CA" baseline="0" dirty="0" smtClean="0"/>
-          </a:p>
-          <a:p>
-            <a:r>
-              <a:rPr lang="en-CA" baseline="0" dirty="0" smtClean="0"/>
+            <a:endParaRPr lang="en-CA" baseline="0" dirty="0"/>
+          </a:p>
+          <a:p>
+            <a:r>
+              <a:rPr lang="en-CA" baseline="0" dirty="0"/>
               <a:t>G.P.L</a:t>
             </a:r>
           </a:p>
           <a:p>
             <a:r>
-              <a:rPr lang="en-CA" baseline="0" dirty="0" smtClean="0"/>
+              <a:rPr lang="en-CA" baseline="0" dirty="0"/>
               <a:t>-C#</a:t>
             </a:r>
           </a:p>
           <a:p>
             <a:r>
-              <a:rPr lang="en-CA" baseline="0" dirty="0" smtClean="0"/>
+              <a:rPr lang="en-CA" baseline="0" dirty="0"/>
               <a:t>-C++</a:t>
             </a:r>
           </a:p>
           <a:p>
             <a:r>
-              <a:rPr lang="en-CA" baseline="0" dirty="0" smtClean="0"/>
+              <a:rPr lang="en-CA" baseline="0" dirty="0"/>
               <a:t>…</a:t>
             </a:r>
           </a:p>
           <a:p>
             <a:r>
-              <a:rPr lang="en-CA" baseline="0" dirty="0" smtClean="0"/>
+              <a:rPr lang="en-CA" baseline="0" dirty="0"/>
               <a:t>4GL</a:t>
             </a:r>
           </a:p>
           <a:p>
             <a:r>
-              <a:rPr lang="en-CA" baseline="0" dirty="0" smtClean="0"/>
+              <a:rPr lang="en-CA" baseline="0" dirty="0"/>
               <a:t>R.P.G</a:t>
             </a:r>
           </a:p>
           <a:p>
             <a:r>
-              <a:rPr lang="en-CA" baseline="0" dirty="0" smtClean="0"/>
+              <a:rPr lang="en-CA" baseline="0" dirty="0"/>
               <a:t>Crystal Reports, google this</a:t>
             </a:r>
           </a:p>
@@ -3974,11 +3985,11 @@
           <a:lstStyle/>
           <a:p>
             <a:r>
-              <a:rPr lang="en-CA" dirty="0" smtClean="0"/>
+              <a:rPr lang="en-CA" dirty="0"/>
               <a:t>Book doesn’t detail how hard it is to generate reports,</a:t>
             </a:r>
             <a:r>
-              <a:rPr lang="en-CA" baseline="0" dirty="0" smtClean="0"/>
+              <a:rPr lang="en-CA" baseline="0" dirty="0"/>
               <a:t> peter wanted to give examples using RPG</a:t>
             </a:r>
             <a:endParaRPr lang="en-CA" dirty="0"/>
@@ -4205,7 +4216,7 @@
           <p:cNvPr id="2" name="Title 1">
             <a:extLst>
               <a:ext uri="{FF2B5EF4-FFF2-40B4-BE49-F238E27FC236}">
-                <a16:creationId xmlns:a16="http://schemas.microsoft.com/office/drawing/2014/main" xmlns="" id="{6B98F63B-450C-4ADF-B628-5CE61E46C974}"/>
+                <a16:creationId xmlns:a16="http://schemas.microsoft.com/office/drawing/2014/main" id="{6B98F63B-450C-4ADF-B628-5CE61E46C974}"/>
               </a:ext>
             </a:extLst>
           </p:cNvPr>
@@ -4242,7 +4253,7 @@
           <p:cNvPr id="3" name="Subtitle 2">
             <a:extLst>
               <a:ext uri="{FF2B5EF4-FFF2-40B4-BE49-F238E27FC236}">
-                <a16:creationId xmlns:a16="http://schemas.microsoft.com/office/drawing/2014/main" xmlns="" id="{99BDFFAB-00AA-4D74-899C-CCA88402F343}"/>
+                <a16:creationId xmlns:a16="http://schemas.microsoft.com/office/drawing/2014/main" id="{99BDFFAB-00AA-4D74-899C-CCA88402F343}"/>
               </a:ext>
             </a:extLst>
           </p:cNvPr>
@@ -4312,7 +4323,7 @@
           <p:cNvPr id="4" name="Date Placeholder 3">
             <a:extLst>
               <a:ext uri="{FF2B5EF4-FFF2-40B4-BE49-F238E27FC236}">
-                <a16:creationId xmlns:a16="http://schemas.microsoft.com/office/drawing/2014/main" xmlns="" id="{211BD57C-672D-4F4E-A62E-EC9F047F4C35}"/>
+                <a16:creationId xmlns:a16="http://schemas.microsoft.com/office/drawing/2014/main" id="{211BD57C-672D-4F4E-A62E-EC9F047F4C35}"/>
               </a:ext>
             </a:extLst>
           </p:cNvPr>
@@ -4330,7 +4341,7 @@
           <a:p>
             <a:fld id="{ED531EB9-2735-4D0D-B503-A34BE1BD7081}" type="datetimeFigureOut">
               <a:rPr lang="en-US" smtClean="0"/>
-              <a:t>10/9/2018</a:t>
+              <a:t>10/17/2018</a:t>
             </a:fld>
             <a:endParaRPr lang="en-US"/>
           </a:p>
@@ -4341,7 +4352,7 @@
           <p:cNvPr id="5" name="Footer Placeholder 4">
             <a:extLst>
               <a:ext uri="{FF2B5EF4-FFF2-40B4-BE49-F238E27FC236}">
-                <a16:creationId xmlns:a16="http://schemas.microsoft.com/office/drawing/2014/main" xmlns="" id="{761FD8F8-294D-4D18-93E6-4B0C1FAC06D9}"/>
+                <a16:creationId xmlns:a16="http://schemas.microsoft.com/office/drawing/2014/main" id="{761FD8F8-294D-4D18-93E6-4B0C1FAC06D9}"/>
               </a:ext>
             </a:extLst>
           </p:cNvPr>
@@ -4366,7 +4377,7 @@
           <p:cNvPr id="6" name="Slide Number Placeholder 5">
             <a:extLst>
               <a:ext uri="{FF2B5EF4-FFF2-40B4-BE49-F238E27FC236}">
-                <a16:creationId xmlns:a16="http://schemas.microsoft.com/office/drawing/2014/main" xmlns="" id="{EB3C427C-C5E8-46AE-9B75-65898CF5BD43}"/>
+                <a16:creationId xmlns:a16="http://schemas.microsoft.com/office/drawing/2014/main" id="{EB3C427C-C5E8-46AE-9B75-65898CF5BD43}"/>
               </a:ext>
             </a:extLst>
           </p:cNvPr>
@@ -4425,7 +4436,7 @@
           <p:cNvPr id="2" name="Title 1">
             <a:extLst>
               <a:ext uri="{FF2B5EF4-FFF2-40B4-BE49-F238E27FC236}">
-                <a16:creationId xmlns:a16="http://schemas.microsoft.com/office/drawing/2014/main" xmlns="" id="{23EBD761-BB0F-429F-B570-C974FDF288CE}"/>
+                <a16:creationId xmlns:a16="http://schemas.microsoft.com/office/drawing/2014/main" id="{23EBD761-BB0F-429F-B570-C974FDF288CE}"/>
               </a:ext>
             </a:extLst>
           </p:cNvPr>
@@ -4453,7 +4464,7 @@
           <p:cNvPr id="3" name="Vertical Text Placeholder 2">
             <a:extLst>
               <a:ext uri="{FF2B5EF4-FFF2-40B4-BE49-F238E27FC236}">
-                <a16:creationId xmlns:a16="http://schemas.microsoft.com/office/drawing/2014/main" xmlns="" id="{62D14348-4BE4-44A4-A28B-7DA83CD54D66}"/>
+                <a16:creationId xmlns:a16="http://schemas.microsoft.com/office/drawing/2014/main" id="{62D14348-4BE4-44A4-A28B-7DA83CD54D66}"/>
               </a:ext>
             </a:extLst>
           </p:cNvPr>
@@ -4510,7 +4521,7 @@
           <p:cNvPr id="4" name="Date Placeholder 3">
             <a:extLst>
               <a:ext uri="{FF2B5EF4-FFF2-40B4-BE49-F238E27FC236}">
-                <a16:creationId xmlns:a16="http://schemas.microsoft.com/office/drawing/2014/main" xmlns="" id="{DA181223-CC29-4EA3-A876-03E7CF845270}"/>
+                <a16:creationId xmlns:a16="http://schemas.microsoft.com/office/drawing/2014/main" id="{DA181223-CC29-4EA3-A876-03E7CF845270}"/>
               </a:ext>
             </a:extLst>
           </p:cNvPr>
@@ -4528,7 +4539,7 @@
           <a:p>
             <a:fld id="{ED531EB9-2735-4D0D-B503-A34BE1BD7081}" type="datetimeFigureOut">
               <a:rPr lang="en-US" smtClean="0"/>
-              <a:t>10/9/2018</a:t>
+              <a:t>10/17/2018</a:t>
             </a:fld>
             <a:endParaRPr lang="en-US"/>
           </a:p>
@@ -4539,7 +4550,7 @@
           <p:cNvPr id="5" name="Footer Placeholder 4">
             <a:extLst>
               <a:ext uri="{FF2B5EF4-FFF2-40B4-BE49-F238E27FC236}">
-                <a16:creationId xmlns:a16="http://schemas.microsoft.com/office/drawing/2014/main" xmlns="" id="{D61FD8BF-301B-43A7-9321-0130C8959E1C}"/>
+                <a16:creationId xmlns:a16="http://schemas.microsoft.com/office/drawing/2014/main" id="{D61FD8BF-301B-43A7-9321-0130C8959E1C}"/>
               </a:ext>
             </a:extLst>
           </p:cNvPr>
@@ -4564,7 +4575,7 @@
           <p:cNvPr id="6" name="Slide Number Placeholder 5">
             <a:extLst>
               <a:ext uri="{FF2B5EF4-FFF2-40B4-BE49-F238E27FC236}">
-                <a16:creationId xmlns:a16="http://schemas.microsoft.com/office/drawing/2014/main" xmlns="" id="{EA4A07EA-E977-48FF-9DB6-820A4EC59B16}"/>
+                <a16:creationId xmlns:a16="http://schemas.microsoft.com/office/drawing/2014/main" id="{EA4A07EA-E977-48FF-9DB6-820A4EC59B16}"/>
               </a:ext>
             </a:extLst>
           </p:cNvPr>
@@ -4623,7 +4634,7 @@
           <p:cNvPr id="2" name="Vertical Title 1">
             <a:extLst>
               <a:ext uri="{FF2B5EF4-FFF2-40B4-BE49-F238E27FC236}">
-                <a16:creationId xmlns:a16="http://schemas.microsoft.com/office/drawing/2014/main" xmlns="" id="{A0D7E4C9-D1B3-4FFC-BEA5-6C4EFF4A3F4B}"/>
+                <a16:creationId xmlns:a16="http://schemas.microsoft.com/office/drawing/2014/main" id="{A0D7E4C9-D1B3-4FFC-BEA5-6C4EFF4A3F4B}"/>
               </a:ext>
             </a:extLst>
           </p:cNvPr>
@@ -4656,7 +4667,7 @@
           <p:cNvPr id="3" name="Vertical Text Placeholder 2">
             <a:extLst>
               <a:ext uri="{FF2B5EF4-FFF2-40B4-BE49-F238E27FC236}">
-                <a16:creationId xmlns:a16="http://schemas.microsoft.com/office/drawing/2014/main" xmlns="" id="{976F4326-1407-4908-A37C-13A64D610E76}"/>
+                <a16:creationId xmlns:a16="http://schemas.microsoft.com/office/drawing/2014/main" id="{976F4326-1407-4908-A37C-13A64D610E76}"/>
               </a:ext>
             </a:extLst>
           </p:cNvPr>
@@ -4718,7 +4729,7 @@
           <p:cNvPr id="4" name="Date Placeholder 3">
             <a:extLst>
               <a:ext uri="{FF2B5EF4-FFF2-40B4-BE49-F238E27FC236}">
-                <a16:creationId xmlns:a16="http://schemas.microsoft.com/office/drawing/2014/main" xmlns="" id="{F23387C0-6B6E-4FAC-ADEE-8FA32431FF60}"/>
+                <a16:creationId xmlns:a16="http://schemas.microsoft.com/office/drawing/2014/main" id="{F23387C0-6B6E-4FAC-ADEE-8FA32431FF60}"/>
               </a:ext>
             </a:extLst>
           </p:cNvPr>
@@ -4736,7 +4747,7 @@
           <a:p>
             <a:fld id="{ED531EB9-2735-4D0D-B503-A34BE1BD7081}" type="datetimeFigureOut">
               <a:rPr lang="en-US" smtClean="0"/>
-              <a:t>10/9/2018</a:t>
+              <a:t>10/17/2018</a:t>
             </a:fld>
             <a:endParaRPr lang="en-US"/>
           </a:p>
@@ -4747,7 +4758,7 @@
           <p:cNvPr id="5" name="Footer Placeholder 4">
             <a:extLst>
               <a:ext uri="{FF2B5EF4-FFF2-40B4-BE49-F238E27FC236}">
-                <a16:creationId xmlns:a16="http://schemas.microsoft.com/office/drawing/2014/main" xmlns="" id="{4A0B5BC0-A8BC-415E-9293-F7E36AA6D1D6}"/>
+                <a16:creationId xmlns:a16="http://schemas.microsoft.com/office/drawing/2014/main" id="{4A0B5BC0-A8BC-415E-9293-F7E36AA6D1D6}"/>
               </a:ext>
             </a:extLst>
           </p:cNvPr>
@@ -4772,7 +4783,7 @@
           <p:cNvPr id="6" name="Slide Number Placeholder 5">
             <a:extLst>
               <a:ext uri="{FF2B5EF4-FFF2-40B4-BE49-F238E27FC236}">
-                <a16:creationId xmlns:a16="http://schemas.microsoft.com/office/drawing/2014/main" xmlns="" id="{B23DFD41-AB2A-4CDB-B333-161621F509BC}"/>
+                <a16:creationId xmlns:a16="http://schemas.microsoft.com/office/drawing/2014/main" id="{B23DFD41-AB2A-4CDB-B333-161621F509BC}"/>
               </a:ext>
             </a:extLst>
           </p:cNvPr>
@@ -4831,7 +4842,7 @@
           <p:cNvPr id="2" name="Title 1">
             <a:extLst>
               <a:ext uri="{FF2B5EF4-FFF2-40B4-BE49-F238E27FC236}">
-                <a16:creationId xmlns:a16="http://schemas.microsoft.com/office/drawing/2014/main" xmlns="" id="{41FEB7B5-33DA-43EE-853C-B6151F3D3249}"/>
+                <a16:creationId xmlns:a16="http://schemas.microsoft.com/office/drawing/2014/main" id="{41FEB7B5-33DA-43EE-853C-B6151F3D3249}"/>
               </a:ext>
             </a:extLst>
           </p:cNvPr>
@@ -4859,7 +4870,7 @@
           <p:cNvPr id="3" name="Content Placeholder 2">
             <a:extLst>
               <a:ext uri="{FF2B5EF4-FFF2-40B4-BE49-F238E27FC236}">
-                <a16:creationId xmlns:a16="http://schemas.microsoft.com/office/drawing/2014/main" xmlns="" id="{780BE182-15A3-44D4-9EC6-AB6097FFD454}"/>
+                <a16:creationId xmlns:a16="http://schemas.microsoft.com/office/drawing/2014/main" id="{780BE182-15A3-44D4-9EC6-AB6097FFD454}"/>
               </a:ext>
             </a:extLst>
           </p:cNvPr>
@@ -4916,7 +4927,7 @@
           <p:cNvPr id="4" name="Date Placeholder 3">
             <a:extLst>
               <a:ext uri="{FF2B5EF4-FFF2-40B4-BE49-F238E27FC236}">
-                <a16:creationId xmlns:a16="http://schemas.microsoft.com/office/drawing/2014/main" xmlns="" id="{61259307-3C43-4869-880A-8B2CA6A5E20C}"/>
+                <a16:creationId xmlns:a16="http://schemas.microsoft.com/office/drawing/2014/main" id="{61259307-3C43-4869-880A-8B2CA6A5E20C}"/>
               </a:ext>
             </a:extLst>
           </p:cNvPr>
@@ -4934,7 +4945,7 @@
           <a:p>
             <a:fld id="{ED531EB9-2735-4D0D-B503-A34BE1BD7081}" type="datetimeFigureOut">
               <a:rPr lang="en-US" smtClean="0"/>
-              <a:t>10/9/2018</a:t>
+              <a:t>10/17/2018</a:t>
             </a:fld>
             <a:endParaRPr lang="en-US"/>
           </a:p>
@@ -4945,7 +4956,7 @@
           <p:cNvPr id="5" name="Footer Placeholder 4">
             <a:extLst>
               <a:ext uri="{FF2B5EF4-FFF2-40B4-BE49-F238E27FC236}">
-                <a16:creationId xmlns:a16="http://schemas.microsoft.com/office/drawing/2014/main" xmlns="" id="{47831C0E-04FF-47E6-92E2-845A13CD48AE}"/>
+                <a16:creationId xmlns:a16="http://schemas.microsoft.com/office/drawing/2014/main" id="{47831C0E-04FF-47E6-92E2-845A13CD48AE}"/>
               </a:ext>
             </a:extLst>
           </p:cNvPr>
@@ -4970,7 +4981,7 @@
           <p:cNvPr id="6" name="Slide Number Placeholder 5">
             <a:extLst>
               <a:ext uri="{FF2B5EF4-FFF2-40B4-BE49-F238E27FC236}">
-                <a16:creationId xmlns:a16="http://schemas.microsoft.com/office/drawing/2014/main" xmlns="" id="{24C7A218-2125-4CCD-AFEF-312BC982B910}"/>
+                <a16:creationId xmlns:a16="http://schemas.microsoft.com/office/drawing/2014/main" id="{24C7A218-2125-4CCD-AFEF-312BC982B910}"/>
               </a:ext>
             </a:extLst>
           </p:cNvPr>
@@ -5029,7 +5040,7 @@
           <p:cNvPr id="2" name="Title 1">
             <a:extLst>
               <a:ext uri="{FF2B5EF4-FFF2-40B4-BE49-F238E27FC236}">
-                <a16:creationId xmlns:a16="http://schemas.microsoft.com/office/drawing/2014/main" xmlns="" id="{BA4842F0-2FB9-4E2B-94A5-06614DB47EE9}"/>
+                <a16:creationId xmlns:a16="http://schemas.microsoft.com/office/drawing/2014/main" id="{BA4842F0-2FB9-4E2B-94A5-06614DB47EE9}"/>
               </a:ext>
             </a:extLst>
           </p:cNvPr>
@@ -5066,7 +5077,7 @@
           <p:cNvPr id="3" name="Text Placeholder 2">
             <a:extLst>
               <a:ext uri="{FF2B5EF4-FFF2-40B4-BE49-F238E27FC236}">
-                <a16:creationId xmlns:a16="http://schemas.microsoft.com/office/drawing/2014/main" xmlns="" id="{E3B1A0F5-6FD0-4E96-9157-7C108A2D5BFB}"/>
+                <a16:creationId xmlns:a16="http://schemas.microsoft.com/office/drawing/2014/main" id="{E3B1A0F5-6FD0-4E96-9157-7C108A2D5BFB}"/>
               </a:ext>
             </a:extLst>
           </p:cNvPr>
@@ -5191,7 +5202,7 @@
           <p:cNvPr id="4" name="Date Placeholder 3">
             <a:extLst>
               <a:ext uri="{FF2B5EF4-FFF2-40B4-BE49-F238E27FC236}">
-                <a16:creationId xmlns:a16="http://schemas.microsoft.com/office/drawing/2014/main" xmlns="" id="{940450CD-71B2-42AA-8FCC-45BDAC2B3AA0}"/>
+                <a16:creationId xmlns:a16="http://schemas.microsoft.com/office/drawing/2014/main" id="{940450CD-71B2-42AA-8FCC-45BDAC2B3AA0}"/>
               </a:ext>
             </a:extLst>
           </p:cNvPr>
@@ -5209,7 +5220,7 @@
           <a:p>
             <a:fld id="{ED531EB9-2735-4D0D-B503-A34BE1BD7081}" type="datetimeFigureOut">
               <a:rPr lang="en-US" smtClean="0"/>
-              <a:t>10/9/2018</a:t>
+              <a:t>10/17/2018</a:t>
             </a:fld>
             <a:endParaRPr lang="en-US"/>
           </a:p>
@@ -5220,7 +5231,7 @@
           <p:cNvPr id="5" name="Footer Placeholder 4">
             <a:extLst>
               <a:ext uri="{FF2B5EF4-FFF2-40B4-BE49-F238E27FC236}">
-                <a16:creationId xmlns:a16="http://schemas.microsoft.com/office/drawing/2014/main" xmlns="" id="{07DA99A2-696C-497A-9FFC-01348F554FBD}"/>
+                <a16:creationId xmlns:a16="http://schemas.microsoft.com/office/drawing/2014/main" id="{07DA99A2-696C-497A-9FFC-01348F554FBD}"/>
               </a:ext>
             </a:extLst>
           </p:cNvPr>
@@ -5245,7 +5256,7 @@
           <p:cNvPr id="6" name="Slide Number Placeholder 5">
             <a:extLst>
               <a:ext uri="{FF2B5EF4-FFF2-40B4-BE49-F238E27FC236}">
-                <a16:creationId xmlns:a16="http://schemas.microsoft.com/office/drawing/2014/main" xmlns="" id="{C95F8A6B-3BC4-4952-A813-85BD97B439BE}"/>
+                <a16:creationId xmlns:a16="http://schemas.microsoft.com/office/drawing/2014/main" id="{C95F8A6B-3BC4-4952-A813-85BD97B439BE}"/>
               </a:ext>
             </a:extLst>
           </p:cNvPr>
@@ -5304,7 +5315,7 @@
           <p:cNvPr id="2" name="Title 1">
             <a:extLst>
               <a:ext uri="{FF2B5EF4-FFF2-40B4-BE49-F238E27FC236}">
-                <a16:creationId xmlns:a16="http://schemas.microsoft.com/office/drawing/2014/main" xmlns="" id="{F6C661DD-9282-466D-AC5C-6A457F43E9B4}"/>
+                <a16:creationId xmlns:a16="http://schemas.microsoft.com/office/drawing/2014/main" id="{F6C661DD-9282-466D-AC5C-6A457F43E9B4}"/>
               </a:ext>
             </a:extLst>
           </p:cNvPr>
@@ -5332,7 +5343,7 @@
           <p:cNvPr id="3" name="Content Placeholder 2">
             <a:extLst>
               <a:ext uri="{FF2B5EF4-FFF2-40B4-BE49-F238E27FC236}">
-                <a16:creationId xmlns:a16="http://schemas.microsoft.com/office/drawing/2014/main" xmlns="" id="{97B5AF77-1A79-4DBA-902F-785AD9600EF5}"/>
+                <a16:creationId xmlns:a16="http://schemas.microsoft.com/office/drawing/2014/main" id="{97B5AF77-1A79-4DBA-902F-785AD9600EF5}"/>
               </a:ext>
             </a:extLst>
           </p:cNvPr>
@@ -5394,7 +5405,7 @@
           <p:cNvPr id="4" name="Content Placeholder 3">
             <a:extLst>
               <a:ext uri="{FF2B5EF4-FFF2-40B4-BE49-F238E27FC236}">
-                <a16:creationId xmlns:a16="http://schemas.microsoft.com/office/drawing/2014/main" xmlns="" id="{04718A4F-7FD5-4DE1-A33B-5428D46207F5}"/>
+                <a16:creationId xmlns:a16="http://schemas.microsoft.com/office/drawing/2014/main" id="{04718A4F-7FD5-4DE1-A33B-5428D46207F5}"/>
               </a:ext>
             </a:extLst>
           </p:cNvPr>
@@ -5456,7 +5467,7 @@
           <p:cNvPr id="5" name="Date Placeholder 4">
             <a:extLst>
               <a:ext uri="{FF2B5EF4-FFF2-40B4-BE49-F238E27FC236}">
-                <a16:creationId xmlns:a16="http://schemas.microsoft.com/office/drawing/2014/main" xmlns="" id="{0719F8C5-92E9-4E5A-BFEB-E7ABDFC892A0}"/>
+                <a16:creationId xmlns:a16="http://schemas.microsoft.com/office/drawing/2014/main" id="{0719F8C5-92E9-4E5A-BFEB-E7ABDFC892A0}"/>
               </a:ext>
             </a:extLst>
           </p:cNvPr>
@@ -5474,7 +5485,7 @@
           <a:p>
             <a:fld id="{ED531EB9-2735-4D0D-B503-A34BE1BD7081}" type="datetimeFigureOut">
               <a:rPr lang="en-US" smtClean="0"/>
-              <a:t>10/9/2018</a:t>
+              <a:t>10/17/2018</a:t>
             </a:fld>
             <a:endParaRPr lang="en-US"/>
           </a:p>
@@ -5485,7 +5496,7 @@
           <p:cNvPr id="6" name="Footer Placeholder 5">
             <a:extLst>
               <a:ext uri="{FF2B5EF4-FFF2-40B4-BE49-F238E27FC236}">
-                <a16:creationId xmlns:a16="http://schemas.microsoft.com/office/drawing/2014/main" xmlns="" id="{D24F14EC-998B-44BF-9359-290CFCF05CF3}"/>
+                <a16:creationId xmlns:a16="http://schemas.microsoft.com/office/drawing/2014/main" id="{D24F14EC-998B-44BF-9359-290CFCF05CF3}"/>
               </a:ext>
             </a:extLst>
           </p:cNvPr>
@@ -5510,7 +5521,7 @@
           <p:cNvPr id="7" name="Slide Number Placeholder 6">
             <a:extLst>
               <a:ext uri="{FF2B5EF4-FFF2-40B4-BE49-F238E27FC236}">
-                <a16:creationId xmlns:a16="http://schemas.microsoft.com/office/drawing/2014/main" xmlns="" id="{A3FED384-4602-4A96-943C-A26DEB185DCE}"/>
+                <a16:creationId xmlns:a16="http://schemas.microsoft.com/office/drawing/2014/main" id="{A3FED384-4602-4A96-943C-A26DEB185DCE}"/>
               </a:ext>
             </a:extLst>
           </p:cNvPr>
@@ -5569,7 +5580,7 @@
           <p:cNvPr id="2" name="Title 1">
             <a:extLst>
               <a:ext uri="{FF2B5EF4-FFF2-40B4-BE49-F238E27FC236}">
-                <a16:creationId xmlns:a16="http://schemas.microsoft.com/office/drawing/2014/main" xmlns="" id="{E6C80FC2-E916-422A-A74D-043DAE6E57C1}"/>
+                <a16:creationId xmlns:a16="http://schemas.microsoft.com/office/drawing/2014/main" id="{E6C80FC2-E916-422A-A74D-043DAE6E57C1}"/>
               </a:ext>
             </a:extLst>
           </p:cNvPr>
@@ -5602,7 +5613,7 @@
           <p:cNvPr id="3" name="Text Placeholder 2">
             <a:extLst>
               <a:ext uri="{FF2B5EF4-FFF2-40B4-BE49-F238E27FC236}">
-                <a16:creationId xmlns:a16="http://schemas.microsoft.com/office/drawing/2014/main" xmlns="" id="{271071CC-C1AB-4237-82E2-B74A48C33052}"/>
+                <a16:creationId xmlns:a16="http://schemas.microsoft.com/office/drawing/2014/main" id="{271071CC-C1AB-4237-82E2-B74A48C33052}"/>
               </a:ext>
             </a:extLst>
           </p:cNvPr>
@@ -5673,7 +5684,7 @@
           <p:cNvPr id="4" name="Content Placeholder 3">
             <a:extLst>
               <a:ext uri="{FF2B5EF4-FFF2-40B4-BE49-F238E27FC236}">
-                <a16:creationId xmlns:a16="http://schemas.microsoft.com/office/drawing/2014/main" xmlns="" id="{0E4A941D-C664-4DDB-8170-D043344365FA}"/>
+                <a16:creationId xmlns:a16="http://schemas.microsoft.com/office/drawing/2014/main" id="{0E4A941D-C664-4DDB-8170-D043344365FA}"/>
               </a:ext>
             </a:extLst>
           </p:cNvPr>
@@ -5735,7 +5746,7 @@
           <p:cNvPr id="5" name="Text Placeholder 4">
             <a:extLst>
               <a:ext uri="{FF2B5EF4-FFF2-40B4-BE49-F238E27FC236}">
-                <a16:creationId xmlns:a16="http://schemas.microsoft.com/office/drawing/2014/main" xmlns="" id="{4E047F1A-D1CC-405D-8151-3DAFD9D06D54}"/>
+                <a16:creationId xmlns:a16="http://schemas.microsoft.com/office/drawing/2014/main" id="{4E047F1A-D1CC-405D-8151-3DAFD9D06D54}"/>
               </a:ext>
             </a:extLst>
           </p:cNvPr>
@@ -5806,7 +5817,7 @@
           <p:cNvPr id="6" name="Content Placeholder 5">
             <a:extLst>
               <a:ext uri="{FF2B5EF4-FFF2-40B4-BE49-F238E27FC236}">
-                <a16:creationId xmlns:a16="http://schemas.microsoft.com/office/drawing/2014/main" xmlns="" id="{5942B957-691C-4076-9B2F-3B6E9A5CC21C}"/>
+                <a16:creationId xmlns:a16="http://schemas.microsoft.com/office/drawing/2014/main" id="{5942B957-691C-4076-9B2F-3B6E9A5CC21C}"/>
               </a:ext>
             </a:extLst>
           </p:cNvPr>
@@ -5868,7 +5879,7 @@
           <p:cNvPr id="7" name="Date Placeholder 6">
             <a:extLst>
               <a:ext uri="{FF2B5EF4-FFF2-40B4-BE49-F238E27FC236}">
-                <a16:creationId xmlns:a16="http://schemas.microsoft.com/office/drawing/2014/main" xmlns="" id="{95CFBC4B-B4D1-416D-B659-A8815887B531}"/>
+                <a16:creationId xmlns:a16="http://schemas.microsoft.com/office/drawing/2014/main" id="{95CFBC4B-B4D1-416D-B659-A8815887B531}"/>
               </a:ext>
             </a:extLst>
           </p:cNvPr>
@@ -5886,7 +5897,7 @@
           <a:p>
             <a:fld id="{ED531EB9-2735-4D0D-B503-A34BE1BD7081}" type="datetimeFigureOut">
               <a:rPr lang="en-US" smtClean="0"/>
-              <a:t>10/9/2018</a:t>
+              <a:t>10/17/2018</a:t>
             </a:fld>
             <a:endParaRPr lang="en-US"/>
           </a:p>
@@ -5897,7 +5908,7 @@
           <p:cNvPr id="8" name="Footer Placeholder 7">
             <a:extLst>
               <a:ext uri="{FF2B5EF4-FFF2-40B4-BE49-F238E27FC236}">
-                <a16:creationId xmlns:a16="http://schemas.microsoft.com/office/drawing/2014/main" xmlns="" id="{98BF4FEA-035F-4528-8F19-75586A99970F}"/>
+                <a16:creationId xmlns:a16="http://schemas.microsoft.com/office/drawing/2014/main" id="{98BF4FEA-035F-4528-8F19-75586A99970F}"/>
               </a:ext>
             </a:extLst>
           </p:cNvPr>
@@ -5922,7 +5933,7 @@
           <p:cNvPr id="9" name="Slide Number Placeholder 8">
             <a:extLst>
               <a:ext uri="{FF2B5EF4-FFF2-40B4-BE49-F238E27FC236}">
-                <a16:creationId xmlns:a16="http://schemas.microsoft.com/office/drawing/2014/main" xmlns="" id="{41290DCD-605C-4414-9394-B9A5FB9DC96D}"/>
+                <a16:creationId xmlns:a16="http://schemas.microsoft.com/office/drawing/2014/main" id="{41290DCD-605C-4414-9394-B9A5FB9DC96D}"/>
               </a:ext>
             </a:extLst>
           </p:cNvPr>
@@ -5981,7 +5992,7 @@
           <p:cNvPr id="2" name="Title 1">
             <a:extLst>
               <a:ext uri="{FF2B5EF4-FFF2-40B4-BE49-F238E27FC236}">
-                <a16:creationId xmlns:a16="http://schemas.microsoft.com/office/drawing/2014/main" xmlns="" id="{C9AEDB77-7542-4A57-B97C-E3BD9C4944FF}"/>
+                <a16:creationId xmlns:a16="http://schemas.microsoft.com/office/drawing/2014/main" id="{C9AEDB77-7542-4A57-B97C-E3BD9C4944FF}"/>
               </a:ext>
             </a:extLst>
           </p:cNvPr>
@@ -6009,7 +6020,7 @@
           <p:cNvPr id="3" name="Date Placeholder 2">
             <a:extLst>
               <a:ext uri="{FF2B5EF4-FFF2-40B4-BE49-F238E27FC236}">
-                <a16:creationId xmlns:a16="http://schemas.microsoft.com/office/drawing/2014/main" xmlns="" id="{6A793DEB-6402-4A9F-B441-5CFB71911D7B}"/>
+                <a16:creationId xmlns:a16="http://schemas.microsoft.com/office/drawing/2014/main" id="{6A793DEB-6402-4A9F-B441-5CFB71911D7B}"/>
               </a:ext>
             </a:extLst>
           </p:cNvPr>
@@ -6027,7 +6038,7 @@
           <a:p>
             <a:fld id="{ED531EB9-2735-4D0D-B503-A34BE1BD7081}" type="datetimeFigureOut">
               <a:rPr lang="en-US" smtClean="0"/>
-              <a:t>10/9/2018</a:t>
+              <a:t>10/17/2018</a:t>
             </a:fld>
             <a:endParaRPr lang="en-US"/>
           </a:p>
@@ -6038,7 +6049,7 @@
           <p:cNvPr id="4" name="Footer Placeholder 3">
             <a:extLst>
               <a:ext uri="{FF2B5EF4-FFF2-40B4-BE49-F238E27FC236}">
-                <a16:creationId xmlns:a16="http://schemas.microsoft.com/office/drawing/2014/main" xmlns="" id="{FC97AE3B-3617-465F-9FAE-AD38EE04437B}"/>
+                <a16:creationId xmlns:a16="http://schemas.microsoft.com/office/drawing/2014/main" id="{FC97AE3B-3617-465F-9FAE-AD38EE04437B}"/>
               </a:ext>
             </a:extLst>
           </p:cNvPr>
@@ -6063,7 +6074,7 @@
           <p:cNvPr id="5" name="Slide Number Placeholder 4">
             <a:extLst>
               <a:ext uri="{FF2B5EF4-FFF2-40B4-BE49-F238E27FC236}">
-                <a16:creationId xmlns:a16="http://schemas.microsoft.com/office/drawing/2014/main" xmlns="" id="{92798DB6-19D3-4E0F-A68A-9B840BA244F6}"/>
+                <a16:creationId xmlns:a16="http://schemas.microsoft.com/office/drawing/2014/main" id="{92798DB6-19D3-4E0F-A68A-9B840BA244F6}"/>
               </a:ext>
             </a:extLst>
           </p:cNvPr>
@@ -6122,7 +6133,7 @@
           <p:cNvPr id="2" name="Date Placeholder 1">
             <a:extLst>
               <a:ext uri="{FF2B5EF4-FFF2-40B4-BE49-F238E27FC236}">
-                <a16:creationId xmlns:a16="http://schemas.microsoft.com/office/drawing/2014/main" xmlns="" id="{9B396877-0EB1-446C-8000-521DA6C84E30}"/>
+                <a16:creationId xmlns:a16="http://schemas.microsoft.com/office/drawing/2014/main" id="{9B396877-0EB1-446C-8000-521DA6C84E30}"/>
               </a:ext>
             </a:extLst>
           </p:cNvPr>
@@ -6140,7 +6151,7 @@
           <a:p>
             <a:fld id="{ED531EB9-2735-4D0D-B503-A34BE1BD7081}" type="datetimeFigureOut">
               <a:rPr lang="en-US" smtClean="0"/>
-              <a:t>10/9/2018</a:t>
+              <a:t>10/17/2018</a:t>
             </a:fld>
             <a:endParaRPr lang="en-US"/>
           </a:p>
@@ -6151,7 +6162,7 @@
           <p:cNvPr id="3" name="Footer Placeholder 2">
             <a:extLst>
               <a:ext uri="{FF2B5EF4-FFF2-40B4-BE49-F238E27FC236}">
-                <a16:creationId xmlns:a16="http://schemas.microsoft.com/office/drawing/2014/main" xmlns="" id="{07A072F3-74F5-4C0C-AAD2-9A554082473D}"/>
+                <a16:creationId xmlns:a16="http://schemas.microsoft.com/office/drawing/2014/main" id="{07A072F3-74F5-4C0C-AAD2-9A554082473D}"/>
               </a:ext>
             </a:extLst>
           </p:cNvPr>
@@ -6176,7 +6187,7 @@
           <p:cNvPr id="4" name="Slide Number Placeholder 3">
             <a:extLst>
               <a:ext uri="{FF2B5EF4-FFF2-40B4-BE49-F238E27FC236}">
-                <a16:creationId xmlns:a16="http://schemas.microsoft.com/office/drawing/2014/main" xmlns="" id="{F5F1D26E-4845-40B6-8A92-7CF20CC51AD9}"/>
+                <a16:creationId xmlns:a16="http://schemas.microsoft.com/office/drawing/2014/main" id="{F5F1D26E-4845-40B6-8A92-7CF20CC51AD9}"/>
               </a:ext>
             </a:extLst>
           </p:cNvPr>
@@ -6235,7 +6246,7 @@
           <p:cNvPr id="2" name="Title 1">
             <a:extLst>
               <a:ext uri="{FF2B5EF4-FFF2-40B4-BE49-F238E27FC236}">
-                <a16:creationId xmlns:a16="http://schemas.microsoft.com/office/drawing/2014/main" xmlns="" id="{9B21C851-2C44-4E77-B82F-4F178BE5D4DE}"/>
+                <a16:creationId xmlns:a16="http://schemas.microsoft.com/office/drawing/2014/main" id="{9B21C851-2C44-4E77-B82F-4F178BE5D4DE}"/>
               </a:ext>
             </a:extLst>
           </p:cNvPr>
@@ -6272,7 +6283,7 @@
           <p:cNvPr id="3" name="Content Placeholder 2">
             <a:extLst>
               <a:ext uri="{FF2B5EF4-FFF2-40B4-BE49-F238E27FC236}">
-                <a16:creationId xmlns:a16="http://schemas.microsoft.com/office/drawing/2014/main" xmlns="" id="{5CC9BECD-F281-4132-8012-A6C8B74B2F49}"/>
+                <a16:creationId xmlns:a16="http://schemas.microsoft.com/office/drawing/2014/main" id="{5CC9BECD-F281-4132-8012-A6C8B74B2F49}"/>
               </a:ext>
             </a:extLst>
           </p:cNvPr>
@@ -6362,7 +6373,7 @@
           <p:cNvPr id="4" name="Text Placeholder 3">
             <a:extLst>
               <a:ext uri="{FF2B5EF4-FFF2-40B4-BE49-F238E27FC236}">
-                <a16:creationId xmlns:a16="http://schemas.microsoft.com/office/drawing/2014/main" xmlns="" id="{FD8ADE0B-5839-4B89-9A30-CA06863B3929}"/>
+                <a16:creationId xmlns:a16="http://schemas.microsoft.com/office/drawing/2014/main" id="{FD8ADE0B-5839-4B89-9A30-CA06863B3929}"/>
               </a:ext>
             </a:extLst>
           </p:cNvPr>
@@ -6433,7 +6444,7 @@
           <p:cNvPr id="5" name="Date Placeholder 4">
             <a:extLst>
               <a:ext uri="{FF2B5EF4-FFF2-40B4-BE49-F238E27FC236}">
-                <a16:creationId xmlns:a16="http://schemas.microsoft.com/office/drawing/2014/main" xmlns="" id="{0270B275-D9AD-41C4-943A-5D0BF5703C4E}"/>
+                <a16:creationId xmlns:a16="http://schemas.microsoft.com/office/drawing/2014/main" id="{0270B275-D9AD-41C4-943A-5D0BF5703C4E}"/>
               </a:ext>
             </a:extLst>
           </p:cNvPr>
@@ -6451,7 +6462,7 @@
           <a:p>
             <a:fld id="{ED531EB9-2735-4D0D-B503-A34BE1BD7081}" type="datetimeFigureOut">
               <a:rPr lang="en-US" smtClean="0"/>
-              <a:t>10/9/2018</a:t>
+              <a:t>10/17/2018</a:t>
             </a:fld>
             <a:endParaRPr lang="en-US"/>
           </a:p>
@@ -6462,7 +6473,7 @@
           <p:cNvPr id="6" name="Footer Placeholder 5">
             <a:extLst>
               <a:ext uri="{FF2B5EF4-FFF2-40B4-BE49-F238E27FC236}">
-                <a16:creationId xmlns:a16="http://schemas.microsoft.com/office/drawing/2014/main" xmlns="" id="{DFBF9E09-9CFD-4389-A739-1265106B9B73}"/>
+                <a16:creationId xmlns:a16="http://schemas.microsoft.com/office/drawing/2014/main" id="{DFBF9E09-9CFD-4389-A739-1265106B9B73}"/>
               </a:ext>
             </a:extLst>
           </p:cNvPr>
@@ -6487,7 +6498,7 @@
           <p:cNvPr id="7" name="Slide Number Placeholder 6">
             <a:extLst>
               <a:ext uri="{FF2B5EF4-FFF2-40B4-BE49-F238E27FC236}">
-                <a16:creationId xmlns:a16="http://schemas.microsoft.com/office/drawing/2014/main" xmlns="" id="{97B05D1E-A698-4B3A-89DD-012E210DFB05}"/>
+                <a16:creationId xmlns:a16="http://schemas.microsoft.com/office/drawing/2014/main" id="{97B05D1E-A698-4B3A-89DD-012E210DFB05}"/>
               </a:ext>
             </a:extLst>
           </p:cNvPr>
@@ -6546,7 +6557,7 @@
           <p:cNvPr id="2" name="Title 1">
             <a:extLst>
               <a:ext uri="{FF2B5EF4-FFF2-40B4-BE49-F238E27FC236}">
-                <a16:creationId xmlns:a16="http://schemas.microsoft.com/office/drawing/2014/main" xmlns="" id="{79EEED43-33C9-4A4E-A24D-619E59AF0761}"/>
+                <a16:creationId xmlns:a16="http://schemas.microsoft.com/office/drawing/2014/main" id="{79EEED43-33C9-4A4E-A24D-619E59AF0761}"/>
               </a:ext>
             </a:extLst>
           </p:cNvPr>
@@ -6583,7 +6594,7 @@
           <p:cNvPr id="3" name="Picture Placeholder 2">
             <a:extLst>
               <a:ext uri="{FF2B5EF4-FFF2-40B4-BE49-F238E27FC236}">
-                <a16:creationId xmlns:a16="http://schemas.microsoft.com/office/drawing/2014/main" xmlns="" id="{19AF4BCF-6459-4ABB-95F9-CF3ABFCBF6F8}"/>
+                <a16:creationId xmlns:a16="http://schemas.microsoft.com/office/drawing/2014/main" id="{19AF4BCF-6459-4ABB-95F9-CF3ABFCBF6F8}"/>
               </a:ext>
             </a:extLst>
           </p:cNvPr>
@@ -6650,7 +6661,7 @@
           <p:cNvPr id="4" name="Text Placeholder 3">
             <a:extLst>
               <a:ext uri="{FF2B5EF4-FFF2-40B4-BE49-F238E27FC236}">
-                <a16:creationId xmlns:a16="http://schemas.microsoft.com/office/drawing/2014/main" xmlns="" id="{E181315E-DB00-441A-B7B3-9230DE0EA8A3}"/>
+                <a16:creationId xmlns:a16="http://schemas.microsoft.com/office/drawing/2014/main" id="{E181315E-DB00-441A-B7B3-9230DE0EA8A3}"/>
               </a:ext>
             </a:extLst>
           </p:cNvPr>
@@ -6721,7 +6732,7 @@
           <p:cNvPr id="5" name="Date Placeholder 4">
             <a:extLst>
               <a:ext uri="{FF2B5EF4-FFF2-40B4-BE49-F238E27FC236}">
-                <a16:creationId xmlns:a16="http://schemas.microsoft.com/office/drawing/2014/main" xmlns="" id="{4C3447ED-DB28-4BD4-B791-613DC0EBB60E}"/>
+                <a16:creationId xmlns:a16="http://schemas.microsoft.com/office/drawing/2014/main" id="{4C3447ED-DB28-4BD4-B791-613DC0EBB60E}"/>
               </a:ext>
             </a:extLst>
           </p:cNvPr>
@@ -6739,7 +6750,7 @@
           <a:p>
             <a:fld id="{ED531EB9-2735-4D0D-B503-A34BE1BD7081}" type="datetimeFigureOut">
               <a:rPr lang="en-US" smtClean="0"/>
-              <a:t>10/9/2018</a:t>
+              <a:t>10/17/2018</a:t>
             </a:fld>
             <a:endParaRPr lang="en-US"/>
           </a:p>
@@ -6750,7 +6761,7 @@
           <p:cNvPr id="6" name="Footer Placeholder 5">
             <a:extLst>
               <a:ext uri="{FF2B5EF4-FFF2-40B4-BE49-F238E27FC236}">
-                <a16:creationId xmlns:a16="http://schemas.microsoft.com/office/drawing/2014/main" xmlns="" id="{18DAE05C-B4B9-4609-AC42-11DF79DE26FE}"/>
+                <a16:creationId xmlns:a16="http://schemas.microsoft.com/office/drawing/2014/main" id="{18DAE05C-B4B9-4609-AC42-11DF79DE26FE}"/>
               </a:ext>
             </a:extLst>
           </p:cNvPr>
@@ -6775,7 +6786,7 @@
           <p:cNvPr id="7" name="Slide Number Placeholder 6">
             <a:extLst>
               <a:ext uri="{FF2B5EF4-FFF2-40B4-BE49-F238E27FC236}">
-                <a16:creationId xmlns:a16="http://schemas.microsoft.com/office/drawing/2014/main" xmlns="" id="{CD916000-6832-4518-8E63-5D1DB46D6DD3}"/>
+                <a16:creationId xmlns:a16="http://schemas.microsoft.com/office/drawing/2014/main" id="{CD916000-6832-4518-8E63-5D1DB46D6DD3}"/>
               </a:ext>
             </a:extLst>
           </p:cNvPr>
@@ -6839,7 +6850,7 @@
           <p:cNvPr id="2" name="Title Placeholder 1">
             <a:extLst>
               <a:ext uri="{FF2B5EF4-FFF2-40B4-BE49-F238E27FC236}">
-                <a16:creationId xmlns:a16="http://schemas.microsoft.com/office/drawing/2014/main" xmlns="" id="{230BD8F0-C013-4FB5-BFBB-42245948B2DD}"/>
+                <a16:creationId xmlns:a16="http://schemas.microsoft.com/office/drawing/2014/main" id="{230BD8F0-C013-4FB5-BFBB-42245948B2DD}"/>
               </a:ext>
             </a:extLst>
           </p:cNvPr>
@@ -6877,7 +6888,7 @@
           <p:cNvPr id="3" name="Text Placeholder 2">
             <a:extLst>
               <a:ext uri="{FF2B5EF4-FFF2-40B4-BE49-F238E27FC236}">
-                <a16:creationId xmlns:a16="http://schemas.microsoft.com/office/drawing/2014/main" xmlns="" id="{684FB0DE-5E72-4692-9C96-AE20C46F6E38}"/>
+                <a16:creationId xmlns:a16="http://schemas.microsoft.com/office/drawing/2014/main" id="{684FB0DE-5E72-4692-9C96-AE20C46F6E38}"/>
               </a:ext>
             </a:extLst>
           </p:cNvPr>
@@ -6944,7 +6955,7 @@
           <p:cNvPr id="4" name="Date Placeholder 3">
             <a:extLst>
               <a:ext uri="{FF2B5EF4-FFF2-40B4-BE49-F238E27FC236}">
-                <a16:creationId xmlns:a16="http://schemas.microsoft.com/office/drawing/2014/main" xmlns="" id="{48E195C3-6A04-4D33-8818-C3EAD8680C81}"/>
+                <a16:creationId xmlns:a16="http://schemas.microsoft.com/office/drawing/2014/main" id="{48E195C3-6A04-4D33-8818-C3EAD8680C81}"/>
               </a:ext>
             </a:extLst>
           </p:cNvPr>
@@ -6980,7 +6991,7 @@
           <a:p>
             <a:fld id="{ED531EB9-2735-4D0D-B503-A34BE1BD7081}" type="datetimeFigureOut">
               <a:rPr lang="en-US" smtClean="0"/>
-              <a:t>10/9/2018</a:t>
+              <a:t>10/17/2018</a:t>
             </a:fld>
             <a:endParaRPr lang="en-US"/>
           </a:p>
@@ -6991,7 +7002,7 @@
           <p:cNvPr id="5" name="Footer Placeholder 4">
             <a:extLst>
               <a:ext uri="{FF2B5EF4-FFF2-40B4-BE49-F238E27FC236}">
-                <a16:creationId xmlns:a16="http://schemas.microsoft.com/office/drawing/2014/main" xmlns="" id="{884AD3AE-769E-4E43-B09A-24771D10B7D3}"/>
+                <a16:creationId xmlns:a16="http://schemas.microsoft.com/office/drawing/2014/main" id="{884AD3AE-769E-4E43-B09A-24771D10B7D3}"/>
               </a:ext>
             </a:extLst>
           </p:cNvPr>
@@ -7034,7 +7045,7 @@
           <p:cNvPr id="6" name="Slide Number Placeholder 5">
             <a:extLst>
               <a:ext uri="{FF2B5EF4-FFF2-40B4-BE49-F238E27FC236}">
-                <a16:creationId xmlns:a16="http://schemas.microsoft.com/office/drawing/2014/main" xmlns="" id="{3ABA5B2B-AEE3-4CC5-BDDF-77B18360DB1C}"/>
+                <a16:creationId xmlns:a16="http://schemas.microsoft.com/office/drawing/2014/main" id="{3ABA5B2B-AEE3-4CC5-BDDF-77B18360DB1C}"/>
               </a:ext>
             </a:extLst>
           </p:cNvPr>
@@ -7402,7 +7413,7 @@
           <p:cNvPr id="2" name="Title 1">
             <a:extLst>
               <a:ext uri="{FF2B5EF4-FFF2-40B4-BE49-F238E27FC236}">
-                <a16:creationId xmlns:a16="http://schemas.microsoft.com/office/drawing/2014/main" xmlns="" id="{04702D22-722B-42E5-AE9F-7EC3CAFD97B3}"/>
+                <a16:creationId xmlns:a16="http://schemas.microsoft.com/office/drawing/2014/main" id="{04702D22-722B-42E5-AE9F-7EC3CAFD97B3}"/>
               </a:ext>
             </a:extLst>
           </p:cNvPr>
@@ -7430,7 +7441,7 @@
           <p:cNvPr id="3" name="Content Placeholder 2">
             <a:extLst>
               <a:ext uri="{FF2B5EF4-FFF2-40B4-BE49-F238E27FC236}">
-                <a16:creationId xmlns:a16="http://schemas.microsoft.com/office/drawing/2014/main" xmlns="" id="{FC394AFF-1080-4EDA-B7C7-FB8037291835}"/>
+                <a16:creationId xmlns:a16="http://schemas.microsoft.com/office/drawing/2014/main" id="{FC394AFF-1080-4EDA-B7C7-FB8037291835}"/>
               </a:ext>
             </a:extLst>
           </p:cNvPr>
@@ -11849,20 +11860,12 @@
             <a:pPr defTabSz="914363">
               <a:defRPr/>
             </a:pPr>
-            <a:r>
-              <a:rPr lang="en-US" dirty="0"/>
-              <a:t/>
-            </a:r>
             <a:br>
               <a:rPr lang="en-US" dirty="0"/>
             </a:br>
             <a:r>
               <a:rPr lang="en-US" sz="3300" dirty="0"/>
               <a:t>Reporting Services Architecture </a:t>
-            </a:r>
-            <a:r>
-              <a:rPr dirty="0"/>
-              <a:t/>
             </a:r>
             <a:br>
               <a:rPr dirty="0"/>
@@ -13928,7 +13931,7 @@
           <p:cNvPr id="2" name="Title 1">
             <a:extLst>
               <a:ext uri="{FF2B5EF4-FFF2-40B4-BE49-F238E27FC236}">
-                <a16:creationId xmlns:a16="http://schemas.microsoft.com/office/drawing/2014/main" xmlns="" id="{FA5793D3-58B2-4281-A96F-BA01F38E3244}"/>
+                <a16:creationId xmlns:a16="http://schemas.microsoft.com/office/drawing/2014/main" id="{FA5793D3-58B2-4281-A96F-BA01F38E3244}"/>
               </a:ext>
             </a:extLst>
           </p:cNvPr>
@@ -13957,7 +13960,7 @@
           <p:cNvPr id="3" name="Content Placeholder 2">
             <a:extLst>
               <a:ext uri="{FF2B5EF4-FFF2-40B4-BE49-F238E27FC236}">
-                <a16:creationId xmlns:a16="http://schemas.microsoft.com/office/drawing/2014/main" xmlns="" id="{77453D94-D41F-49E4-ABE5-67592C785007}"/>
+                <a16:creationId xmlns:a16="http://schemas.microsoft.com/office/drawing/2014/main" id="{77453D94-D41F-49E4-ABE5-67592C785007}"/>
               </a:ext>
             </a:extLst>
           </p:cNvPr>
@@ -14182,7 +14185,7 @@
           <p:cNvPr id="2" name="Title 1">
             <a:extLst>
               <a:ext uri="{FF2B5EF4-FFF2-40B4-BE49-F238E27FC236}">
-                <a16:creationId xmlns:a16="http://schemas.microsoft.com/office/drawing/2014/main" xmlns="" id="{633D41EB-46BA-4F9F-BB61-7368136E6547}"/>
+                <a16:creationId xmlns:a16="http://schemas.microsoft.com/office/drawing/2014/main" id="{633D41EB-46BA-4F9F-BB61-7368136E6547}"/>
               </a:ext>
             </a:extLst>
           </p:cNvPr>
@@ -14215,7 +14218,7 @@
           <p:cNvPr id="3" name="Content Placeholder 2">
             <a:extLst>
               <a:ext uri="{FF2B5EF4-FFF2-40B4-BE49-F238E27FC236}">
-                <a16:creationId xmlns:a16="http://schemas.microsoft.com/office/drawing/2014/main" xmlns="" id="{BE4882EA-BBB4-47A1-A1E4-D76802568071}"/>
+                <a16:creationId xmlns:a16="http://schemas.microsoft.com/office/drawing/2014/main" id="{BE4882EA-BBB4-47A1-A1E4-D76802568071}"/>
               </a:ext>
             </a:extLst>
           </p:cNvPr>
@@ -14368,7 +14371,7 @@
           <p:cNvPr id="2" name="Title 1">
             <a:extLst>
               <a:ext uri="{FF2B5EF4-FFF2-40B4-BE49-F238E27FC236}">
-                <a16:creationId xmlns:a16="http://schemas.microsoft.com/office/drawing/2014/main" xmlns="" id="{D1AF01A2-2E31-40C5-9DF2-E199B705A9DB}"/>
+                <a16:creationId xmlns:a16="http://schemas.microsoft.com/office/drawing/2014/main" id="{D1AF01A2-2E31-40C5-9DF2-E199B705A9DB}"/>
               </a:ext>
             </a:extLst>
           </p:cNvPr>
@@ -14397,7 +14400,7 @@
           <p:cNvPr id="3" name="Content Placeholder 2">
             <a:extLst>
               <a:ext uri="{FF2B5EF4-FFF2-40B4-BE49-F238E27FC236}">
-                <a16:creationId xmlns:a16="http://schemas.microsoft.com/office/drawing/2014/main" xmlns="" id="{8725EF96-FD22-4082-9173-20DB5F3A7E55}"/>
+                <a16:creationId xmlns:a16="http://schemas.microsoft.com/office/drawing/2014/main" id="{8725EF96-FD22-4082-9173-20DB5F3A7E55}"/>
               </a:ext>
             </a:extLst>
           </p:cNvPr>
@@ -14729,7 +14732,7 @@
           <p:cNvPr id="2" name="Title 1">
             <a:extLst>
               <a:ext uri="{FF2B5EF4-FFF2-40B4-BE49-F238E27FC236}">
-                <a16:creationId xmlns:a16="http://schemas.microsoft.com/office/drawing/2014/main" xmlns="" id="{E9503FD7-3B4B-4CF3-B434-1184729BC95B}"/>
+                <a16:creationId xmlns:a16="http://schemas.microsoft.com/office/drawing/2014/main" id="{E9503FD7-3B4B-4CF3-B434-1184729BC95B}"/>
               </a:ext>
             </a:extLst>
           </p:cNvPr>
@@ -14762,7 +14765,7 @@
           <p:cNvPr id="3" name="Content Placeholder 2">
             <a:extLst>
               <a:ext uri="{FF2B5EF4-FFF2-40B4-BE49-F238E27FC236}">
-                <a16:creationId xmlns:a16="http://schemas.microsoft.com/office/drawing/2014/main" xmlns="" id="{222BC1EE-D42D-4F42-8711-A892FB056FF5}"/>
+                <a16:creationId xmlns:a16="http://schemas.microsoft.com/office/drawing/2014/main" id="{222BC1EE-D42D-4F42-8711-A892FB056FF5}"/>
               </a:ext>
             </a:extLst>
           </p:cNvPr>
@@ -17199,7 +17202,7 @@
           <p:cNvPr id="2" name="Title 1">
             <a:extLst>
               <a:ext uri="{FF2B5EF4-FFF2-40B4-BE49-F238E27FC236}">
-                <a16:creationId xmlns:a16="http://schemas.microsoft.com/office/drawing/2014/main" xmlns="" id="{336387BC-48D4-4FF8-B67E-F5F171040C5D}"/>
+                <a16:creationId xmlns:a16="http://schemas.microsoft.com/office/drawing/2014/main" id="{336387BC-48D4-4FF8-B67E-F5F171040C5D}"/>
               </a:ext>
             </a:extLst>
           </p:cNvPr>
@@ -17227,7 +17230,7 @@
           <p:cNvPr id="5122" name="Picture 2" descr="Reporting tools cover a small part of the Business Intelligence field">
             <a:extLst>
               <a:ext uri="{FF2B5EF4-FFF2-40B4-BE49-F238E27FC236}">
-                <a16:creationId xmlns:a16="http://schemas.microsoft.com/office/drawing/2014/main" xmlns="" id="{9D38265C-2878-47A0-91C9-25E1F9A73178}"/>
+                <a16:creationId xmlns:a16="http://schemas.microsoft.com/office/drawing/2014/main" id="{9D38265C-2878-47A0-91C9-25E1F9A73178}"/>
               </a:ext>
             </a:extLst>
           </p:cNvPr>
@@ -19250,14 +19253,6 @@
   <p:clrMapOvr>
     <a:masterClrMapping/>
   </p:clrMapOvr>
-  <mc:AlternateContent xmlns:mc="http://schemas.openxmlformats.org/markup-compatibility/2006">
-    <mc:Choice xmlns:p14="http://schemas.microsoft.com/office/powerpoint/2010/main" Requires="p14">
-      <p:transition spd="slow" p14:dur="2000"/>
-    </mc:Choice>
-    <mc:Fallback>
-      <p:transition spd="slow"/>
-    </mc:Fallback>
-  </mc:AlternateContent>
 </p:sld>
 </file>
 
@@ -19660,7 +19655,7 @@
           <p:cNvPr id="71682" name="Rectangle 2">
             <a:extLst>
               <a:ext uri="{FF2B5EF4-FFF2-40B4-BE49-F238E27FC236}">
-                <a16:creationId xmlns:a16="http://schemas.microsoft.com/office/drawing/2014/main" xmlns="" id="{8799C632-CEC6-4224-B4F4-D76146FEED38}"/>
+                <a16:creationId xmlns:a16="http://schemas.microsoft.com/office/drawing/2014/main" id="{8799C632-CEC6-4224-B4F4-D76146FEED38}"/>
               </a:ext>
             </a:extLst>
           </p:cNvPr>
@@ -19688,7 +19683,7 @@
           <p:cNvPr id="71683" name="Rectangle 3">
             <a:extLst>
               <a:ext uri="{FF2B5EF4-FFF2-40B4-BE49-F238E27FC236}">
-                <a16:creationId xmlns:a16="http://schemas.microsoft.com/office/drawing/2014/main" xmlns="" id="{71B1096B-53CF-49C9-8D74-853D7DF4502B}"/>
+                <a16:creationId xmlns:a16="http://schemas.microsoft.com/office/drawing/2014/main" id="{71B1096B-53CF-49C9-8D74-853D7DF4502B}"/>
               </a:ext>
             </a:extLst>
           </p:cNvPr>
@@ -19781,7 +19776,7 @@
           <p:cNvPr id="51202" name="Rectangle 2">
             <a:extLst>
               <a:ext uri="{FF2B5EF4-FFF2-40B4-BE49-F238E27FC236}">
-                <a16:creationId xmlns:a16="http://schemas.microsoft.com/office/drawing/2014/main" xmlns="" id="{780A1680-503E-4076-ADD9-088034C14254}"/>
+                <a16:creationId xmlns:a16="http://schemas.microsoft.com/office/drawing/2014/main" id="{780A1680-503E-4076-ADD9-088034C14254}"/>
               </a:ext>
             </a:extLst>
           </p:cNvPr>
@@ -19809,7 +19804,7 @@
           <p:cNvPr id="51227" name="Rectangle 27">
             <a:extLst>
               <a:ext uri="{FF2B5EF4-FFF2-40B4-BE49-F238E27FC236}">
-                <a16:creationId xmlns:a16="http://schemas.microsoft.com/office/drawing/2014/main" xmlns="" id="{1383F136-C6B0-49EA-8946-52840B0CE23E}"/>
+                <a16:creationId xmlns:a16="http://schemas.microsoft.com/office/drawing/2014/main" id="{1383F136-C6B0-49EA-8946-52840B0CE23E}"/>
               </a:ext>
             </a:extLst>
           </p:cNvPr>
@@ -19873,7 +19868,7 @@
           <p:cNvPr id="51228" name="Rectangle 28">
             <a:extLst>
               <a:ext uri="{FF2B5EF4-FFF2-40B4-BE49-F238E27FC236}">
-                <a16:creationId xmlns:a16="http://schemas.microsoft.com/office/drawing/2014/main" xmlns="" id="{FE3B8C10-B409-4C93-9899-65AF9A26BA3B}"/>
+                <a16:creationId xmlns:a16="http://schemas.microsoft.com/office/drawing/2014/main" id="{FE3B8C10-B409-4C93-9899-65AF9A26BA3B}"/>
               </a:ext>
             </a:extLst>
           </p:cNvPr>
@@ -19951,7 +19946,7 @@
           <p:cNvPr id="51229" name="Group 29">
             <a:extLst>
               <a:ext uri="{FF2B5EF4-FFF2-40B4-BE49-F238E27FC236}">
-                <a16:creationId xmlns:a16="http://schemas.microsoft.com/office/drawing/2014/main" xmlns="" id="{BD8349C6-537F-45FD-8F3B-9B2ED0B074BE}"/>
+                <a16:creationId xmlns:a16="http://schemas.microsoft.com/office/drawing/2014/main" id="{BD8349C6-537F-45FD-8F3B-9B2ED0B074BE}"/>
               </a:ext>
             </a:extLst>
           </p:cNvPr>
@@ -19973,7 +19968,7 @@
             <p:cNvPr id="51230" name="AutoShape 30">
               <a:extLst>
                 <a:ext uri="{FF2B5EF4-FFF2-40B4-BE49-F238E27FC236}">
-                  <a16:creationId xmlns:a16="http://schemas.microsoft.com/office/drawing/2014/main" xmlns="" id="{FB100BC7-3775-4E7F-9AB8-6974E1DEC951}"/>
+                  <a16:creationId xmlns:a16="http://schemas.microsoft.com/office/drawing/2014/main" id="{FB100BC7-3775-4E7F-9AB8-6974E1DEC951}"/>
                 </a:ext>
               </a:extLst>
             </p:cNvPr>
@@ -20039,7 +20034,7 @@
             <p:cNvPr id="51231" name="Rectangle 31">
               <a:extLst>
                 <a:ext uri="{FF2B5EF4-FFF2-40B4-BE49-F238E27FC236}">
-                  <a16:creationId xmlns:a16="http://schemas.microsoft.com/office/drawing/2014/main" xmlns="" id="{0846256A-8C9C-4B3D-9C9F-6C2EDC487C5F}"/>
+                  <a16:creationId xmlns:a16="http://schemas.microsoft.com/office/drawing/2014/main" id="{0846256A-8C9C-4B3D-9C9F-6C2EDC487C5F}"/>
                 </a:ext>
               </a:extLst>
             </p:cNvPr>
@@ -20116,7 +20111,7 @@
             <p:cNvPr id="51232" name="Object 32">
               <a:extLst>
                 <a:ext uri="{FF2B5EF4-FFF2-40B4-BE49-F238E27FC236}">
-                  <a16:creationId xmlns:a16="http://schemas.microsoft.com/office/drawing/2014/main" xmlns="" id="{ABEC2461-EF5C-4211-913D-C2D3BA23B560}"/>
+                  <a16:creationId xmlns:a16="http://schemas.microsoft.com/office/drawing/2014/main" id="{ABEC2461-EF5C-4211-913D-C2D3BA23B560}"/>
                 </a:ext>
               </a:extLst>
             </p:cNvPr>
@@ -20133,7 +20128,7 @@
             <a:graphicData uri="http://schemas.openxmlformats.org/presentationml/2006/ole">
               <mc:AlternateContent xmlns:mc="http://schemas.openxmlformats.org/markup-compatibility/2006">
                 <mc:Choice xmlns:v="urn:schemas-microsoft-com:vml" Requires="v">
-                  <p:oleObj spid="_x0000_s1146" name="Bitmap Image" r:id="rId3" imgW="485586" imgH="476316" progId="Paint.Picture">
+                  <p:oleObj spid="_x0000_s1148" name="Bitmap Image" r:id="rId3" imgW="485586" imgH="476316" progId="Paint.Picture">
                     <p:embed/>
                   </p:oleObj>
                 </mc:Choice>
@@ -20145,7 +20140,7 @@
                         <p:cNvPr id="51232" name="Object 32">
                           <a:extLst>
                             <a:ext uri="{FF2B5EF4-FFF2-40B4-BE49-F238E27FC236}">
-                              <a16:creationId xmlns:a16="http://schemas.microsoft.com/office/drawing/2014/main" xmlns="" id="{ABEC2461-EF5C-4211-913D-C2D3BA23B560}"/>
+                              <a16:creationId xmlns:a16="http://schemas.microsoft.com/office/drawing/2014/main" id="{ABEC2461-EF5C-4211-913D-C2D3BA23B560}"/>
                             </a:ext>
                           </a:extLst>
                         </p:cNvPr>
@@ -20221,7 +20216,7 @@
             <p:cNvPr id="51233" name="Object 33">
               <a:extLst>
                 <a:ext uri="{FF2B5EF4-FFF2-40B4-BE49-F238E27FC236}">
-                  <a16:creationId xmlns:a16="http://schemas.microsoft.com/office/drawing/2014/main" xmlns="" id="{A2BEB91C-6A5D-4586-80CA-AC5C6D845E67}"/>
+                  <a16:creationId xmlns:a16="http://schemas.microsoft.com/office/drawing/2014/main" id="{A2BEB91C-6A5D-4586-80CA-AC5C6D845E67}"/>
                 </a:ext>
               </a:extLst>
             </p:cNvPr>
@@ -20238,7 +20233,7 @@
             <a:graphicData uri="http://schemas.openxmlformats.org/presentationml/2006/ole">
               <mc:AlternateContent xmlns:mc="http://schemas.openxmlformats.org/markup-compatibility/2006">
                 <mc:Choice xmlns:v="urn:schemas-microsoft-com:vml" Requires="v">
-                  <p:oleObj spid="_x0000_s1147" name="Bitmap Image" r:id="rId5" imgW="380852" imgH="485586" progId="Paint.Picture">
+                  <p:oleObj spid="_x0000_s1149" name="Bitmap Image" r:id="rId5" imgW="380852" imgH="485586" progId="Paint.Picture">
                     <p:embed/>
                   </p:oleObj>
                 </mc:Choice>
@@ -20250,7 +20245,7 @@
                         <p:cNvPr id="51233" name="Object 33">
                           <a:extLst>
                             <a:ext uri="{FF2B5EF4-FFF2-40B4-BE49-F238E27FC236}">
-                              <a16:creationId xmlns:a16="http://schemas.microsoft.com/office/drawing/2014/main" xmlns="" id="{A2BEB91C-6A5D-4586-80CA-AC5C6D845E67}"/>
+                              <a16:creationId xmlns:a16="http://schemas.microsoft.com/office/drawing/2014/main" id="{A2BEB91C-6A5D-4586-80CA-AC5C6D845E67}"/>
                             </a:ext>
                           </a:extLst>
                         </p:cNvPr>
@@ -20326,7 +20321,7 @@
             <p:cNvPr id="51234" name="Picture 34">
               <a:extLst>
                 <a:ext uri="{FF2B5EF4-FFF2-40B4-BE49-F238E27FC236}">
-                  <a16:creationId xmlns:a16="http://schemas.microsoft.com/office/drawing/2014/main" xmlns="" id="{334B673E-6352-44D2-85A6-7A61380F70E6}"/>
+                  <a16:creationId xmlns:a16="http://schemas.microsoft.com/office/drawing/2014/main" id="{334B673E-6352-44D2-85A6-7A61380F70E6}"/>
                 </a:ext>
               </a:extLst>
             </p:cNvPr>
@@ -20374,7 +20369,7 @@
           <p:cNvPr id="51235" name="Freeform 35">
             <a:extLst>
               <a:ext uri="{FF2B5EF4-FFF2-40B4-BE49-F238E27FC236}">
-                <a16:creationId xmlns:a16="http://schemas.microsoft.com/office/drawing/2014/main" xmlns="" id="{04FE9CCE-0566-4503-A139-64C513A89ABA}"/>
+                <a16:creationId xmlns:a16="http://schemas.microsoft.com/office/drawing/2014/main" id="{04FE9CCE-0566-4503-A139-64C513A89ABA}"/>
               </a:ext>
             </a:extLst>
           </p:cNvPr>
@@ -20540,7 +20535,7 @@
           <p:cNvPr id="51236" name="Picture 36" descr="Database01">
             <a:extLst>
               <a:ext uri="{FF2B5EF4-FFF2-40B4-BE49-F238E27FC236}">
-                <a16:creationId xmlns:a16="http://schemas.microsoft.com/office/drawing/2014/main" xmlns="" id="{ED7A0487-87CD-4D57-B9FB-9E1FE0A77C75}"/>
+                <a16:creationId xmlns:a16="http://schemas.microsoft.com/office/drawing/2014/main" id="{ED7A0487-87CD-4D57-B9FB-9E1FE0A77C75}"/>
               </a:ext>
             </a:extLst>
           </p:cNvPr>
@@ -20587,7 +20582,7 @@
           <p:cNvPr id="51237" name="Group 37">
             <a:extLst>
               <a:ext uri="{FF2B5EF4-FFF2-40B4-BE49-F238E27FC236}">
-                <a16:creationId xmlns:a16="http://schemas.microsoft.com/office/drawing/2014/main" xmlns="" id="{24CDC1DB-55E5-440A-8B00-D40B353E09A6}"/>
+                <a16:creationId xmlns:a16="http://schemas.microsoft.com/office/drawing/2014/main" id="{24CDC1DB-55E5-440A-8B00-D40B353E09A6}"/>
               </a:ext>
             </a:extLst>
           </p:cNvPr>
@@ -20609,7 +20604,7 @@
             <p:cNvPr id="51238" name="AutoShape 38">
               <a:extLst>
                 <a:ext uri="{FF2B5EF4-FFF2-40B4-BE49-F238E27FC236}">
-                  <a16:creationId xmlns:a16="http://schemas.microsoft.com/office/drawing/2014/main" xmlns="" id="{B1449A9D-713C-4D91-9E51-62BF6170A301}"/>
+                  <a16:creationId xmlns:a16="http://schemas.microsoft.com/office/drawing/2014/main" id="{B1449A9D-713C-4D91-9E51-62BF6170A301}"/>
                 </a:ext>
               </a:extLst>
             </p:cNvPr>
@@ -20675,7 +20670,7 @@
             <p:cNvPr id="51239" name="Rectangle 39">
               <a:extLst>
                 <a:ext uri="{FF2B5EF4-FFF2-40B4-BE49-F238E27FC236}">
-                  <a16:creationId xmlns:a16="http://schemas.microsoft.com/office/drawing/2014/main" xmlns="" id="{B28C1F0F-6485-48B7-ADD2-5FA2734F7507}"/>
+                  <a16:creationId xmlns:a16="http://schemas.microsoft.com/office/drawing/2014/main" id="{B28C1F0F-6485-48B7-ADD2-5FA2734F7507}"/>
                 </a:ext>
               </a:extLst>
             </p:cNvPr>
@@ -20752,7 +20747,7 @@
             <p:cNvPr id="51240" name="Picture 40" descr="Database01">
               <a:extLst>
                 <a:ext uri="{FF2B5EF4-FFF2-40B4-BE49-F238E27FC236}">
-                  <a16:creationId xmlns:a16="http://schemas.microsoft.com/office/drawing/2014/main" xmlns="" id="{FDF2E21E-4342-4ED9-BB93-81FE4BE54FC2}"/>
+                  <a16:creationId xmlns:a16="http://schemas.microsoft.com/office/drawing/2014/main" id="{FDF2E21E-4342-4ED9-BB93-81FE4BE54FC2}"/>
                 </a:ext>
               </a:extLst>
             </p:cNvPr>
@@ -20799,7 +20794,7 @@
             <p:cNvPr id="51241" name="Picture 41" descr="Documen_Writing01">
               <a:extLst>
                 <a:ext uri="{FF2B5EF4-FFF2-40B4-BE49-F238E27FC236}">
-                  <a16:creationId xmlns:a16="http://schemas.microsoft.com/office/drawing/2014/main" xmlns="" id="{71681EA5-A338-4B5D-A0A0-C3ABDFCDA526}"/>
+                  <a16:creationId xmlns:a16="http://schemas.microsoft.com/office/drawing/2014/main" id="{71681EA5-A338-4B5D-A0A0-C3ABDFCDA526}"/>
                 </a:ext>
               </a:extLst>
             </p:cNvPr>
@@ -20847,7 +20842,7 @@
           <p:cNvPr id="51242" name="Freeform 42">
             <a:extLst>
               <a:ext uri="{FF2B5EF4-FFF2-40B4-BE49-F238E27FC236}">
-                <a16:creationId xmlns:a16="http://schemas.microsoft.com/office/drawing/2014/main" xmlns="" id="{B5E50B5F-FA86-44D1-A4E4-C532EBFB842E}"/>
+                <a16:creationId xmlns:a16="http://schemas.microsoft.com/office/drawing/2014/main" id="{B5E50B5F-FA86-44D1-A4E4-C532EBFB842E}"/>
               </a:ext>
             </a:extLst>
           </p:cNvPr>
@@ -21013,7 +21008,7 @@
           <p:cNvPr id="51243" name="Picture 43" descr="Database01">
             <a:extLst>
               <a:ext uri="{FF2B5EF4-FFF2-40B4-BE49-F238E27FC236}">
-                <a16:creationId xmlns:a16="http://schemas.microsoft.com/office/drawing/2014/main" xmlns="" id="{F02DCBDC-7A4A-4A81-977E-2D50DC44D2B9}"/>
+                <a16:creationId xmlns:a16="http://schemas.microsoft.com/office/drawing/2014/main" id="{F02DCBDC-7A4A-4A81-977E-2D50DC44D2B9}"/>
               </a:ext>
             </a:extLst>
           </p:cNvPr>
@@ -21060,7 +21055,7 @@
           <p:cNvPr id="51244" name="Group 44">
             <a:extLst>
               <a:ext uri="{FF2B5EF4-FFF2-40B4-BE49-F238E27FC236}">
-                <a16:creationId xmlns:a16="http://schemas.microsoft.com/office/drawing/2014/main" xmlns="" id="{7DEBA9BC-3A4A-44DD-BA4C-BC0B9AA2DB19}"/>
+                <a16:creationId xmlns:a16="http://schemas.microsoft.com/office/drawing/2014/main" id="{7DEBA9BC-3A4A-44DD-BA4C-BC0B9AA2DB19}"/>
               </a:ext>
             </a:extLst>
           </p:cNvPr>
@@ -21082,7 +21077,7 @@
             <p:cNvPr id="51245" name="AutoShape 45">
               <a:extLst>
                 <a:ext uri="{FF2B5EF4-FFF2-40B4-BE49-F238E27FC236}">
-                  <a16:creationId xmlns:a16="http://schemas.microsoft.com/office/drawing/2014/main" xmlns="" id="{4AB8B371-5A1E-4630-AF7E-4E8228A1D60E}"/>
+                  <a16:creationId xmlns:a16="http://schemas.microsoft.com/office/drawing/2014/main" id="{4AB8B371-5A1E-4630-AF7E-4E8228A1D60E}"/>
                 </a:ext>
               </a:extLst>
             </p:cNvPr>
@@ -21148,7 +21143,7 @@
             <p:cNvPr id="51246" name="Rectangle 46">
               <a:extLst>
                 <a:ext uri="{FF2B5EF4-FFF2-40B4-BE49-F238E27FC236}">
-                  <a16:creationId xmlns:a16="http://schemas.microsoft.com/office/drawing/2014/main" xmlns="" id="{CAB6BA6A-C915-4523-A8A7-07994C53D5EA}"/>
+                  <a16:creationId xmlns:a16="http://schemas.microsoft.com/office/drawing/2014/main" id="{CAB6BA6A-C915-4523-A8A7-07994C53D5EA}"/>
                 </a:ext>
               </a:extLst>
             </p:cNvPr>
@@ -21225,7 +21220,7 @@
             <p:cNvPr id="51247" name="Picture 47" descr="Documen_Writing01">
               <a:extLst>
                 <a:ext uri="{FF2B5EF4-FFF2-40B4-BE49-F238E27FC236}">
-                  <a16:creationId xmlns:a16="http://schemas.microsoft.com/office/drawing/2014/main" xmlns="" id="{88DB531B-02C8-4788-B541-C96795A97C61}"/>
+                  <a16:creationId xmlns:a16="http://schemas.microsoft.com/office/drawing/2014/main" id="{88DB531B-02C8-4788-B541-C96795A97C61}"/>
                 </a:ext>
               </a:extLst>
             </p:cNvPr>
@@ -21273,7 +21268,7 @@
           <p:cNvPr id="51248" name="Line 48">
             <a:extLst>
               <a:ext uri="{FF2B5EF4-FFF2-40B4-BE49-F238E27FC236}">
-                <a16:creationId xmlns:a16="http://schemas.microsoft.com/office/drawing/2014/main" xmlns="" id="{D587C875-FE44-4763-A8EB-19EA87E6CA3D}"/>
+                <a16:creationId xmlns:a16="http://schemas.microsoft.com/office/drawing/2014/main" id="{D587C875-FE44-4763-A8EB-19EA87E6CA3D}"/>
               </a:ext>
             </a:extLst>
           </p:cNvPr>
@@ -21330,7 +21325,7 @@
           <p:cNvPr id="51249" name="AutoShape 49">
             <a:extLst>
               <a:ext uri="{FF2B5EF4-FFF2-40B4-BE49-F238E27FC236}">
-                <a16:creationId xmlns:a16="http://schemas.microsoft.com/office/drawing/2014/main" xmlns="" id="{491084E3-E9A2-45A3-9EC2-8A23349B74BA}"/>
+                <a16:creationId xmlns:a16="http://schemas.microsoft.com/office/drawing/2014/main" id="{491084E3-E9A2-45A3-9EC2-8A23349B74BA}"/>
               </a:ext>
             </a:extLst>
           </p:cNvPr>
@@ -21685,7 +21680,7 @@
           <p:cNvPr id="52226" name="Rectangle 2">
             <a:extLst>
               <a:ext uri="{FF2B5EF4-FFF2-40B4-BE49-F238E27FC236}">
-                <a16:creationId xmlns:a16="http://schemas.microsoft.com/office/drawing/2014/main" xmlns="" id="{9A61EC25-2029-4DCF-A1B7-0B446F8C4740}"/>
+                <a16:creationId xmlns:a16="http://schemas.microsoft.com/office/drawing/2014/main" id="{9A61EC25-2029-4DCF-A1B7-0B446F8C4740}"/>
               </a:ext>
             </a:extLst>
           </p:cNvPr>
@@ -21713,7 +21708,7 @@
           <p:cNvPr id="52227" name="Rectangle 3">
             <a:extLst>
               <a:ext uri="{FF2B5EF4-FFF2-40B4-BE49-F238E27FC236}">
-                <a16:creationId xmlns:a16="http://schemas.microsoft.com/office/drawing/2014/main" xmlns="" id="{B51E3FE4-C63A-4252-B5EF-DCF248AFBA0C}"/>
+                <a16:creationId xmlns:a16="http://schemas.microsoft.com/office/drawing/2014/main" id="{B51E3FE4-C63A-4252-B5EF-DCF248AFBA0C}"/>
               </a:ext>
             </a:extLst>
           </p:cNvPr>
@@ -21789,7 +21784,7 @@
           <p:cNvPr id="52228" name="Line 4">
             <a:extLst>
               <a:ext uri="{FF2B5EF4-FFF2-40B4-BE49-F238E27FC236}">
-                <a16:creationId xmlns:a16="http://schemas.microsoft.com/office/drawing/2014/main" xmlns="" id="{3F37FE0A-FA0B-422C-84C6-848F1654DE75}"/>
+                <a16:creationId xmlns:a16="http://schemas.microsoft.com/office/drawing/2014/main" id="{3F37FE0A-FA0B-422C-84C6-848F1654DE75}"/>
               </a:ext>
             </a:extLst>
           </p:cNvPr>
@@ -21846,7 +21841,7 @@
           <p:cNvPr id="52229" name="AutoShape 5">
             <a:extLst>
               <a:ext uri="{FF2B5EF4-FFF2-40B4-BE49-F238E27FC236}">
-                <a16:creationId xmlns:a16="http://schemas.microsoft.com/office/drawing/2014/main" xmlns="" id="{A969B69D-6BD9-4086-9FC2-76DAC42D2D8D}"/>
+                <a16:creationId xmlns:a16="http://schemas.microsoft.com/office/drawing/2014/main" id="{A969B69D-6BD9-4086-9FC2-76DAC42D2D8D}"/>
               </a:ext>
             </a:extLst>
           </p:cNvPr>
@@ -21916,7 +21911,7 @@
           <p:cNvPr id="52230" name="Group 6">
             <a:extLst>
               <a:ext uri="{FF2B5EF4-FFF2-40B4-BE49-F238E27FC236}">
-                <a16:creationId xmlns:a16="http://schemas.microsoft.com/office/drawing/2014/main" xmlns="" id="{4102DFC3-60AD-474E-BE9B-E533A4387F23}"/>
+                <a16:creationId xmlns:a16="http://schemas.microsoft.com/office/drawing/2014/main" id="{4102DFC3-60AD-474E-BE9B-E533A4387F23}"/>
               </a:ext>
             </a:extLst>
           </p:cNvPr>
@@ -21938,7 +21933,7 @@
             <p:cNvPr id="52231" name="AutoShape 7">
               <a:extLst>
                 <a:ext uri="{FF2B5EF4-FFF2-40B4-BE49-F238E27FC236}">
-                  <a16:creationId xmlns:a16="http://schemas.microsoft.com/office/drawing/2014/main" xmlns="" id="{8C6D6E16-C370-4349-AD19-1466399099FF}"/>
+                  <a16:creationId xmlns:a16="http://schemas.microsoft.com/office/drawing/2014/main" id="{8C6D6E16-C370-4349-AD19-1466399099FF}"/>
                 </a:ext>
               </a:extLst>
             </p:cNvPr>
@@ -22008,7 +22003,7 @@
             <p:cNvPr id="52232" name="AutoShape 8">
               <a:extLst>
                 <a:ext uri="{FF2B5EF4-FFF2-40B4-BE49-F238E27FC236}">
-                  <a16:creationId xmlns:a16="http://schemas.microsoft.com/office/drawing/2014/main" xmlns="" id="{3783A94C-0A31-4A19-BB23-9E4524C5F8CF}"/>
+                  <a16:creationId xmlns:a16="http://schemas.microsoft.com/office/drawing/2014/main" id="{3783A94C-0A31-4A19-BB23-9E4524C5F8CF}"/>
                 </a:ext>
               </a:extLst>
             </p:cNvPr>
@@ -22060,7 +22055,7 @@
           <p:cNvPr id="52233" name="Text Box 9">
             <a:extLst>
               <a:ext uri="{FF2B5EF4-FFF2-40B4-BE49-F238E27FC236}">
-                <a16:creationId xmlns:a16="http://schemas.microsoft.com/office/drawing/2014/main" xmlns="" id="{7E7C7337-9B13-42F5-9B3B-0B8565E5FAB6}"/>
+                <a16:creationId xmlns:a16="http://schemas.microsoft.com/office/drawing/2014/main" id="{7E7C7337-9B13-42F5-9B3B-0B8565E5FAB6}"/>
               </a:ext>
             </a:extLst>
           </p:cNvPr>
@@ -22136,7 +22131,7 @@
           <p:cNvPr id="52234" name="Text Box 10">
             <a:extLst>
               <a:ext uri="{FF2B5EF4-FFF2-40B4-BE49-F238E27FC236}">
-                <a16:creationId xmlns:a16="http://schemas.microsoft.com/office/drawing/2014/main" xmlns="" id="{B9380DA2-5425-4A3A-8599-82BD9ED67F16}"/>
+                <a16:creationId xmlns:a16="http://schemas.microsoft.com/office/drawing/2014/main" id="{B9380DA2-5425-4A3A-8599-82BD9ED67F16}"/>
               </a:ext>
             </a:extLst>
           </p:cNvPr>
@@ -22212,7 +22207,7 @@
           <p:cNvPr id="52235" name="Group 11">
             <a:extLst>
               <a:ext uri="{FF2B5EF4-FFF2-40B4-BE49-F238E27FC236}">
-                <a16:creationId xmlns:a16="http://schemas.microsoft.com/office/drawing/2014/main" xmlns="" id="{D191560D-6C9B-4937-9C95-B6D24D172A3A}"/>
+                <a16:creationId xmlns:a16="http://schemas.microsoft.com/office/drawing/2014/main" id="{D191560D-6C9B-4937-9C95-B6D24D172A3A}"/>
               </a:ext>
             </a:extLst>
           </p:cNvPr>
@@ -22234,7 +22229,7 @@
             <p:cNvPr id="52236" name="Group 12">
               <a:extLst>
                 <a:ext uri="{FF2B5EF4-FFF2-40B4-BE49-F238E27FC236}">
-                  <a16:creationId xmlns:a16="http://schemas.microsoft.com/office/drawing/2014/main" xmlns="" id="{D7EF54D1-0A51-47DD-8FA3-07504872F8F7}"/>
+                  <a16:creationId xmlns:a16="http://schemas.microsoft.com/office/drawing/2014/main" id="{D7EF54D1-0A51-47DD-8FA3-07504872F8F7}"/>
                 </a:ext>
               </a:extLst>
             </p:cNvPr>
@@ -22256,7 +22251,7 @@
               <p:cNvPr id="52237" name="AutoShape 13">
                 <a:extLst>
                   <a:ext uri="{FF2B5EF4-FFF2-40B4-BE49-F238E27FC236}">
-                    <a16:creationId xmlns:a16="http://schemas.microsoft.com/office/drawing/2014/main" xmlns="" id="{A288918C-D774-4A8D-B8C1-BBD875A733E4}"/>
+                    <a16:creationId xmlns:a16="http://schemas.microsoft.com/office/drawing/2014/main" id="{A288918C-D774-4A8D-B8C1-BBD875A733E4}"/>
                   </a:ext>
                 </a:extLst>
               </p:cNvPr>
@@ -22322,7 +22317,7 @@
               <p:cNvPr id="52238" name="Rectangle 14">
                 <a:extLst>
                   <a:ext uri="{FF2B5EF4-FFF2-40B4-BE49-F238E27FC236}">
-                    <a16:creationId xmlns:a16="http://schemas.microsoft.com/office/drawing/2014/main" xmlns="" id="{758AB751-E3DE-4E2C-8C92-C1BE9B6733C3}"/>
+                    <a16:creationId xmlns:a16="http://schemas.microsoft.com/office/drawing/2014/main" id="{758AB751-E3DE-4E2C-8C92-C1BE9B6733C3}"/>
                   </a:ext>
                 </a:extLst>
               </p:cNvPr>
@@ -22399,7 +22394,7 @@
               <p:cNvPr id="52239" name="Object 15">
                 <a:extLst>
                   <a:ext uri="{FF2B5EF4-FFF2-40B4-BE49-F238E27FC236}">
-                    <a16:creationId xmlns:a16="http://schemas.microsoft.com/office/drawing/2014/main" xmlns="" id="{95A520FF-5021-43A5-9553-DEC32A55A030}"/>
+                    <a16:creationId xmlns:a16="http://schemas.microsoft.com/office/drawing/2014/main" id="{95A520FF-5021-43A5-9553-DEC32A55A030}"/>
                   </a:ext>
                 </a:extLst>
               </p:cNvPr>
@@ -22416,7 +22411,7 @@
               <a:graphicData uri="http://schemas.openxmlformats.org/presentationml/2006/ole">
                 <mc:AlternateContent xmlns:mc="http://schemas.openxmlformats.org/markup-compatibility/2006">
                   <mc:Choice xmlns:v="urn:schemas-microsoft-com:vml" Requires="v">
-                    <p:oleObj spid="_x0000_s2170" name="Bitmap Image" r:id="rId4" imgW="485586" imgH="476316" progId="Paint.Picture">
+                    <p:oleObj spid="_x0000_s2172" name="Bitmap Image" r:id="rId4" imgW="485586" imgH="476316" progId="Paint.Picture">
                       <p:embed/>
                     </p:oleObj>
                   </mc:Choice>
@@ -22428,7 +22423,7 @@
                           <p:cNvPr id="52239" name="Object 15">
                             <a:extLst>
                               <a:ext uri="{FF2B5EF4-FFF2-40B4-BE49-F238E27FC236}">
-                                <a16:creationId xmlns:a16="http://schemas.microsoft.com/office/drawing/2014/main" xmlns="" id="{95A520FF-5021-43A5-9553-DEC32A55A030}"/>
+                                <a16:creationId xmlns:a16="http://schemas.microsoft.com/office/drawing/2014/main" id="{95A520FF-5021-43A5-9553-DEC32A55A030}"/>
                               </a:ext>
                             </a:extLst>
                           </p:cNvPr>
@@ -22504,7 +22499,7 @@
               <p:cNvPr id="52240" name="Object 16">
                 <a:extLst>
                   <a:ext uri="{FF2B5EF4-FFF2-40B4-BE49-F238E27FC236}">
-                    <a16:creationId xmlns:a16="http://schemas.microsoft.com/office/drawing/2014/main" xmlns="" id="{94337BEB-C658-44A1-AE25-D98933CA3B26}"/>
+                    <a16:creationId xmlns:a16="http://schemas.microsoft.com/office/drawing/2014/main" id="{94337BEB-C658-44A1-AE25-D98933CA3B26}"/>
                   </a:ext>
                 </a:extLst>
               </p:cNvPr>
@@ -22521,7 +22516,7 @@
               <a:graphicData uri="http://schemas.openxmlformats.org/presentationml/2006/ole">
                 <mc:AlternateContent xmlns:mc="http://schemas.openxmlformats.org/markup-compatibility/2006">
                   <mc:Choice xmlns:v="urn:schemas-microsoft-com:vml" Requires="v">
-                    <p:oleObj spid="_x0000_s2171" name="Bitmap Image" r:id="rId6" imgW="380852" imgH="485586" progId="Paint.Picture">
+                    <p:oleObj spid="_x0000_s2173" name="Bitmap Image" r:id="rId6" imgW="380852" imgH="485586" progId="Paint.Picture">
                       <p:embed/>
                     </p:oleObj>
                   </mc:Choice>
@@ -22533,7 +22528,7 @@
                           <p:cNvPr id="52240" name="Object 16">
                             <a:extLst>
                               <a:ext uri="{FF2B5EF4-FFF2-40B4-BE49-F238E27FC236}">
-                                <a16:creationId xmlns:a16="http://schemas.microsoft.com/office/drawing/2014/main" xmlns="" id="{94337BEB-C658-44A1-AE25-D98933CA3B26}"/>
+                                <a16:creationId xmlns:a16="http://schemas.microsoft.com/office/drawing/2014/main" id="{94337BEB-C658-44A1-AE25-D98933CA3B26}"/>
                               </a:ext>
                             </a:extLst>
                           </p:cNvPr>
@@ -22609,7 +22604,7 @@
               <p:cNvPr id="52241" name="Picture 17">
                 <a:extLst>
                   <a:ext uri="{FF2B5EF4-FFF2-40B4-BE49-F238E27FC236}">
-                    <a16:creationId xmlns:a16="http://schemas.microsoft.com/office/drawing/2014/main" xmlns="" id="{75B988ED-5370-4C0C-81CD-BFE9F41B28AE}"/>
+                    <a16:creationId xmlns:a16="http://schemas.microsoft.com/office/drawing/2014/main" id="{75B988ED-5370-4C0C-81CD-BFE9F41B28AE}"/>
                   </a:ext>
                 </a:extLst>
               </p:cNvPr>
@@ -22657,7 +22652,7 @@
             <p:cNvPr id="52242" name="Freeform 18">
               <a:extLst>
                 <a:ext uri="{FF2B5EF4-FFF2-40B4-BE49-F238E27FC236}">
-                  <a16:creationId xmlns:a16="http://schemas.microsoft.com/office/drawing/2014/main" xmlns="" id="{E8795523-F3E5-49D9-AC9B-2FCEEE680FEE}"/>
+                  <a16:creationId xmlns:a16="http://schemas.microsoft.com/office/drawing/2014/main" id="{E8795523-F3E5-49D9-AC9B-2FCEEE680FEE}"/>
                 </a:ext>
               </a:extLst>
             </p:cNvPr>
@@ -22824,7 +22819,7 @@
           <p:cNvPr id="52243" name="Picture 19" descr="Database01">
             <a:extLst>
               <a:ext uri="{FF2B5EF4-FFF2-40B4-BE49-F238E27FC236}">
-                <a16:creationId xmlns:a16="http://schemas.microsoft.com/office/drawing/2014/main" xmlns="" id="{40C5C276-8E0F-4E8E-9A49-5397B929B702}"/>
+                <a16:creationId xmlns:a16="http://schemas.microsoft.com/office/drawing/2014/main" id="{40C5C276-8E0F-4E8E-9A49-5397B929B702}"/>
               </a:ext>
             </a:extLst>
           </p:cNvPr>
@@ -22871,7 +22866,7 @@
           <p:cNvPr id="52244" name="Group 20">
             <a:extLst>
               <a:ext uri="{FF2B5EF4-FFF2-40B4-BE49-F238E27FC236}">
-                <a16:creationId xmlns:a16="http://schemas.microsoft.com/office/drawing/2014/main" xmlns="" id="{01FEF583-FBD2-4531-970F-64654F1E1910}"/>
+                <a16:creationId xmlns:a16="http://schemas.microsoft.com/office/drawing/2014/main" id="{01FEF583-FBD2-4531-970F-64654F1E1910}"/>
               </a:ext>
             </a:extLst>
           </p:cNvPr>
@@ -22893,7 +22888,7 @@
             <p:cNvPr id="52245" name="AutoShape 21">
               <a:extLst>
                 <a:ext uri="{FF2B5EF4-FFF2-40B4-BE49-F238E27FC236}">
-                  <a16:creationId xmlns:a16="http://schemas.microsoft.com/office/drawing/2014/main" xmlns="" id="{5673620B-D002-4F63-B0E8-39E67AE8E58D}"/>
+                  <a16:creationId xmlns:a16="http://schemas.microsoft.com/office/drawing/2014/main" id="{5673620B-D002-4F63-B0E8-39E67AE8E58D}"/>
                 </a:ext>
               </a:extLst>
             </p:cNvPr>
@@ -22959,7 +22954,7 @@
             <p:cNvPr id="52246" name="Rectangle 22">
               <a:extLst>
                 <a:ext uri="{FF2B5EF4-FFF2-40B4-BE49-F238E27FC236}">
-                  <a16:creationId xmlns:a16="http://schemas.microsoft.com/office/drawing/2014/main" xmlns="" id="{3A4E18BA-AD00-49DC-8CB2-AB60DF8827B1}"/>
+                  <a16:creationId xmlns:a16="http://schemas.microsoft.com/office/drawing/2014/main" id="{3A4E18BA-AD00-49DC-8CB2-AB60DF8827B1}"/>
                 </a:ext>
               </a:extLst>
             </p:cNvPr>
@@ -23036,7 +23031,7 @@
             <p:cNvPr id="52247" name="Picture 23" descr="Database01">
               <a:extLst>
                 <a:ext uri="{FF2B5EF4-FFF2-40B4-BE49-F238E27FC236}">
-                  <a16:creationId xmlns:a16="http://schemas.microsoft.com/office/drawing/2014/main" xmlns="" id="{00C177E7-9913-4018-8ED3-F023C8A7D9C0}"/>
+                  <a16:creationId xmlns:a16="http://schemas.microsoft.com/office/drawing/2014/main" id="{00C177E7-9913-4018-8ED3-F023C8A7D9C0}"/>
                 </a:ext>
               </a:extLst>
             </p:cNvPr>
@@ -23083,7 +23078,7 @@
             <p:cNvPr id="52248" name="Picture 24" descr="Documen_Writing01">
               <a:extLst>
                 <a:ext uri="{FF2B5EF4-FFF2-40B4-BE49-F238E27FC236}">
-                  <a16:creationId xmlns:a16="http://schemas.microsoft.com/office/drawing/2014/main" xmlns="" id="{2C00053C-F11B-4354-8A2F-14D59A31E43F}"/>
+                  <a16:creationId xmlns:a16="http://schemas.microsoft.com/office/drawing/2014/main" id="{2C00053C-F11B-4354-8A2F-14D59A31E43F}"/>
                 </a:ext>
               </a:extLst>
             </p:cNvPr>
@@ -23131,7 +23126,7 @@
           <p:cNvPr id="52249" name="Freeform 25">
             <a:extLst>
               <a:ext uri="{FF2B5EF4-FFF2-40B4-BE49-F238E27FC236}">
-                <a16:creationId xmlns:a16="http://schemas.microsoft.com/office/drawing/2014/main" xmlns="" id="{0B649873-E783-4689-BA6A-A081BD4F68AF}"/>
+                <a16:creationId xmlns:a16="http://schemas.microsoft.com/office/drawing/2014/main" id="{0B649873-E783-4689-BA6A-A081BD4F68AF}"/>
               </a:ext>
             </a:extLst>
           </p:cNvPr>
@@ -23297,7 +23292,7 @@
           <p:cNvPr id="52250" name="Picture 26" descr="Database01">
             <a:extLst>
               <a:ext uri="{FF2B5EF4-FFF2-40B4-BE49-F238E27FC236}">
-                <a16:creationId xmlns:a16="http://schemas.microsoft.com/office/drawing/2014/main" xmlns="" id="{BD318014-8296-4623-B861-C31FFCA01816}"/>
+                <a16:creationId xmlns:a16="http://schemas.microsoft.com/office/drawing/2014/main" id="{BD318014-8296-4623-B861-C31FFCA01816}"/>
               </a:ext>
             </a:extLst>
           </p:cNvPr>
@@ -23344,7 +23339,7 @@
           <p:cNvPr id="52251" name="Group 27">
             <a:extLst>
               <a:ext uri="{FF2B5EF4-FFF2-40B4-BE49-F238E27FC236}">
-                <a16:creationId xmlns:a16="http://schemas.microsoft.com/office/drawing/2014/main" xmlns="" id="{55AA7F39-E88A-48A6-8F74-D054A06D8ACD}"/>
+                <a16:creationId xmlns:a16="http://schemas.microsoft.com/office/drawing/2014/main" id="{55AA7F39-E88A-48A6-8F74-D054A06D8ACD}"/>
               </a:ext>
             </a:extLst>
           </p:cNvPr>
@@ -23366,7 +23361,7 @@
             <p:cNvPr id="52252" name="AutoShape 28">
               <a:extLst>
                 <a:ext uri="{FF2B5EF4-FFF2-40B4-BE49-F238E27FC236}">
-                  <a16:creationId xmlns:a16="http://schemas.microsoft.com/office/drawing/2014/main" xmlns="" id="{B615B70D-7A95-4137-8A57-8E26FF3A7855}"/>
+                  <a16:creationId xmlns:a16="http://schemas.microsoft.com/office/drawing/2014/main" id="{B615B70D-7A95-4137-8A57-8E26FF3A7855}"/>
                 </a:ext>
               </a:extLst>
             </p:cNvPr>
@@ -23432,7 +23427,7 @@
             <p:cNvPr id="52253" name="Rectangle 29">
               <a:extLst>
                 <a:ext uri="{FF2B5EF4-FFF2-40B4-BE49-F238E27FC236}">
-                  <a16:creationId xmlns:a16="http://schemas.microsoft.com/office/drawing/2014/main" xmlns="" id="{1F7B99EC-6A93-4A28-8DC6-C3C21D2ECBAA}"/>
+                  <a16:creationId xmlns:a16="http://schemas.microsoft.com/office/drawing/2014/main" id="{1F7B99EC-6A93-4A28-8DC6-C3C21D2ECBAA}"/>
                 </a:ext>
               </a:extLst>
             </p:cNvPr>
@@ -23509,7 +23504,7 @@
             <p:cNvPr id="52254" name="Picture 30" descr="Documen_Writing01">
               <a:extLst>
                 <a:ext uri="{FF2B5EF4-FFF2-40B4-BE49-F238E27FC236}">
-                  <a16:creationId xmlns:a16="http://schemas.microsoft.com/office/drawing/2014/main" xmlns="" id="{50AF2C05-8FFD-4FD2-BA87-75220109A574}"/>
+                  <a16:creationId xmlns:a16="http://schemas.microsoft.com/office/drawing/2014/main" id="{50AF2C05-8FFD-4FD2-BA87-75220109A574}"/>
                 </a:ext>
               </a:extLst>
             </p:cNvPr>
@@ -23970,7 +23965,7 @@
           <p:cNvPr id="2" name="Title 1">
             <a:extLst>
               <a:ext uri="{FF2B5EF4-FFF2-40B4-BE49-F238E27FC236}">
-                <a16:creationId xmlns:a16="http://schemas.microsoft.com/office/drawing/2014/main" xmlns="" id="{D598B7E1-594F-4BC6-8264-52CF3E37B2FE}"/>
+                <a16:creationId xmlns:a16="http://schemas.microsoft.com/office/drawing/2014/main" id="{D598B7E1-594F-4BC6-8264-52CF3E37B2FE}"/>
               </a:ext>
             </a:extLst>
           </p:cNvPr>
@@ -23998,7 +23993,7 @@
           <p:cNvPr id="5122" name="Picture 2" descr="http://www.clinicessentials.com/uploads/pages/daily-charges-report.png">
             <a:extLst>
               <a:ext uri="{FF2B5EF4-FFF2-40B4-BE49-F238E27FC236}">
-                <a16:creationId xmlns:a16="http://schemas.microsoft.com/office/drawing/2014/main" xmlns="" id="{03710419-CFF3-4E19-8024-7D1F65B19C7D}"/>
+                <a16:creationId xmlns:a16="http://schemas.microsoft.com/office/drawing/2014/main" id="{03710419-CFF3-4E19-8024-7D1F65B19C7D}"/>
               </a:ext>
             </a:extLst>
           </p:cNvPr>
@@ -24077,7 +24072,7 @@
           <p:cNvPr id="56322" name="AutoShape 2">
             <a:extLst>
               <a:ext uri="{FF2B5EF4-FFF2-40B4-BE49-F238E27FC236}">
-                <a16:creationId xmlns:a16="http://schemas.microsoft.com/office/drawing/2014/main" xmlns="" id="{B22E21DC-1527-41B9-A5BD-4A77B26E2D33}"/>
+                <a16:creationId xmlns:a16="http://schemas.microsoft.com/office/drawing/2014/main" id="{B22E21DC-1527-41B9-A5BD-4A77B26E2D33}"/>
               </a:ext>
             </a:extLst>
           </p:cNvPr>
@@ -24136,7 +24131,7 @@
           <p:cNvPr id="56323" name="Rectangle 3">
             <a:extLst>
               <a:ext uri="{FF2B5EF4-FFF2-40B4-BE49-F238E27FC236}">
-                <a16:creationId xmlns:a16="http://schemas.microsoft.com/office/drawing/2014/main" xmlns="" id="{36518021-4999-49B4-90D7-3873FE5DF715}"/>
+                <a16:creationId xmlns:a16="http://schemas.microsoft.com/office/drawing/2014/main" id="{36518021-4999-49B4-90D7-3873FE5DF715}"/>
               </a:ext>
             </a:extLst>
           </p:cNvPr>
@@ -24209,7 +24204,7 @@
           <p:cNvPr id="56324" name="Group 4">
             <a:extLst>
               <a:ext uri="{FF2B5EF4-FFF2-40B4-BE49-F238E27FC236}">
-                <a16:creationId xmlns:a16="http://schemas.microsoft.com/office/drawing/2014/main" xmlns="" id="{2CBCF19E-DBA8-4D9D-87F5-3E813C48AFE6}"/>
+                <a16:creationId xmlns:a16="http://schemas.microsoft.com/office/drawing/2014/main" id="{2CBCF19E-DBA8-4D9D-87F5-3E813C48AFE6}"/>
               </a:ext>
             </a:extLst>
           </p:cNvPr>
@@ -24231,7 +24226,7 @@
             <p:cNvPr id="56325" name="AutoShape 5">
               <a:extLst>
                 <a:ext uri="{FF2B5EF4-FFF2-40B4-BE49-F238E27FC236}">
-                  <a16:creationId xmlns:a16="http://schemas.microsoft.com/office/drawing/2014/main" xmlns="" id="{A275EB40-8FE7-47AD-B174-1C16EECE7ED5}"/>
+                  <a16:creationId xmlns:a16="http://schemas.microsoft.com/office/drawing/2014/main" id="{A275EB40-8FE7-47AD-B174-1C16EECE7ED5}"/>
                 </a:ext>
               </a:extLst>
             </p:cNvPr>
@@ -24301,7 +24296,7 @@
             <p:cNvPr id="56326" name="AutoShape 6">
               <a:extLst>
                 <a:ext uri="{FF2B5EF4-FFF2-40B4-BE49-F238E27FC236}">
-                  <a16:creationId xmlns:a16="http://schemas.microsoft.com/office/drawing/2014/main" xmlns="" id="{D6ABA9F9-3268-42C0-8AE3-0E0A6F40886E}"/>
+                  <a16:creationId xmlns:a16="http://schemas.microsoft.com/office/drawing/2014/main" id="{D6ABA9F9-3268-42C0-8AE3-0E0A6F40886E}"/>
                 </a:ext>
               </a:extLst>
             </p:cNvPr>
@@ -24353,7 +24348,7 @@
           <p:cNvPr id="56327" name="Rectangle 7">
             <a:extLst>
               <a:ext uri="{FF2B5EF4-FFF2-40B4-BE49-F238E27FC236}">
-                <a16:creationId xmlns:a16="http://schemas.microsoft.com/office/drawing/2014/main" xmlns="" id="{35AC9F53-6198-4109-A0D4-EF76A816195F}"/>
+                <a16:creationId xmlns:a16="http://schemas.microsoft.com/office/drawing/2014/main" id="{35AC9F53-6198-4109-A0D4-EF76A816195F}"/>
               </a:ext>
             </a:extLst>
           </p:cNvPr>
@@ -24381,7 +24376,7 @@
           <p:cNvPr id="56328" name="Rectangle 8">
             <a:extLst>
               <a:ext uri="{FF2B5EF4-FFF2-40B4-BE49-F238E27FC236}">
-                <a16:creationId xmlns:a16="http://schemas.microsoft.com/office/drawing/2014/main" xmlns="" id="{9F0F7695-6B24-4CF7-8F8E-20F38500CA8A}"/>
+                <a16:creationId xmlns:a16="http://schemas.microsoft.com/office/drawing/2014/main" id="{9F0F7695-6B24-4CF7-8F8E-20F38500CA8A}"/>
               </a:ext>
             </a:extLst>
           </p:cNvPr>
@@ -24446,7 +24441,7 @@
           <p:cNvPr id="56329" name="Text Box 9">
             <a:extLst>
               <a:ext uri="{FF2B5EF4-FFF2-40B4-BE49-F238E27FC236}">
-                <a16:creationId xmlns:a16="http://schemas.microsoft.com/office/drawing/2014/main" xmlns="" id="{D6867261-923F-4A19-B2ED-9755F1ADC7C5}"/>
+                <a16:creationId xmlns:a16="http://schemas.microsoft.com/office/drawing/2014/main" id="{D6867261-923F-4A19-B2ED-9755F1ADC7C5}"/>
               </a:ext>
             </a:extLst>
           </p:cNvPr>
@@ -24525,7 +24520,7 @@
           <p:cNvPr id="56330" name="Text Box 10">
             <a:extLst>
               <a:ext uri="{FF2B5EF4-FFF2-40B4-BE49-F238E27FC236}">
-                <a16:creationId xmlns:a16="http://schemas.microsoft.com/office/drawing/2014/main" xmlns="" id="{168B9377-26DF-4F82-9F16-78B8991B0CB1}"/>
+                <a16:creationId xmlns:a16="http://schemas.microsoft.com/office/drawing/2014/main" id="{168B9377-26DF-4F82-9F16-78B8991B0CB1}"/>
               </a:ext>
             </a:extLst>
           </p:cNvPr>
@@ -24604,7 +24599,7 @@
           <p:cNvPr id="56331" name="Group 11">
             <a:extLst>
               <a:ext uri="{FF2B5EF4-FFF2-40B4-BE49-F238E27FC236}">
-                <a16:creationId xmlns:a16="http://schemas.microsoft.com/office/drawing/2014/main" xmlns="" id="{2AB7FF33-1A4B-41E1-9AC8-B3E23FB5DD01}"/>
+                <a16:creationId xmlns:a16="http://schemas.microsoft.com/office/drawing/2014/main" id="{2AB7FF33-1A4B-41E1-9AC8-B3E23FB5DD01}"/>
               </a:ext>
             </a:extLst>
           </p:cNvPr>
@@ -24626,7 +24621,7 @@
             <p:cNvPr id="56332" name="Group 12">
               <a:extLst>
                 <a:ext uri="{FF2B5EF4-FFF2-40B4-BE49-F238E27FC236}">
-                  <a16:creationId xmlns:a16="http://schemas.microsoft.com/office/drawing/2014/main" xmlns="" id="{537500A8-8B09-40A0-9D73-B27AEC599268}"/>
+                  <a16:creationId xmlns:a16="http://schemas.microsoft.com/office/drawing/2014/main" id="{537500A8-8B09-40A0-9D73-B27AEC599268}"/>
                 </a:ext>
               </a:extLst>
             </p:cNvPr>
@@ -24648,7 +24643,7 @@
               <p:cNvPr id="56333" name="AutoShape 13">
                 <a:extLst>
                   <a:ext uri="{FF2B5EF4-FFF2-40B4-BE49-F238E27FC236}">
-                    <a16:creationId xmlns:a16="http://schemas.microsoft.com/office/drawing/2014/main" xmlns="" id="{7A12D68B-7A88-44F9-81DD-97EE130DAA8D}"/>
+                    <a16:creationId xmlns:a16="http://schemas.microsoft.com/office/drawing/2014/main" id="{7A12D68B-7A88-44F9-81DD-97EE130DAA8D}"/>
                   </a:ext>
                 </a:extLst>
               </p:cNvPr>
@@ -24714,7 +24709,7 @@
               <p:cNvPr id="56334" name="Rectangle 14">
                 <a:extLst>
                   <a:ext uri="{FF2B5EF4-FFF2-40B4-BE49-F238E27FC236}">
-                    <a16:creationId xmlns:a16="http://schemas.microsoft.com/office/drawing/2014/main" xmlns="" id="{AF34938F-100B-44C9-953B-3C24A719510F}"/>
+                    <a16:creationId xmlns:a16="http://schemas.microsoft.com/office/drawing/2014/main" id="{AF34938F-100B-44C9-953B-3C24A719510F}"/>
                   </a:ext>
                 </a:extLst>
               </p:cNvPr>
@@ -24791,7 +24786,7 @@
               <p:cNvPr id="56335" name="Object 15">
                 <a:extLst>
                   <a:ext uri="{FF2B5EF4-FFF2-40B4-BE49-F238E27FC236}">
-                    <a16:creationId xmlns:a16="http://schemas.microsoft.com/office/drawing/2014/main" xmlns="" id="{DEF94D8F-C96E-4018-A209-B39628AFCA53}"/>
+                    <a16:creationId xmlns:a16="http://schemas.microsoft.com/office/drawing/2014/main" id="{DEF94D8F-C96E-4018-A209-B39628AFCA53}"/>
                   </a:ext>
                 </a:extLst>
               </p:cNvPr>
@@ -24808,7 +24803,7 @@
               <a:graphicData uri="http://schemas.openxmlformats.org/presentationml/2006/ole">
                 <mc:AlternateContent xmlns:mc="http://schemas.openxmlformats.org/markup-compatibility/2006">
                   <mc:Choice xmlns:v="urn:schemas-microsoft-com:vml" Requires="v">
-                    <p:oleObj spid="_x0000_s3194" name="Bitmap Image" r:id="rId4" imgW="485586" imgH="476316" progId="Paint.Picture">
+                    <p:oleObj spid="_x0000_s3196" name="Bitmap Image" r:id="rId4" imgW="485586" imgH="476316" progId="Paint.Picture">
                       <p:embed/>
                     </p:oleObj>
                   </mc:Choice>
@@ -24820,7 +24815,7 @@
                           <p:cNvPr id="56335" name="Object 15">
                             <a:extLst>
                               <a:ext uri="{FF2B5EF4-FFF2-40B4-BE49-F238E27FC236}">
-                                <a16:creationId xmlns:a16="http://schemas.microsoft.com/office/drawing/2014/main" xmlns="" id="{DEF94D8F-C96E-4018-A209-B39628AFCA53}"/>
+                                <a16:creationId xmlns:a16="http://schemas.microsoft.com/office/drawing/2014/main" id="{DEF94D8F-C96E-4018-A209-B39628AFCA53}"/>
                               </a:ext>
                             </a:extLst>
                           </p:cNvPr>
@@ -24896,7 +24891,7 @@
               <p:cNvPr id="56336" name="Object 16">
                 <a:extLst>
                   <a:ext uri="{FF2B5EF4-FFF2-40B4-BE49-F238E27FC236}">
-                    <a16:creationId xmlns:a16="http://schemas.microsoft.com/office/drawing/2014/main" xmlns="" id="{DC2C02D5-D09B-4107-9552-6B51B94A7C15}"/>
+                    <a16:creationId xmlns:a16="http://schemas.microsoft.com/office/drawing/2014/main" id="{DC2C02D5-D09B-4107-9552-6B51B94A7C15}"/>
                   </a:ext>
                 </a:extLst>
               </p:cNvPr>
@@ -24913,7 +24908,7 @@
               <a:graphicData uri="http://schemas.openxmlformats.org/presentationml/2006/ole">
                 <mc:AlternateContent xmlns:mc="http://schemas.openxmlformats.org/markup-compatibility/2006">
                   <mc:Choice xmlns:v="urn:schemas-microsoft-com:vml" Requires="v">
-                    <p:oleObj spid="_x0000_s3195" name="Bitmap Image" r:id="rId6" imgW="380852" imgH="485586" progId="Paint.Picture">
+                    <p:oleObj spid="_x0000_s3197" name="Bitmap Image" r:id="rId6" imgW="380852" imgH="485586" progId="Paint.Picture">
                       <p:embed/>
                     </p:oleObj>
                   </mc:Choice>
@@ -24925,7 +24920,7 @@
                           <p:cNvPr id="56336" name="Object 16">
                             <a:extLst>
                               <a:ext uri="{FF2B5EF4-FFF2-40B4-BE49-F238E27FC236}">
-                                <a16:creationId xmlns:a16="http://schemas.microsoft.com/office/drawing/2014/main" xmlns="" id="{DC2C02D5-D09B-4107-9552-6B51B94A7C15}"/>
+                                <a16:creationId xmlns:a16="http://schemas.microsoft.com/office/drawing/2014/main" id="{DC2C02D5-D09B-4107-9552-6B51B94A7C15}"/>
                               </a:ext>
                             </a:extLst>
                           </p:cNvPr>
@@ -25001,7 +24996,7 @@
               <p:cNvPr id="56337" name="Picture 17">
                 <a:extLst>
                   <a:ext uri="{FF2B5EF4-FFF2-40B4-BE49-F238E27FC236}">
-                    <a16:creationId xmlns:a16="http://schemas.microsoft.com/office/drawing/2014/main" xmlns="" id="{E9214329-A45D-4EC4-8208-BEBE16B418BC}"/>
+                    <a16:creationId xmlns:a16="http://schemas.microsoft.com/office/drawing/2014/main" id="{E9214329-A45D-4EC4-8208-BEBE16B418BC}"/>
                   </a:ext>
                 </a:extLst>
               </p:cNvPr>
@@ -25049,7 +25044,7 @@
             <p:cNvPr id="56338" name="Freeform 18">
               <a:extLst>
                 <a:ext uri="{FF2B5EF4-FFF2-40B4-BE49-F238E27FC236}">
-                  <a16:creationId xmlns:a16="http://schemas.microsoft.com/office/drawing/2014/main" xmlns="" id="{E459219E-9DF9-4CED-90D2-C9A329B37E99}"/>
+                  <a16:creationId xmlns:a16="http://schemas.microsoft.com/office/drawing/2014/main" id="{E459219E-9DF9-4CED-90D2-C9A329B37E99}"/>
                 </a:ext>
               </a:extLst>
             </p:cNvPr>
@@ -25216,7 +25211,7 @@
           <p:cNvPr id="56339" name="Picture 19" descr="Database01">
             <a:extLst>
               <a:ext uri="{FF2B5EF4-FFF2-40B4-BE49-F238E27FC236}">
-                <a16:creationId xmlns:a16="http://schemas.microsoft.com/office/drawing/2014/main" xmlns="" id="{9FB31A6B-F9A9-4F70-AD6F-7CC0DEF1E913}"/>
+                <a16:creationId xmlns:a16="http://schemas.microsoft.com/office/drawing/2014/main" id="{9FB31A6B-F9A9-4F70-AD6F-7CC0DEF1E913}"/>
               </a:ext>
             </a:extLst>
           </p:cNvPr>
@@ -25263,7 +25258,7 @@
           <p:cNvPr id="56340" name="Group 20">
             <a:extLst>
               <a:ext uri="{FF2B5EF4-FFF2-40B4-BE49-F238E27FC236}">
-                <a16:creationId xmlns:a16="http://schemas.microsoft.com/office/drawing/2014/main" xmlns="" id="{4BA31A01-F0A9-4A15-A402-0A2D6D054F27}"/>
+                <a16:creationId xmlns:a16="http://schemas.microsoft.com/office/drawing/2014/main" id="{4BA31A01-F0A9-4A15-A402-0A2D6D054F27}"/>
               </a:ext>
             </a:extLst>
           </p:cNvPr>
@@ -25285,7 +25280,7 @@
             <p:cNvPr id="56341" name="AutoShape 21">
               <a:extLst>
                 <a:ext uri="{FF2B5EF4-FFF2-40B4-BE49-F238E27FC236}">
-                  <a16:creationId xmlns:a16="http://schemas.microsoft.com/office/drawing/2014/main" xmlns="" id="{61061D24-8C48-4D3B-8694-E5EC23635C0E}"/>
+                  <a16:creationId xmlns:a16="http://schemas.microsoft.com/office/drawing/2014/main" id="{61061D24-8C48-4D3B-8694-E5EC23635C0E}"/>
                 </a:ext>
               </a:extLst>
             </p:cNvPr>
@@ -25351,7 +25346,7 @@
             <p:cNvPr id="56342" name="Rectangle 22">
               <a:extLst>
                 <a:ext uri="{FF2B5EF4-FFF2-40B4-BE49-F238E27FC236}">
-                  <a16:creationId xmlns:a16="http://schemas.microsoft.com/office/drawing/2014/main" xmlns="" id="{38BC30AF-72C9-45EA-BC8C-0CDB85B6D739}"/>
+                  <a16:creationId xmlns:a16="http://schemas.microsoft.com/office/drawing/2014/main" id="{38BC30AF-72C9-45EA-BC8C-0CDB85B6D739}"/>
                 </a:ext>
               </a:extLst>
             </p:cNvPr>
@@ -25428,7 +25423,7 @@
             <p:cNvPr id="56343" name="Picture 23" descr="Database01">
               <a:extLst>
                 <a:ext uri="{FF2B5EF4-FFF2-40B4-BE49-F238E27FC236}">
-                  <a16:creationId xmlns:a16="http://schemas.microsoft.com/office/drawing/2014/main" xmlns="" id="{D4E50BA6-4B41-4A15-B6DC-5FEFE2E5366F}"/>
+                  <a16:creationId xmlns:a16="http://schemas.microsoft.com/office/drawing/2014/main" id="{D4E50BA6-4B41-4A15-B6DC-5FEFE2E5366F}"/>
                 </a:ext>
               </a:extLst>
             </p:cNvPr>
@@ -25475,7 +25470,7 @@
             <p:cNvPr id="56344" name="Picture 24" descr="Documen_Writing01">
               <a:extLst>
                 <a:ext uri="{FF2B5EF4-FFF2-40B4-BE49-F238E27FC236}">
-                  <a16:creationId xmlns:a16="http://schemas.microsoft.com/office/drawing/2014/main" xmlns="" id="{4AF40EF8-4F1E-429C-A028-CF062D7925AF}"/>
+                  <a16:creationId xmlns:a16="http://schemas.microsoft.com/office/drawing/2014/main" id="{4AF40EF8-4F1E-429C-A028-CF062D7925AF}"/>
                 </a:ext>
               </a:extLst>
             </p:cNvPr>
@@ -25523,7 +25518,7 @@
           <p:cNvPr id="56345" name="Freeform 25">
             <a:extLst>
               <a:ext uri="{FF2B5EF4-FFF2-40B4-BE49-F238E27FC236}">
-                <a16:creationId xmlns:a16="http://schemas.microsoft.com/office/drawing/2014/main" xmlns="" id="{D4CA38AB-415F-4745-A1B5-6652402C52A3}"/>
+                <a16:creationId xmlns:a16="http://schemas.microsoft.com/office/drawing/2014/main" id="{D4CA38AB-415F-4745-A1B5-6652402C52A3}"/>
               </a:ext>
             </a:extLst>
           </p:cNvPr>
@@ -25689,7 +25684,7 @@
           <p:cNvPr id="56346" name="Picture 26" descr="Database01">
             <a:extLst>
               <a:ext uri="{FF2B5EF4-FFF2-40B4-BE49-F238E27FC236}">
-                <a16:creationId xmlns:a16="http://schemas.microsoft.com/office/drawing/2014/main" xmlns="" id="{164E281D-F4DA-4624-AADA-099B1E204F3B}"/>
+                <a16:creationId xmlns:a16="http://schemas.microsoft.com/office/drawing/2014/main" id="{164E281D-F4DA-4624-AADA-099B1E204F3B}"/>
               </a:ext>
             </a:extLst>
           </p:cNvPr>
@@ -25736,7 +25731,7 @@
           <p:cNvPr id="56347" name="Group 27">
             <a:extLst>
               <a:ext uri="{FF2B5EF4-FFF2-40B4-BE49-F238E27FC236}">
-                <a16:creationId xmlns:a16="http://schemas.microsoft.com/office/drawing/2014/main" xmlns="" id="{A1864521-45DA-41E2-8EC7-2813D7B511AA}"/>
+                <a16:creationId xmlns:a16="http://schemas.microsoft.com/office/drawing/2014/main" id="{A1864521-45DA-41E2-8EC7-2813D7B511AA}"/>
               </a:ext>
             </a:extLst>
           </p:cNvPr>
@@ -25758,7 +25753,7 @@
             <p:cNvPr id="56348" name="AutoShape 28">
               <a:extLst>
                 <a:ext uri="{FF2B5EF4-FFF2-40B4-BE49-F238E27FC236}">
-                  <a16:creationId xmlns:a16="http://schemas.microsoft.com/office/drawing/2014/main" xmlns="" id="{5AF3C7F8-6264-4572-90D3-72730961DC09}"/>
+                  <a16:creationId xmlns:a16="http://schemas.microsoft.com/office/drawing/2014/main" id="{5AF3C7F8-6264-4572-90D3-72730961DC09}"/>
                 </a:ext>
               </a:extLst>
             </p:cNvPr>
@@ -25824,7 +25819,7 @@
             <p:cNvPr id="56349" name="Rectangle 29">
               <a:extLst>
                 <a:ext uri="{FF2B5EF4-FFF2-40B4-BE49-F238E27FC236}">
-                  <a16:creationId xmlns:a16="http://schemas.microsoft.com/office/drawing/2014/main" xmlns="" id="{3567BDDF-C03B-4F56-B5D3-0FB7EAB282CF}"/>
+                  <a16:creationId xmlns:a16="http://schemas.microsoft.com/office/drawing/2014/main" id="{3567BDDF-C03B-4F56-B5D3-0FB7EAB282CF}"/>
                 </a:ext>
               </a:extLst>
             </p:cNvPr>
@@ -25901,7 +25896,7 @@
             <p:cNvPr id="56350" name="Picture 30" descr="Documen_Writing01">
               <a:extLst>
                 <a:ext uri="{FF2B5EF4-FFF2-40B4-BE49-F238E27FC236}">
-                  <a16:creationId xmlns:a16="http://schemas.microsoft.com/office/drawing/2014/main" xmlns="" id="{C72C7956-C609-4416-8480-AFA5175B79CF}"/>
+                  <a16:creationId xmlns:a16="http://schemas.microsoft.com/office/drawing/2014/main" id="{C72C7956-C609-4416-8480-AFA5175B79CF}"/>
                 </a:ext>
               </a:extLst>
             </p:cNvPr>
@@ -26256,7 +26251,7 @@
           <p:cNvPr id="58370" name="Picture 2" descr="Database01">
             <a:extLst>
               <a:ext uri="{FF2B5EF4-FFF2-40B4-BE49-F238E27FC236}">
-                <a16:creationId xmlns:a16="http://schemas.microsoft.com/office/drawing/2014/main" xmlns="" id="{B7CDAE2E-117D-46E8-AB88-9D1F2C99FC9E}"/>
+                <a16:creationId xmlns:a16="http://schemas.microsoft.com/office/drawing/2014/main" id="{B7CDAE2E-117D-46E8-AB88-9D1F2C99FC9E}"/>
               </a:ext>
             </a:extLst>
           </p:cNvPr>
@@ -26303,7 +26298,7 @@
           <p:cNvPr id="58371" name="Group 3">
             <a:extLst>
               <a:ext uri="{FF2B5EF4-FFF2-40B4-BE49-F238E27FC236}">
-                <a16:creationId xmlns:a16="http://schemas.microsoft.com/office/drawing/2014/main" xmlns="" id="{27651858-215F-481B-B7E9-D931EB69866C}"/>
+                <a16:creationId xmlns:a16="http://schemas.microsoft.com/office/drawing/2014/main" id="{27651858-215F-481B-B7E9-D931EB69866C}"/>
               </a:ext>
             </a:extLst>
           </p:cNvPr>
@@ -26325,7 +26320,7 @@
             <p:cNvPr id="58372" name="AutoShape 4">
               <a:extLst>
                 <a:ext uri="{FF2B5EF4-FFF2-40B4-BE49-F238E27FC236}">
-                  <a16:creationId xmlns:a16="http://schemas.microsoft.com/office/drawing/2014/main" xmlns="" id="{FF1F1621-088A-4107-BD5B-238FC2820481}"/>
+                  <a16:creationId xmlns:a16="http://schemas.microsoft.com/office/drawing/2014/main" id="{FF1F1621-088A-4107-BD5B-238FC2820481}"/>
                 </a:ext>
               </a:extLst>
             </p:cNvPr>
@@ -26391,7 +26386,7 @@
             <p:cNvPr id="58373" name="Object 5">
               <a:extLst>
                 <a:ext uri="{FF2B5EF4-FFF2-40B4-BE49-F238E27FC236}">
-                  <a16:creationId xmlns:a16="http://schemas.microsoft.com/office/drawing/2014/main" xmlns="" id="{36F5F6D8-6069-417D-A577-AE36D24CD437}"/>
+                  <a16:creationId xmlns:a16="http://schemas.microsoft.com/office/drawing/2014/main" id="{36F5F6D8-6069-417D-A577-AE36D24CD437}"/>
                 </a:ext>
               </a:extLst>
             </p:cNvPr>
@@ -26408,7 +26403,7 @@
             <a:graphicData uri="http://schemas.openxmlformats.org/presentationml/2006/ole">
               <mc:AlternateContent xmlns:mc="http://schemas.openxmlformats.org/markup-compatibility/2006">
                 <mc:Choice xmlns:v="urn:schemas-microsoft-com:vml" Requires="v">
-                  <p:oleObj spid="_x0000_s4218" name="Bitmap Image" r:id="rId5" imgW="485586" imgH="476316" progId="Paint.Picture">
+                  <p:oleObj spid="_x0000_s4220" name="Bitmap Image" r:id="rId5" imgW="485586" imgH="476316" progId="Paint.Picture">
                     <p:embed/>
                   </p:oleObj>
                 </mc:Choice>
@@ -26420,7 +26415,7 @@
                         <p:cNvPr id="58373" name="Object 5">
                           <a:extLst>
                             <a:ext uri="{FF2B5EF4-FFF2-40B4-BE49-F238E27FC236}">
-                              <a16:creationId xmlns:a16="http://schemas.microsoft.com/office/drawing/2014/main" xmlns="" id="{36F5F6D8-6069-417D-A577-AE36D24CD437}"/>
+                              <a16:creationId xmlns:a16="http://schemas.microsoft.com/office/drawing/2014/main" id="{36F5F6D8-6069-417D-A577-AE36D24CD437}"/>
                             </a:ext>
                           </a:extLst>
                         </p:cNvPr>
@@ -26496,7 +26491,7 @@
             <p:cNvPr id="58374" name="Object 6">
               <a:extLst>
                 <a:ext uri="{FF2B5EF4-FFF2-40B4-BE49-F238E27FC236}">
-                  <a16:creationId xmlns:a16="http://schemas.microsoft.com/office/drawing/2014/main" xmlns="" id="{9885A933-0743-40BB-9368-90D73679DC32}"/>
+                  <a16:creationId xmlns:a16="http://schemas.microsoft.com/office/drawing/2014/main" id="{9885A933-0743-40BB-9368-90D73679DC32}"/>
                 </a:ext>
               </a:extLst>
             </p:cNvPr>
@@ -26513,7 +26508,7 @@
             <a:graphicData uri="http://schemas.openxmlformats.org/presentationml/2006/ole">
               <mc:AlternateContent xmlns:mc="http://schemas.openxmlformats.org/markup-compatibility/2006">
                 <mc:Choice xmlns:v="urn:schemas-microsoft-com:vml" Requires="v">
-                  <p:oleObj spid="_x0000_s4219" name="Bitmap Image" r:id="rId7" imgW="380852" imgH="485586" progId="Paint.Picture">
+                  <p:oleObj spid="_x0000_s4221" name="Bitmap Image" r:id="rId7" imgW="380852" imgH="485586" progId="Paint.Picture">
                     <p:embed/>
                   </p:oleObj>
                 </mc:Choice>
@@ -26525,7 +26520,7 @@
                         <p:cNvPr id="58374" name="Object 6">
                           <a:extLst>
                             <a:ext uri="{FF2B5EF4-FFF2-40B4-BE49-F238E27FC236}">
-                              <a16:creationId xmlns:a16="http://schemas.microsoft.com/office/drawing/2014/main" xmlns="" id="{9885A933-0743-40BB-9368-90D73679DC32}"/>
+                              <a16:creationId xmlns:a16="http://schemas.microsoft.com/office/drawing/2014/main" id="{9885A933-0743-40BB-9368-90D73679DC32}"/>
                             </a:ext>
                           </a:extLst>
                         </p:cNvPr>
@@ -26601,7 +26596,7 @@
             <p:cNvPr id="58375" name="Picture 7">
               <a:extLst>
                 <a:ext uri="{FF2B5EF4-FFF2-40B4-BE49-F238E27FC236}">
-                  <a16:creationId xmlns:a16="http://schemas.microsoft.com/office/drawing/2014/main" xmlns="" id="{09A3A3F6-90D2-4379-B9EB-E6D50A752CB3}"/>
+                  <a16:creationId xmlns:a16="http://schemas.microsoft.com/office/drawing/2014/main" id="{09A3A3F6-90D2-4379-B9EB-E6D50A752CB3}"/>
                 </a:ext>
               </a:extLst>
             </p:cNvPr>
@@ -26648,7 +26643,7 @@
             <p:cNvPr id="58376" name="Rectangle 8">
               <a:extLst>
                 <a:ext uri="{FF2B5EF4-FFF2-40B4-BE49-F238E27FC236}">
-                  <a16:creationId xmlns:a16="http://schemas.microsoft.com/office/drawing/2014/main" xmlns="" id="{92486954-2C17-4C1E-86FA-474AE34B9AF0}"/>
+                  <a16:creationId xmlns:a16="http://schemas.microsoft.com/office/drawing/2014/main" id="{92486954-2C17-4C1E-86FA-474AE34B9AF0}"/>
                 </a:ext>
               </a:extLst>
             </p:cNvPr>
@@ -26728,7 +26723,7 @@
           <p:cNvPr id="58377" name="Freeform 9">
             <a:extLst>
               <a:ext uri="{FF2B5EF4-FFF2-40B4-BE49-F238E27FC236}">
-                <a16:creationId xmlns:a16="http://schemas.microsoft.com/office/drawing/2014/main" xmlns="" id="{5DDFD2F5-B984-4482-A2D6-A2C2F33E3F10}"/>
+                <a16:creationId xmlns:a16="http://schemas.microsoft.com/office/drawing/2014/main" id="{5DDFD2F5-B984-4482-A2D6-A2C2F33E3F10}"/>
               </a:ext>
             </a:extLst>
           </p:cNvPr>
@@ -26894,7 +26889,7 @@
           <p:cNvPr id="58378" name="Rectangle 10">
             <a:extLst>
               <a:ext uri="{FF2B5EF4-FFF2-40B4-BE49-F238E27FC236}">
-                <a16:creationId xmlns:a16="http://schemas.microsoft.com/office/drawing/2014/main" xmlns="" id="{885711B1-EDC9-48B3-B1A5-C77936E5E0C7}"/>
+                <a16:creationId xmlns:a16="http://schemas.microsoft.com/office/drawing/2014/main" id="{885711B1-EDC9-48B3-B1A5-C77936E5E0C7}"/>
               </a:ext>
             </a:extLst>
           </p:cNvPr>
@@ -26922,7 +26917,7 @@
           <p:cNvPr id="58379" name="Rectangle 11">
             <a:extLst>
               <a:ext uri="{FF2B5EF4-FFF2-40B4-BE49-F238E27FC236}">
-                <a16:creationId xmlns:a16="http://schemas.microsoft.com/office/drawing/2014/main" xmlns="" id="{488F3BAC-7ACF-45DA-9418-5AD153E459FE}"/>
+                <a16:creationId xmlns:a16="http://schemas.microsoft.com/office/drawing/2014/main" id="{488F3BAC-7ACF-45DA-9418-5AD153E459FE}"/>
               </a:ext>
             </a:extLst>
           </p:cNvPr>
@@ -26965,7 +26960,7 @@
           <p:cNvPr id="58380" name="Rectangle 12">
             <a:extLst>
               <a:ext uri="{FF2B5EF4-FFF2-40B4-BE49-F238E27FC236}">
-                <a16:creationId xmlns:a16="http://schemas.microsoft.com/office/drawing/2014/main" xmlns="" id="{0FE833C5-19EE-4AE1-9523-CFED60A2EF02}"/>
+                <a16:creationId xmlns:a16="http://schemas.microsoft.com/office/drawing/2014/main" id="{0FE833C5-19EE-4AE1-9523-CFED60A2EF02}"/>
               </a:ext>
             </a:extLst>
           </p:cNvPr>
@@ -27041,7 +27036,7 @@
           <p:cNvPr id="58381" name="Freeform 13">
             <a:extLst>
               <a:ext uri="{FF2B5EF4-FFF2-40B4-BE49-F238E27FC236}">
-                <a16:creationId xmlns:a16="http://schemas.microsoft.com/office/drawing/2014/main" xmlns="" id="{BC355FFA-2836-4C11-985D-25B79F91C373}"/>
+                <a16:creationId xmlns:a16="http://schemas.microsoft.com/office/drawing/2014/main" id="{BC355FFA-2836-4C11-985D-25B79F91C373}"/>
               </a:ext>
             </a:extLst>
           </p:cNvPr>
@@ -27207,7 +27202,7 @@
           <p:cNvPr id="58382" name="Group 14">
             <a:extLst>
               <a:ext uri="{FF2B5EF4-FFF2-40B4-BE49-F238E27FC236}">
-                <a16:creationId xmlns:a16="http://schemas.microsoft.com/office/drawing/2014/main" xmlns="" id="{33402AB8-3E5A-4EDC-B9BC-10FA7C70580C}"/>
+                <a16:creationId xmlns:a16="http://schemas.microsoft.com/office/drawing/2014/main" id="{33402AB8-3E5A-4EDC-B9BC-10FA7C70580C}"/>
               </a:ext>
             </a:extLst>
           </p:cNvPr>
@@ -27229,7 +27224,7 @@
             <p:cNvPr id="58383" name="AutoShape 15">
               <a:extLst>
                 <a:ext uri="{FF2B5EF4-FFF2-40B4-BE49-F238E27FC236}">
-                  <a16:creationId xmlns:a16="http://schemas.microsoft.com/office/drawing/2014/main" xmlns="" id="{C511F172-3321-4CFA-B0D3-2C10B594CC4A}"/>
+                  <a16:creationId xmlns:a16="http://schemas.microsoft.com/office/drawing/2014/main" id="{C511F172-3321-4CFA-B0D3-2C10B594CC4A}"/>
                 </a:ext>
               </a:extLst>
             </p:cNvPr>
@@ -27278,7 +27273,7 @@
             <p:cNvPr id="58384" name="Picture 16" descr="Database01">
               <a:extLst>
                 <a:ext uri="{FF2B5EF4-FFF2-40B4-BE49-F238E27FC236}">
-                  <a16:creationId xmlns:a16="http://schemas.microsoft.com/office/drawing/2014/main" xmlns="" id="{8D67DF41-D277-4489-92CD-A3F046DB6EEA}"/>
+                  <a16:creationId xmlns:a16="http://schemas.microsoft.com/office/drawing/2014/main" id="{8D67DF41-D277-4489-92CD-A3F046DB6EEA}"/>
                 </a:ext>
               </a:extLst>
             </p:cNvPr>
@@ -27325,7 +27320,7 @@
             <p:cNvPr id="58385" name="Picture 17" descr="Documen_Writing01">
               <a:extLst>
                 <a:ext uri="{FF2B5EF4-FFF2-40B4-BE49-F238E27FC236}">
-                  <a16:creationId xmlns:a16="http://schemas.microsoft.com/office/drawing/2014/main" xmlns="" id="{7F78F7C3-72AD-42B4-8939-5BD6BF64D27E}"/>
+                  <a16:creationId xmlns:a16="http://schemas.microsoft.com/office/drawing/2014/main" id="{7F78F7C3-72AD-42B4-8939-5BD6BF64D27E}"/>
                 </a:ext>
               </a:extLst>
             </p:cNvPr>
@@ -27373,7 +27368,7 @@
           <p:cNvPr id="58386" name="Group 18">
             <a:extLst>
               <a:ext uri="{FF2B5EF4-FFF2-40B4-BE49-F238E27FC236}">
-                <a16:creationId xmlns:a16="http://schemas.microsoft.com/office/drawing/2014/main" xmlns="" id="{7DEE59E2-B9E6-42E7-B9F0-D2EE648F8CB2}"/>
+                <a16:creationId xmlns:a16="http://schemas.microsoft.com/office/drawing/2014/main" id="{7DEE59E2-B9E6-42E7-B9F0-D2EE648F8CB2}"/>
               </a:ext>
             </a:extLst>
           </p:cNvPr>
@@ -27395,7 +27390,7 @@
             <p:cNvPr id="58387" name="AutoShape 19">
               <a:extLst>
                 <a:ext uri="{FF2B5EF4-FFF2-40B4-BE49-F238E27FC236}">
-                  <a16:creationId xmlns:a16="http://schemas.microsoft.com/office/drawing/2014/main" xmlns="" id="{CD98329B-8601-4EBE-94F4-A0E2B9057980}"/>
+                  <a16:creationId xmlns:a16="http://schemas.microsoft.com/office/drawing/2014/main" id="{CD98329B-8601-4EBE-94F4-A0E2B9057980}"/>
                 </a:ext>
               </a:extLst>
             </p:cNvPr>
@@ -27444,7 +27439,7 @@
             <p:cNvPr id="58388" name="Picture 20" descr="Database01">
               <a:extLst>
                 <a:ext uri="{FF2B5EF4-FFF2-40B4-BE49-F238E27FC236}">
-                  <a16:creationId xmlns:a16="http://schemas.microsoft.com/office/drawing/2014/main" xmlns="" id="{7A5F2C8F-B42C-4CC5-8F63-EEEFF5FC44B0}"/>
+                  <a16:creationId xmlns:a16="http://schemas.microsoft.com/office/drawing/2014/main" id="{7A5F2C8F-B42C-4CC5-8F63-EEEFF5FC44B0}"/>
                 </a:ext>
               </a:extLst>
             </p:cNvPr>
@@ -27491,7 +27486,7 @@
             <p:cNvPr id="58389" name="Picture 21" descr="Documen_Writing01">
               <a:extLst>
                 <a:ext uri="{FF2B5EF4-FFF2-40B4-BE49-F238E27FC236}">
-                  <a16:creationId xmlns:a16="http://schemas.microsoft.com/office/drawing/2014/main" xmlns="" id="{64CD96EF-98E3-4692-9EF5-0B1C17EDBEA4}"/>
+                  <a16:creationId xmlns:a16="http://schemas.microsoft.com/office/drawing/2014/main" id="{64CD96EF-98E3-4692-9EF5-0B1C17EDBEA4}"/>
                 </a:ext>
               </a:extLst>
             </p:cNvPr>
@@ -27539,7 +27534,7 @@
           <p:cNvPr id="58390" name="Group 22">
             <a:extLst>
               <a:ext uri="{FF2B5EF4-FFF2-40B4-BE49-F238E27FC236}">
-                <a16:creationId xmlns:a16="http://schemas.microsoft.com/office/drawing/2014/main" xmlns="" id="{1FAF5329-F703-4465-A196-8ED7C877D352}"/>
+                <a16:creationId xmlns:a16="http://schemas.microsoft.com/office/drawing/2014/main" id="{1FAF5329-F703-4465-A196-8ED7C877D352}"/>
               </a:ext>
             </a:extLst>
           </p:cNvPr>
@@ -27561,7 +27556,7 @@
             <p:cNvPr id="58391" name="AutoShape 23">
               <a:extLst>
                 <a:ext uri="{FF2B5EF4-FFF2-40B4-BE49-F238E27FC236}">
-                  <a16:creationId xmlns:a16="http://schemas.microsoft.com/office/drawing/2014/main" xmlns="" id="{42C0A83B-1670-43E9-8113-E1EEC3A9CF8D}"/>
+                  <a16:creationId xmlns:a16="http://schemas.microsoft.com/office/drawing/2014/main" id="{42C0A83B-1670-43E9-8113-E1EEC3A9CF8D}"/>
                 </a:ext>
               </a:extLst>
             </p:cNvPr>
@@ -27610,7 +27605,7 @@
             <p:cNvPr id="58392" name="Picture 24" descr="Database01">
               <a:extLst>
                 <a:ext uri="{FF2B5EF4-FFF2-40B4-BE49-F238E27FC236}">
-                  <a16:creationId xmlns:a16="http://schemas.microsoft.com/office/drawing/2014/main" xmlns="" id="{737856A6-629A-4D34-BF00-0BF592283B5C}"/>
+                  <a16:creationId xmlns:a16="http://schemas.microsoft.com/office/drawing/2014/main" id="{737856A6-629A-4D34-BF00-0BF592283B5C}"/>
                 </a:ext>
               </a:extLst>
             </p:cNvPr>
@@ -27657,7 +27652,7 @@
             <p:cNvPr id="58393" name="Picture 25" descr="Documen_Writing01">
               <a:extLst>
                 <a:ext uri="{FF2B5EF4-FFF2-40B4-BE49-F238E27FC236}">
-                  <a16:creationId xmlns:a16="http://schemas.microsoft.com/office/drawing/2014/main" xmlns="" id="{1BDB4A7D-F5ED-4F0C-82B5-130E14B924C5}"/>
+                  <a16:creationId xmlns:a16="http://schemas.microsoft.com/office/drawing/2014/main" id="{1BDB4A7D-F5ED-4F0C-82B5-130E14B924C5}"/>
                 </a:ext>
               </a:extLst>
             </p:cNvPr>
@@ -27705,7 +27700,7 @@
           <p:cNvPr id="58394" name="Group 26">
             <a:extLst>
               <a:ext uri="{FF2B5EF4-FFF2-40B4-BE49-F238E27FC236}">
-                <a16:creationId xmlns:a16="http://schemas.microsoft.com/office/drawing/2014/main" xmlns="" id="{0568332D-6092-403B-87E4-98A8E61165BC}"/>
+                <a16:creationId xmlns:a16="http://schemas.microsoft.com/office/drawing/2014/main" id="{0568332D-6092-403B-87E4-98A8E61165BC}"/>
               </a:ext>
             </a:extLst>
           </p:cNvPr>
@@ -27727,7 +27722,7 @@
             <p:cNvPr id="58395" name="Line 27">
               <a:extLst>
                 <a:ext uri="{FF2B5EF4-FFF2-40B4-BE49-F238E27FC236}">
-                  <a16:creationId xmlns:a16="http://schemas.microsoft.com/office/drawing/2014/main" xmlns="" id="{96B7822E-8A0E-4DCC-B058-9452A1F53BB0}"/>
+                  <a16:creationId xmlns:a16="http://schemas.microsoft.com/office/drawing/2014/main" id="{96B7822E-8A0E-4DCC-B058-9452A1F53BB0}"/>
                 </a:ext>
               </a:extLst>
             </p:cNvPr>
@@ -27784,7 +27779,7 @@
             <p:cNvPr id="58396" name="AutoShape 28">
               <a:extLst>
                 <a:ext uri="{FF2B5EF4-FFF2-40B4-BE49-F238E27FC236}">
-                  <a16:creationId xmlns:a16="http://schemas.microsoft.com/office/drawing/2014/main" xmlns="" id="{498B0FBE-5AEF-4277-9E14-4E16B642114E}"/>
+                  <a16:creationId xmlns:a16="http://schemas.microsoft.com/office/drawing/2014/main" id="{498B0FBE-5AEF-4277-9E14-4E16B642114E}"/>
                 </a:ext>
               </a:extLst>
             </p:cNvPr>
@@ -27851,7 +27846,7 @@
           <p:cNvPr id="58397" name="Picture 29" descr="Database01">
             <a:extLst>
               <a:ext uri="{FF2B5EF4-FFF2-40B4-BE49-F238E27FC236}">
-                <a16:creationId xmlns:a16="http://schemas.microsoft.com/office/drawing/2014/main" xmlns="" id="{087ACF69-29F9-4745-98E1-4CA836F143F0}"/>
+                <a16:creationId xmlns:a16="http://schemas.microsoft.com/office/drawing/2014/main" id="{087ACF69-29F9-4745-98E1-4CA836F143F0}"/>
               </a:ext>
             </a:extLst>
           </p:cNvPr>
@@ -27898,7 +27893,7 @@
           <p:cNvPr id="58398" name="AutoShape 30">
             <a:extLst>
               <a:ext uri="{FF2B5EF4-FFF2-40B4-BE49-F238E27FC236}">
-                <a16:creationId xmlns:a16="http://schemas.microsoft.com/office/drawing/2014/main" xmlns="" id="{232C51FB-4790-4622-9D15-F8665D6F6BE7}"/>
+                <a16:creationId xmlns:a16="http://schemas.microsoft.com/office/drawing/2014/main" id="{232C51FB-4790-4622-9D15-F8665D6F6BE7}"/>
               </a:ext>
             </a:extLst>
           </p:cNvPr>
@@ -27965,7 +27960,7 @@
           <p:cNvPr id="58399" name="Text Box 31">
             <a:extLst>
               <a:ext uri="{FF2B5EF4-FFF2-40B4-BE49-F238E27FC236}">
-                <a16:creationId xmlns:a16="http://schemas.microsoft.com/office/drawing/2014/main" xmlns="" id="{8FB0A29A-DF4D-4534-B21A-26665D33E608}"/>
+                <a16:creationId xmlns:a16="http://schemas.microsoft.com/office/drawing/2014/main" id="{8FB0A29A-DF4D-4534-B21A-26665D33E608}"/>
               </a:ext>
             </a:extLst>
           </p:cNvPr>
@@ -28046,7 +28041,7 @@
           <p:cNvPr id="58400" name="Group 32">
             <a:extLst>
               <a:ext uri="{FF2B5EF4-FFF2-40B4-BE49-F238E27FC236}">
-                <a16:creationId xmlns:a16="http://schemas.microsoft.com/office/drawing/2014/main" xmlns="" id="{A2852F33-431B-4941-9DCB-287C89511BFD}"/>
+                <a16:creationId xmlns:a16="http://schemas.microsoft.com/office/drawing/2014/main" id="{A2852F33-431B-4941-9DCB-287C89511BFD}"/>
               </a:ext>
             </a:extLst>
           </p:cNvPr>
@@ -28068,7 +28063,7 @@
             <p:cNvPr id="58401" name="AutoShape 33">
               <a:extLst>
                 <a:ext uri="{FF2B5EF4-FFF2-40B4-BE49-F238E27FC236}">
-                  <a16:creationId xmlns:a16="http://schemas.microsoft.com/office/drawing/2014/main" xmlns="" id="{2C3CB7C8-AA2A-4063-89CB-7CCF942A342A}"/>
+                  <a16:creationId xmlns:a16="http://schemas.microsoft.com/office/drawing/2014/main" id="{2C3CB7C8-AA2A-4063-89CB-7CCF942A342A}"/>
                 </a:ext>
               </a:extLst>
             </p:cNvPr>
@@ -28117,7 +28112,7 @@
             <p:cNvPr id="58402" name="Picture 34" descr="Database01">
               <a:extLst>
                 <a:ext uri="{FF2B5EF4-FFF2-40B4-BE49-F238E27FC236}">
-                  <a16:creationId xmlns:a16="http://schemas.microsoft.com/office/drawing/2014/main" xmlns="" id="{0BB44092-6178-4C17-9823-E7534EBD0402}"/>
+                  <a16:creationId xmlns:a16="http://schemas.microsoft.com/office/drawing/2014/main" id="{0BB44092-6178-4C17-9823-E7534EBD0402}"/>
                 </a:ext>
               </a:extLst>
             </p:cNvPr>
@@ -28164,7 +28159,7 @@
             <p:cNvPr id="58403" name="Picture 35" descr="Documen_Writing01">
               <a:extLst>
                 <a:ext uri="{FF2B5EF4-FFF2-40B4-BE49-F238E27FC236}">
-                  <a16:creationId xmlns:a16="http://schemas.microsoft.com/office/drawing/2014/main" xmlns="" id="{B62FDF9B-6850-48E4-A051-6E4BDE38EB9D}"/>
+                  <a16:creationId xmlns:a16="http://schemas.microsoft.com/office/drawing/2014/main" id="{B62FDF9B-6850-48E4-A051-6E4BDE38EB9D}"/>
                 </a:ext>
               </a:extLst>
             </p:cNvPr>
@@ -28212,7 +28207,7 @@
           <p:cNvPr id="58404" name="Freeform 36">
             <a:extLst>
               <a:ext uri="{FF2B5EF4-FFF2-40B4-BE49-F238E27FC236}">
-                <a16:creationId xmlns:a16="http://schemas.microsoft.com/office/drawing/2014/main" xmlns="" id="{2F275126-28D0-4E05-A94E-4F52F5DE7139}"/>
+                <a16:creationId xmlns:a16="http://schemas.microsoft.com/office/drawing/2014/main" id="{2F275126-28D0-4E05-A94E-4F52F5DE7139}"/>
               </a:ext>
             </a:extLst>
           </p:cNvPr>
@@ -28378,7 +28373,7 @@
           <p:cNvPr id="58405" name="AutoShape 37">
             <a:extLst>
               <a:ext uri="{FF2B5EF4-FFF2-40B4-BE49-F238E27FC236}">
-                <a16:creationId xmlns:a16="http://schemas.microsoft.com/office/drawing/2014/main" xmlns="" id="{EF06F175-C6DE-4D7A-B903-276F0AD0AE30}"/>
+                <a16:creationId xmlns:a16="http://schemas.microsoft.com/office/drawing/2014/main" id="{EF06F175-C6DE-4D7A-B903-276F0AD0AE30}"/>
               </a:ext>
             </a:extLst>
           </p:cNvPr>
@@ -28444,7 +28439,7 @@
           <p:cNvPr id="58406" name="Rectangle 38">
             <a:extLst>
               <a:ext uri="{FF2B5EF4-FFF2-40B4-BE49-F238E27FC236}">
-                <a16:creationId xmlns:a16="http://schemas.microsoft.com/office/drawing/2014/main" xmlns="" id="{67F15954-919F-44B8-A7E9-AC59F1A00E8E}"/>
+                <a16:creationId xmlns:a16="http://schemas.microsoft.com/office/drawing/2014/main" id="{67F15954-919F-44B8-A7E9-AC59F1A00E8E}"/>
               </a:ext>
             </a:extLst>
           </p:cNvPr>
@@ -28521,7 +28516,7 @@
           <p:cNvPr id="58407" name="Picture 39" descr="Documen_Writing01">
             <a:extLst>
               <a:ext uri="{FF2B5EF4-FFF2-40B4-BE49-F238E27FC236}">
-                <a16:creationId xmlns:a16="http://schemas.microsoft.com/office/drawing/2014/main" xmlns="" id="{6B402A0C-9A56-45D6-8027-9F3BF501803F}"/>
+                <a16:creationId xmlns:a16="http://schemas.microsoft.com/office/drawing/2014/main" id="{6B402A0C-9A56-45D6-8027-9F3BF501803F}"/>
               </a:ext>
             </a:extLst>
           </p:cNvPr>
@@ -28857,7 +28852,7 @@
           <p:cNvPr id="60418" name="Rectangle 2">
             <a:extLst>
               <a:ext uri="{FF2B5EF4-FFF2-40B4-BE49-F238E27FC236}">
-                <a16:creationId xmlns:a16="http://schemas.microsoft.com/office/drawing/2014/main" xmlns="" id="{73E54AF2-5BAB-4B8C-AE67-38EB58401D6A}"/>
+                <a16:creationId xmlns:a16="http://schemas.microsoft.com/office/drawing/2014/main" id="{73E54AF2-5BAB-4B8C-AE67-38EB58401D6A}"/>
               </a:ext>
             </a:extLst>
           </p:cNvPr>
@@ -28885,7 +28880,7 @@
           <p:cNvPr id="60419" name="Rectangle 3">
             <a:extLst>
               <a:ext uri="{FF2B5EF4-FFF2-40B4-BE49-F238E27FC236}">
-                <a16:creationId xmlns:a16="http://schemas.microsoft.com/office/drawing/2014/main" xmlns="" id="{B867F747-2C55-4C4F-895D-19818FED3659}"/>
+                <a16:creationId xmlns:a16="http://schemas.microsoft.com/office/drawing/2014/main" id="{B867F747-2C55-4C4F-895D-19818FED3659}"/>
               </a:ext>
             </a:extLst>
           </p:cNvPr>
@@ -29717,7 +29712,7 @@
           <p:cNvPr id="13314" name="Rectangle 2">
             <a:extLst>
               <a:ext uri="{FF2B5EF4-FFF2-40B4-BE49-F238E27FC236}">
-                <a16:creationId xmlns:a16="http://schemas.microsoft.com/office/drawing/2014/main" xmlns="" id="{3B995DA1-D906-4606-AAF8-8623E4110463}"/>
+                <a16:creationId xmlns:a16="http://schemas.microsoft.com/office/drawing/2014/main" id="{3B995DA1-D906-4606-AAF8-8623E4110463}"/>
               </a:ext>
             </a:extLst>
           </p:cNvPr>
@@ -29749,7 +29744,7 @@
           <p:cNvPr id="13341" name="AutoShape 29">
             <a:extLst>
               <a:ext uri="{FF2B5EF4-FFF2-40B4-BE49-F238E27FC236}">
-                <a16:creationId xmlns:a16="http://schemas.microsoft.com/office/drawing/2014/main" xmlns="" id="{4F780E0E-DB8B-422F-8652-BAF4DB135AE1}"/>
+                <a16:creationId xmlns:a16="http://schemas.microsoft.com/office/drawing/2014/main" id="{4F780E0E-DB8B-422F-8652-BAF4DB135AE1}"/>
               </a:ext>
             </a:extLst>
           </p:cNvPr>
@@ -29808,7 +29803,7 @@
           <p:cNvPr id="13342" name="Text Box 30">
             <a:extLst>
               <a:ext uri="{FF2B5EF4-FFF2-40B4-BE49-F238E27FC236}">
-                <a16:creationId xmlns:a16="http://schemas.microsoft.com/office/drawing/2014/main" xmlns="" id="{50C685D1-1EEC-4D27-84A5-CECA41A31438}"/>
+                <a16:creationId xmlns:a16="http://schemas.microsoft.com/office/drawing/2014/main" id="{50C685D1-1EEC-4D27-84A5-CECA41A31438}"/>
               </a:ext>
             </a:extLst>
           </p:cNvPr>
@@ -29887,7 +29882,7 @@
           <p:cNvPr id="13343" name="AutoShape 31">
             <a:extLst>
               <a:ext uri="{FF2B5EF4-FFF2-40B4-BE49-F238E27FC236}">
-                <a16:creationId xmlns:a16="http://schemas.microsoft.com/office/drawing/2014/main" xmlns="" id="{627A22BB-D5B0-4806-8730-F6FBCD2E417F}"/>
+                <a16:creationId xmlns:a16="http://schemas.microsoft.com/office/drawing/2014/main" id="{627A22BB-D5B0-4806-8730-F6FBCD2E417F}"/>
               </a:ext>
             </a:extLst>
           </p:cNvPr>
@@ -29945,7 +29940,7 @@
           <p:cNvPr id="13344" name="AutoShape 32">
             <a:extLst>
               <a:ext uri="{FF2B5EF4-FFF2-40B4-BE49-F238E27FC236}">
-                <a16:creationId xmlns:a16="http://schemas.microsoft.com/office/drawing/2014/main" xmlns="" id="{00E10569-7F56-404F-9B0D-79978656BE88}"/>
+                <a16:creationId xmlns:a16="http://schemas.microsoft.com/office/drawing/2014/main" id="{00E10569-7F56-404F-9B0D-79978656BE88}"/>
               </a:ext>
             </a:extLst>
           </p:cNvPr>
@@ -30003,7 +29998,7 @@
           <p:cNvPr id="13345" name="AutoShape 33">
             <a:extLst>
               <a:ext uri="{FF2B5EF4-FFF2-40B4-BE49-F238E27FC236}">
-                <a16:creationId xmlns:a16="http://schemas.microsoft.com/office/drawing/2014/main" xmlns="" id="{6373A169-B270-43C4-960C-9F8C53973A9C}"/>
+                <a16:creationId xmlns:a16="http://schemas.microsoft.com/office/drawing/2014/main" id="{6373A169-B270-43C4-960C-9F8C53973A9C}"/>
               </a:ext>
             </a:extLst>
           </p:cNvPr>
@@ -30062,7 +30057,7 @@
           <p:cNvPr id="13346" name="Text Box 34">
             <a:extLst>
               <a:ext uri="{FF2B5EF4-FFF2-40B4-BE49-F238E27FC236}">
-                <a16:creationId xmlns:a16="http://schemas.microsoft.com/office/drawing/2014/main" xmlns="" id="{C7EEB622-D023-49E4-AE30-67910846EB16}"/>
+                <a16:creationId xmlns:a16="http://schemas.microsoft.com/office/drawing/2014/main" id="{C7EEB622-D023-49E4-AE30-67910846EB16}"/>
               </a:ext>
             </a:extLst>
           </p:cNvPr>
@@ -30141,7 +30136,7 @@
           <p:cNvPr id="13347" name="AutoShape 35">
             <a:extLst>
               <a:ext uri="{FF2B5EF4-FFF2-40B4-BE49-F238E27FC236}">
-                <a16:creationId xmlns:a16="http://schemas.microsoft.com/office/drawing/2014/main" xmlns="" id="{C3961D62-3A2A-4DF6-9131-4E87013D93B1}"/>
+                <a16:creationId xmlns:a16="http://schemas.microsoft.com/office/drawing/2014/main" id="{C3961D62-3A2A-4DF6-9131-4E87013D93B1}"/>
               </a:ext>
             </a:extLst>
           </p:cNvPr>
@@ -30214,7 +30209,7 @@
           <p:cNvPr id="13348" name="AutoShape 36">
             <a:extLst>
               <a:ext uri="{FF2B5EF4-FFF2-40B4-BE49-F238E27FC236}">
-                <a16:creationId xmlns:a16="http://schemas.microsoft.com/office/drawing/2014/main" xmlns="" id="{A925F910-3ED3-471E-8FBF-6315662C23AA}"/>
+                <a16:creationId xmlns:a16="http://schemas.microsoft.com/office/drawing/2014/main" id="{A925F910-3ED3-471E-8FBF-6315662C23AA}"/>
               </a:ext>
             </a:extLst>
           </p:cNvPr>
@@ -30279,7 +30274,7 @@
           <p:cNvPr id="13349" name="Picture 37" descr="Internet01">
             <a:extLst>
               <a:ext uri="{FF2B5EF4-FFF2-40B4-BE49-F238E27FC236}">
-                <a16:creationId xmlns:a16="http://schemas.microsoft.com/office/drawing/2014/main" xmlns="" id="{579CEC2A-0057-4EC4-99C4-B54FC65A97D4}"/>
+                <a16:creationId xmlns:a16="http://schemas.microsoft.com/office/drawing/2014/main" id="{579CEC2A-0057-4EC4-99C4-B54FC65A97D4}"/>
               </a:ext>
             </a:extLst>
           </p:cNvPr>
@@ -30326,7 +30321,7 @@
           <p:cNvPr id="13350" name="AutoShape 38">
             <a:extLst>
               <a:ext uri="{FF2B5EF4-FFF2-40B4-BE49-F238E27FC236}">
-                <a16:creationId xmlns:a16="http://schemas.microsoft.com/office/drawing/2014/main" xmlns="" id="{04F294CE-3A38-408E-8296-ADD4F5C479C8}"/>
+                <a16:creationId xmlns:a16="http://schemas.microsoft.com/office/drawing/2014/main" id="{04F294CE-3A38-408E-8296-ADD4F5C479C8}"/>
               </a:ext>
             </a:extLst>
           </p:cNvPr>
@@ -30391,7 +30386,7 @@
           <p:cNvPr id="13351" name="AutoShape 39">
             <a:extLst>
               <a:ext uri="{FF2B5EF4-FFF2-40B4-BE49-F238E27FC236}">
-                <a16:creationId xmlns:a16="http://schemas.microsoft.com/office/drawing/2014/main" xmlns="" id="{A5A4E896-F3BD-48C8-8D57-79B2CC9F85B0}"/>
+                <a16:creationId xmlns:a16="http://schemas.microsoft.com/office/drawing/2014/main" id="{A5A4E896-F3BD-48C8-8D57-79B2CC9F85B0}"/>
               </a:ext>
             </a:extLst>
           </p:cNvPr>
@@ -30441,7 +30436,7 @@
           <p:cNvPr id="13352" name="AutoShape 40">
             <a:extLst>
               <a:ext uri="{FF2B5EF4-FFF2-40B4-BE49-F238E27FC236}">
-                <a16:creationId xmlns:a16="http://schemas.microsoft.com/office/drawing/2014/main" xmlns="" id="{A0A58D44-7C0D-4BE9-8BDB-D5B7A687AD2C}"/>
+                <a16:creationId xmlns:a16="http://schemas.microsoft.com/office/drawing/2014/main" id="{A0A58D44-7C0D-4BE9-8BDB-D5B7A687AD2C}"/>
               </a:ext>
             </a:extLst>
           </p:cNvPr>
@@ -30491,7 +30486,7 @@
           <p:cNvPr id="13353" name="Picture 41" descr="Database01">
             <a:extLst>
               <a:ext uri="{FF2B5EF4-FFF2-40B4-BE49-F238E27FC236}">
-                <a16:creationId xmlns:a16="http://schemas.microsoft.com/office/drawing/2014/main" xmlns="" id="{0BCA7529-E533-4EC4-8C8F-E091A605BB0A}"/>
+                <a16:creationId xmlns:a16="http://schemas.microsoft.com/office/drawing/2014/main" id="{0BCA7529-E533-4EC4-8C8F-E091A605BB0A}"/>
               </a:ext>
             </a:extLst>
           </p:cNvPr>
@@ -30538,7 +30533,7 @@
           <p:cNvPr id="13354" name="Text Box 42">
             <a:extLst>
               <a:ext uri="{FF2B5EF4-FFF2-40B4-BE49-F238E27FC236}">
-                <a16:creationId xmlns:a16="http://schemas.microsoft.com/office/drawing/2014/main" xmlns="" id="{B7C14172-C6AC-4A9E-8BE9-3ED628A53B9D}"/>
+                <a16:creationId xmlns:a16="http://schemas.microsoft.com/office/drawing/2014/main" id="{B7C14172-C6AC-4A9E-8BE9-3ED628A53B9D}"/>
               </a:ext>
             </a:extLst>
           </p:cNvPr>
@@ -30620,7 +30615,7 @@
           <p:cNvPr id="13355" name="AutoShape 43">
             <a:extLst>
               <a:ext uri="{FF2B5EF4-FFF2-40B4-BE49-F238E27FC236}">
-                <a16:creationId xmlns:a16="http://schemas.microsoft.com/office/drawing/2014/main" xmlns="" id="{8A0FC0DC-70AF-44EE-9CF9-54791C0B1914}"/>
+                <a16:creationId xmlns:a16="http://schemas.microsoft.com/office/drawing/2014/main" id="{8A0FC0DC-70AF-44EE-9CF9-54791C0B1914}"/>
               </a:ext>
             </a:extLst>
           </p:cNvPr>
@@ -30670,7 +30665,7 @@
           <p:cNvPr id="13356" name="Line 44">
             <a:extLst>
               <a:ext uri="{FF2B5EF4-FFF2-40B4-BE49-F238E27FC236}">
-                <a16:creationId xmlns:a16="http://schemas.microsoft.com/office/drawing/2014/main" xmlns="" id="{A7218239-473C-40E6-A664-3A8F4D43375E}"/>
+                <a16:creationId xmlns:a16="http://schemas.microsoft.com/office/drawing/2014/main" id="{A7218239-473C-40E6-A664-3A8F4D43375E}"/>
               </a:ext>
             </a:extLst>
           </p:cNvPr>
@@ -30727,7 +30722,7 @@
           <p:cNvPr id="13357" name="AutoShape 45">
             <a:extLst>
               <a:ext uri="{FF2B5EF4-FFF2-40B4-BE49-F238E27FC236}">
-                <a16:creationId xmlns:a16="http://schemas.microsoft.com/office/drawing/2014/main" xmlns="" id="{A8CD9BE8-97C5-48A7-AB30-9AD1E04B3FB9}"/>
+                <a16:creationId xmlns:a16="http://schemas.microsoft.com/office/drawing/2014/main" id="{A8CD9BE8-97C5-48A7-AB30-9AD1E04B3FB9}"/>
               </a:ext>
             </a:extLst>
           </p:cNvPr>
@@ -30800,7 +30795,7 @@
           <p:cNvPr id="13358" name="AutoShape 46">
             <a:extLst>
               <a:ext uri="{FF2B5EF4-FFF2-40B4-BE49-F238E27FC236}">
-                <a16:creationId xmlns:a16="http://schemas.microsoft.com/office/drawing/2014/main" xmlns="" id="{92C55B66-A464-42EC-BC1C-636A7BD3BA6D}"/>
+                <a16:creationId xmlns:a16="http://schemas.microsoft.com/office/drawing/2014/main" id="{92C55B66-A464-42EC-BC1C-636A7BD3BA6D}"/>
               </a:ext>
             </a:extLst>
           </p:cNvPr>
@@ -30865,7 +30860,7 @@
           <p:cNvPr id="13359" name="AutoShape 47">
             <a:extLst>
               <a:ext uri="{FF2B5EF4-FFF2-40B4-BE49-F238E27FC236}">
-                <a16:creationId xmlns:a16="http://schemas.microsoft.com/office/drawing/2014/main" xmlns="" id="{2C08B323-2419-4290-992D-C981B0245D30}"/>
+                <a16:creationId xmlns:a16="http://schemas.microsoft.com/office/drawing/2014/main" id="{2C08B323-2419-4290-992D-C981B0245D30}"/>
               </a:ext>
             </a:extLst>
           </p:cNvPr>
@@ -30915,7 +30910,7 @@
           <p:cNvPr id="13360" name="Line 48">
             <a:extLst>
               <a:ext uri="{FF2B5EF4-FFF2-40B4-BE49-F238E27FC236}">
-                <a16:creationId xmlns:a16="http://schemas.microsoft.com/office/drawing/2014/main" xmlns="" id="{BF7E717B-5BA1-4CD7-A7B1-8F5CC5A25B85}"/>
+                <a16:creationId xmlns:a16="http://schemas.microsoft.com/office/drawing/2014/main" id="{BF7E717B-5BA1-4CD7-A7B1-8F5CC5A25B85}"/>
               </a:ext>
             </a:extLst>
           </p:cNvPr>
@@ -30972,7 +30967,7 @@
           <p:cNvPr id="13361" name="AutoShape 49">
             <a:extLst>
               <a:ext uri="{FF2B5EF4-FFF2-40B4-BE49-F238E27FC236}">
-                <a16:creationId xmlns:a16="http://schemas.microsoft.com/office/drawing/2014/main" xmlns="" id="{A93A94C6-E477-49BA-BEE3-F3DABF8C337C}"/>
+                <a16:creationId xmlns:a16="http://schemas.microsoft.com/office/drawing/2014/main" id="{A93A94C6-E477-49BA-BEE3-F3DABF8C337C}"/>
               </a:ext>
             </a:extLst>
           </p:cNvPr>
@@ -31022,7 +31017,7 @@
           <p:cNvPr id="13362" name="AutoShape 50">
             <a:extLst>
               <a:ext uri="{FF2B5EF4-FFF2-40B4-BE49-F238E27FC236}">
-                <a16:creationId xmlns:a16="http://schemas.microsoft.com/office/drawing/2014/main" xmlns="" id="{CEF50439-982B-4651-BD1D-0F35805A4020}"/>
+                <a16:creationId xmlns:a16="http://schemas.microsoft.com/office/drawing/2014/main" id="{CEF50439-982B-4651-BD1D-0F35805A4020}"/>
               </a:ext>
             </a:extLst>
           </p:cNvPr>
@@ -31087,7 +31082,7 @@
           <p:cNvPr id="13363" name="Line 51">
             <a:extLst>
               <a:ext uri="{FF2B5EF4-FFF2-40B4-BE49-F238E27FC236}">
-                <a16:creationId xmlns:a16="http://schemas.microsoft.com/office/drawing/2014/main" xmlns="" id="{3021BDA0-6B50-476E-9449-821DB953B0FB}"/>
+                <a16:creationId xmlns:a16="http://schemas.microsoft.com/office/drawing/2014/main" id="{3021BDA0-6B50-476E-9449-821DB953B0FB}"/>
               </a:ext>
             </a:extLst>
           </p:cNvPr>
@@ -31144,7 +31139,7 @@
           <p:cNvPr id="13364" name="Line 52">
             <a:extLst>
               <a:ext uri="{FF2B5EF4-FFF2-40B4-BE49-F238E27FC236}">
-                <a16:creationId xmlns:a16="http://schemas.microsoft.com/office/drawing/2014/main" xmlns="" id="{3EC7D1F0-E4D9-43DE-A016-51208CD156FA}"/>
+                <a16:creationId xmlns:a16="http://schemas.microsoft.com/office/drawing/2014/main" id="{3EC7D1F0-E4D9-43DE-A016-51208CD156FA}"/>
               </a:ext>
             </a:extLst>
           </p:cNvPr>
@@ -31201,7 +31196,7 @@
           <p:cNvPr id="13365" name="Line 53">
             <a:extLst>
               <a:ext uri="{FF2B5EF4-FFF2-40B4-BE49-F238E27FC236}">
-                <a16:creationId xmlns:a16="http://schemas.microsoft.com/office/drawing/2014/main" xmlns="" id="{797715AF-27CD-4BA4-A4F8-7AA7AFC32F73}"/>
+                <a16:creationId xmlns:a16="http://schemas.microsoft.com/office/drawing/2014/main" id="{797715AF-27CD-4BA4-A4F8-7AA7AFC32F73}"/>
               </a:ext>
             </a:extLst>
           </p:cNvPr>
@@ -31288,7 +31283,7 @@
           <p:cNvPr id="14338" name="Rectangle 2">
             <a:extLst>
               <a:ext uri="{FF2B5EF4-FFF2-40B4-BE49-F238E27FC236}">
-                <a16:creationId xmlns:a16="http://schemas.microsoft.com/office/drawing/2014/main" xmlns="" id="{894E7CD4-5BFE-4ABC-9561-97676A43F9D8}"/>
+                <a16:creationId xmlns:a16="http://schemas.microsoft.com/office/drawing/2014/main" id="{894E7CD4-5BFE-4ABC-9561-97676A43F9D8}"/>
               </a:ext>
             </a:extLst>
           </p:cNvPr>
@@ -31316,7 +31311,7 @@
           <p:cNvPr id="14364" name="AutoShape 28">
             <a:extLst>
               <a:ext uri="{FF2B5EF4-FFF2-40B4-BE49-F238E27FC236}">
-                <a16:creationId xmlns:a16="http://schemas.microsoft.com/office/drawing/2014/main" xmlns="" id="{BCFE8587-07E2-45DD-97EA-E2756C4AB89C}"/>
+                <a16:creationId xmlns:a16="http://schemas.microsoft.com/office/drawing/2014/main" id="{BCFE8587-07E2-45DD-97EA-E2756C4AB89C}"/>
               </a:ext>
             </a:extLst>
           </p:cNvPr>
@@ -31374,7 +31369,7 @@
           <p:cNvPr id="14365" name="AutoShape 29">
             <a:extLst>
               <a:ext uri="{FF2B5EF4-FFF2-40B4-BE49-F238E27FC236}">
-                <a16:creationId xmlns:a16="http://schemas.microsoft.com/office/drawing/2014/main" xmlns="" id="{6B0B0CC5-709A-4F1E-9D8A-994DE1D6BAAB}"/>
+                <a16:creationId xmlns:a16="http://schemas.microsoft.com/office/drawing/2014/main" id="{6B0B0CC5-709A-4F1E-9D8A-994DE1D6BAAB}"/>
               </a:ext>
             </a:extLst>
           </p:cNvPr>
@@ -31448,7 +31443,7 @@
           <p:cNvPr id="14366" name="AutoShape 30">
             <a:extLst>
               <a:ext uri="{FF2B5EF4-FFF2-40B4-BE49-F238E27FC236}">
-                <a16:creationId xmlns:a16="http://schemas.microsoft.com/office/drawing/2014/main" xmlns="" id="{45582AF9-8116-46D1-9FB9-D8CA7F0F5FD5}"/>
+                <a16:creationId xmlns:a16="http://schemas.microsoft.com/office/drawing/2014/main" id="{45582AF9-8116-46D1-9FB9-D8CA7F0F5FD5}"/>
               </a:ext>
             </a:extLst>
           </p:cNvPr>
@@ -31507,7 +31502,7 @@
           <p:cNvPr id="14367" name="Text Box 31">
             <a:extLst>
               <a:ext uri="{FF2B5EF4-FFF2-40B4-BE49-F238E27FC236}">
-                <a16:creationId xmlns:a16="http://schemas.microsoft.com/office/drawing/2014/main" xmlns="" id="{B2435516-D691-47C7-8E54-50FB7EBC12D9}"/>
+                <a16:creationId xmlns:a16="http://schemas.microsoft.com/office/drawing/2014/main" id="{B2435516-D691-47C7-8E54-50FB7EBC12D9}"/>
               </a:ext>
             </a:extLst>
           </p:cNvPr>
@@ -31589,7 +31584,7 @@
           <p:cNvPr id="14368" name="Text Box 32">
             <a:extLst>
               <a:ext uri="{FF2B5EF4-FFF2-40B4-BE49-F238E27FC236}">
-                <a16:creationId xmlns:a16="http://schemas.microsoft.com/office/drawing/2014/main" xmlns="" id="{A18FB92B-15DF-4D7D-8574-167AB363A824}"/>
+                <a16:creationId xmlns:a16="http://schemas.microsoft.com/office/drawing/2014/main" id="{A18FB92B-15DF-4D7D-8574-167AB363A824}"/>
               </a:ext>
             </a:extLst>
           </p:cNvPr>
@@ -31671,7 +31666,7 @@
           <p:cNvPr id="14369" name="Picture 33" descr="Server">
             <a:extLst>
               <a:ext uri="{FF2B5EF4-FFF2-40B4-BE49-F238E27FC236}">
-                <a16:creationId xmlns:a16="http://schemas.microsoft.com/office/drawing/2014/main" xmlns="" id="{941B4FAD-F635-4049-8424-4248F3371B27}"/>
+                <a16:creationId xmlns:a16="http://schemas.microsoft.com/office/drawing/2014/main" id="{941B4FAD-F635-4049-8424-4248F3371B27}"/>
               </a:ext>
             </a:extLst>
           </p:cNvPr>
@@ -31718,7 +31713,7 @@
           <p:cNvPr id="14370" name="Text Box 34">
             <a:extLst>
               <a:ext uri="{FF2B5EF4-FFF2-40B4-BE49-F238E27FC236}">
-                <a16:creationId xmlns:a16="http://schemas.microsoft.com/office/drawing/2014/main" xmlns="" id="{4AD706D6-2C09-4A28-BB91-8CCA69946B0B}"/>
+                <a16:creationId xmlns:a16="http://schemas.microsoft.com/office/drawing/2014/main" id="{4AD706D6-2C09-4A28-BB91-8CCA69946B0B}"/>
               </a:ext>
             </a:extLst>
           </p:cNvPr>
@@ -31800,7 +31795,7 @@
           <p:cNvPr id="14371" name="Picture 35" descr="Server">
             <a:extLst>
               <a:ext uri="{FF2B5EF4-FFF2-40B4-BE49-F238E27FC236}">
-                <a16:creationId xmlns:a16="http://schemas.microsoft.com/office/drawing/2014/main" xmlns="" id="{E82060C1-FC86-4E43-9C41-54FEC57884E8}"/>
+                <a16:creationId xmlns:a16="http://schemas.microsoft.com/office/drawing/2014/main" id="{E82060C1-FC86-4E43-9C41-54FEC57884E8}"/>
               </a:ext>
             </a:extLst>
           </p:cNvPr>
@@ -31847,7 +31842,7 @@
           <p:cNvPr id="14372" name="Picture 36" descr="Database01">
             <a:extLst>
               <a:ext uri="{FF2B5EF4-FFF2-40B4-BE49-F238E27FC236}">
-                <a16:creationId xmlns:a16="http://schemas.microsoft.com/office/drawing/2014/main" xmlns="" id="{0901A161-CF98-42E2-B677-934C41298C3C}"/>
+                <a16:creationId xmlns:a16="http://schemas.microsoft.com/office/drawing/2014/main" id="{0901A161-CF98-42E2-B677-934C41298C3C}"/>
               </a:ext>
             </a:extLst>
           </p:cNvPr>
@@ -31894,7 +31889,7 @@
           <p:cNvPr id="14373" name="Text Box 37">
             <a:extLst>
               <a:ext uri="{FF2B5EF4-FFF2-40B4-BE49-F238E27FC236}">
-                <a16:creationId xmlns:a16="http://schemas.microsoft.com/office/drawing/2014/main" xmlns="" id="{2604DDB9-296E-42FD-A6C0-89309597E698}"/>
+                <a16:creationId xmlns:a16="http://schemas.microsoft.com/office/drawing/2014/main" id="{2604DDB9-296E-42FD-A6C0-89309597E698}"/>
               </a:ext>
             </a:extLst>
           </p:cNvPr>
@@ -31976,7 +31971,7 @@
           <p:cNvPr id="14374" name="Picture 38" descr="Server">
             <a:extLst>
               <a:ext uri="{FF2B5EF4-FFF2-40B4-BE49-F238E27FC236}">
-                <a16:creationId xmlns:a16="http://schemas.microsoft.com/office/drawing/2014/main" xmlns="" id="{82397443-82A5-41AA-AE38-A65568D75C79}"/>
+                <a16:creationId xmlns:a16="http://schemas.microsoft.com/office/drawing/2014/main" id="{82397443-82A5-41AA-AE38-A65568D75C79}"/>
               </a:ext>
             </a:extLst>
           </p:cNvPr>
@@ -32023,7 +32018,7 @@
           <p:cNvPr id="14375" name="Text Box 39">
             <a:extLst>
               <a:ext uri="{FF2B5EF4-FFF2-40B4-BE49-F238E27FC236}">
-                <a16:creationId xmlns:a16="http://schemas.microsoft.com/office/drawing/2014/main" xmlns="" id="{F8678CF3-3D73-472B-B313-0E597CCE6CED}"/>
+                <a16:creationId xmlns:a16="http://schemas.microsoft.com/office/drawing/2014/main" id="{F8678CF3-3D73-472B-B313-0E597CCE6CED}"/>
               </a:ext>
             </a:extLst>
           </p:cNvPr>
@@ -32105,7 +32100,7 @@
           <p:cNvPr id="14376" name="AutoShape 40">
             <a:extLst>
               <a:ext uri="{FF2B5EF4-FFF2-40B4-BE49-F238E27FC236}">
-                <a16:creationId xmlns:a16="http://schemas.microsoft.com/office/drawing/2014/main" xmlns="" id="{E715CB8B-49DF-4AB7-8C4A-8A129D1A5424}"/>
+                <a16:creationId xmlns:a16="http://schemas.microsoft.com/office/drawing/2014/main" id="{E715CB8B-49DF-4AB7-8C4A-8A129D1A5424}"/>
               </a:ext>
             </a:extLst>
           </p:cNvPr>
@@ -32178,7 +32173,7 @@
           <p:cNvPr id="14377" name="AutoShape 41">
             <a:extLst>
               <a:ext uri="{FF2B5EF4-FFF2-40B4-BE49-F238E27FC236}">
-                <a16:creationId xmlns:a16="http://schemas.microsoft.com/office/drawing/2014/main" xmlns="" id="{45D199D3-1712-43B5-AD7D-4E2D5036F387}"/>
+                <a16:creationId xmlns:a16="http://schemas.microsoft.com/office/drawing/2014/main" id="{45D199D3-1712-43B5-AD7D-4E2D5036F387}"/>
               </a:ext>
             </a:extLst>
           </p:cNvPr>
@@ -32251,7 +32246,7 @@
           <p:cNvPr id="14378" name="AutoShape 42">
             <a:extLst>
               <a:ext uri="{FF2B5EF4-FFF2-40B4-BE49-F238E27FC236}">
-                <a16:creationId xmlns:a16="http://schemas.microsoft.com/office/drawing/2014/main" xmlns="" id="{C47B3225-EFD3-4E5A-BD47-0CB20CF05031}"/>
+                <a16:creationId xmlns:a16="http://schemas.microsoft.com/office/drawing/2014/main" id="{C47B3225-EFD3-4E5A-BD47-0CB20CF05031}"/>
               </a:ext>
             </a:extLst>
           </p:cNvPr>
@@ -32316,7 +32311,7 @@
           <p:cNvPr id="14379" name="Picture 43" descr="Internet01">
             <a:extLst>
               <a:ext uri="{FF2B5EF4-FFF2-40B4-BE49-F238E27FC236}">
-                <a16:creationId xmlns:a16="http://schemas.microsoft.com/office/drawing/2014/main" xmlns="" id="{62850E51-5899-4F88-8985-9C9A6565B33C}"/>
+                <a16:creationId xmlns:a16="http://schemas.microsoft.com/office/drawing/2014/main" id="{62850E51-5899-4F88-8985-9C9A6565B33C}"/>
               </a:ext>
             </a:extLst>
           </p:cNvPr>
@@ -32363,7 +32358,7 @@
           <p:cNvPr id="14380" name="AutoShape 44">
             <a:extLst>
               <a:ext uri="{FF2B5EF4-FFF2-40B4-BE49-F238E27FC236}">
-                <a16:creationId xmlns:a16="http://schemas.microsoft.com/office/drawing/2014/main" xmlns="" id="{48AC7A39-EE22-4840-86E8-B2E8CED8F9D8}"/>
+                <a16:creationId xmlns:a16="http://schemas.microsoft.com/office/drawing/2014/main" id="{48AC7A39-EE22-4840-86E8-B2E8CED8F9D8}"/>
               </a:ext>
             </a:extLst>
           </p:cNvPr>
@@ -32428,7 +32423,7 @@
           <p:cNvPr id="14381" name="AutoShape 45">
             <a:extLst>
               <a:ext uri="{FF2B5EF4-FFF2-40B4-BE49-F238E27FC236}">
-                <a16:creationId xmlns:a16="http://schemas.microsoft.com/office/drawing/2014/main" xmlns="" id="{E7C6658E-3EA0-43DE-A9F7-1A78F636FE24}"/>
+                <a16:creationId xmlns:a16="http://schemas.microsoft.com/office/drawing/2014/main" id="{E7C6658E-3EA0-43DE-A9F7-1A78F636FE24}"/>
               </a:ext>
             </a:extLst>
           </p:cNvPr>
@@ -32478,7 +32473,7 @@
           <p:cNvPr id="14382" name="AutoShape 46">
             <a:extLst>
               <a:ext uri="{FF2B5EF4-FFF2-40B4-BE49-F238E27FC236}">
-                <a16:creationId xmlns:a16="http://schemas.microsoft.com/office/drawing/2014/main" xmlns="" id="{557FB164-0E50-4714-9617-72984451F023}"/>
+                <a16:creationId xmlns:a16="http://schemas.microsoft.com/office/drawing/2014/main" id="{557FB164-0E50-4714-9617-72984451F023}"/>
               </a:ext>
             </a:extLst>
           </p:cNvPr>
@@ -32528,7 +32523,7 @@
           <p:cNvPr id="14383" name="Line 47">
             <a:extLst>
               <a:ext uri="{FF2B5EF4-FFF2-40B4-BE49-F238E27FC236}">
-                <a16:creationId xmlns:a16="http://schemas.microsoft.com/office/drawing/2014/main" xmlns="" id="{6AE3B4F4-865D-42E6-867A-729BA1D3240C}"/>
+                <a16:creationId xmlns:a16="http://schemas.microsoft.com/office/drawing/2014/main" id="{6AE3B4F4-865D-42E6-867A-729BA1D3240C}"/>
               </a:ext>
             </a:extLst>
           </p:cNvPr>
@@ -32587,7 +32582,7 @@
           <p:cNvPr id="14384" name="AutoShape 48">
             <a:extLst>
               <a:ext uri="{FF2B5EF4-FFF2-40B4-BE49-F238E27FC236}">
-                <a16:creationId xmlns:a16="http://schemas.microsoft.com/office/drawing/2014/main" xmlns="" id="{E174E0EF-448B-42FF-95CE-3391090E6A6F}"/>
+                <a16:creationId xmlns:a16="http://schemas.microsoft.com/office/drawing/2014/main" id="{E174E0EF-448B-42FF-95CE-3391090E6A6F}"/>
               </a:ext>
             </a:extLst>
           </p:cNvPr>
@@ -32639,7 +32634,7 @@
           <p:cNvPr id="14385" name="AutoShape 49">
             <a:extLst>
               <a:ext uri="{FF2B5EF4-FFF2-40B4-BE49-F238E27FC236}">
-                <a16:creationId xmlns:a16="http://schemas.microsoft.com/office/drawing/2014/main" xmlns="" id="{5F854631-69B1-46D1-90F1-B7D39856C992}"/>
+                <a16:creationId xmlns:a16="http://schemas.microsoft.com/office/drawing/2014/main" id="{5F854631-69B1-46D1-90F1-B7D39856C992}"/>
               </a:ext>
             </a:extLst>
           </p:cNvPr>
@@ -32691,7 +32686,7 @@
           <p:cNvPr id="14386" name="Line 50">
             <a:extLst>
               <a:ext uri="{FF2B5EF4-FFF2-40B4-BE49-F238E27FC236}">
-                <a16:creationId xmlns:a16="http://schemas.microsoft.com/office/drawing/2014/main" xmlns="" id="{B510AEA7-0D4F-4BFB-81E8-CFB1FC23794B}"/>
+                <a16:creationId xmlns:a16="http://schemas.microsoft.com/office/drawing/2014/main" id="{B510AEA7-0D4F-4BFB-81E8-CFB1FC23794B}"/>
               </a:ext>
             </a:extLst>
           </p:cNvPr>
@@ -32750,7 +32745,7 @@
           <p:cNvPr id="14387" name="Line 51">
             <a:extLst>
               <a:ext uri="{FF2B5EF4-FFF2-40B4-BE49-F238E27FC236}">
-                <a16:creationId xmlns:a16="http://schemas.microsoft.com/office/drawing/2014/main" xmlns="" id="{40C58DFE-4618-46DA-8503-BA5D89989B51}"/>
+                <a16:creationId xmlns:a16="http://schemas.microsoft.com/office/drawing/2014/main" id="{40C58DFE-4618-46DA-8503-BA5D89989B51}"/>
               </a:ext>
             </a:extLst>
           </p:cNvPr>
@@ -32839,7 +32834,7 @@
           <p:cNvPr id="2" name="Title 1">
             <a:extLst>
               <a:ext uri="{FF2B5EF4-FFF2-40B4-BE49-F238E27FC236}">
-                <a16:creationId xmlns:a16="http://schemas.microsoft.com/office/drawing/2014/main" xmlns="" id="{37DA94C9-E474-4FA3-BD2B-DC432A0C19B8}"/>
+                <a16:creationId xmlns:a16="http://schemas.microsoft.com/office/drawing/2014/main" id="{37DA94C9-E474-4FA3-BD2B-DC432A0C19B8}"/>
               </a:ext>
             </a:extLst>
           </p:cNvPr>
@@ -32867,7 +32862,7 @@
           <p:cNvPr id="6146" name="Picture 2" descr="Image result for sample reports from IT">
             <a:extLst>
               <a:ext uri="{FF2B5EF4-FFF2-40B4-BE49-F238E27FC236}">
-                <a16:creationId xmlns:a16="http://schemas.microsoft.com/office/drawing/2014/main" xmlns="" id="{4C425901-057C-4051-B9D7-21FB1620ACE8}"/>
+                <a16:creationId xmlns:a16="http://schemas.microsoft.com/office/drawing/2014/main" id="{4C425901-057C-4051-B9D7-21FB1620ACE8}"/>
               </a:ext>
             </a:extLst>
           </p:cNvPr>
@@ -32946,7 +32941,7 @@
           <p:cNvPr id="2" name="Title 1">
             <a:extLst>
               <a:ext uri="{FF2B5EF4-FFF2-40B4-BE49-F238E27FC236}">
-                <a16:creationId xmlns:a16="http://schemas.microsoft.com/office/drawing/2014/main" xmlns="" id="{60EE7E9F-7947-4AB3-AA26-A68AEADE31C4}"/>
+                <a16:creationId xmlns:a16="http://schemas.microsoft.com/office/drawing/2014/main" id="{60EE7E9F-7947-4AB3-AA26-A68AEADE31C4}"/>
               </a:ext>
             </a:extLst>
           </p:cNvPr>
@@ -32974,7 +32969,7 @@
           <p:cNvPr id="7170" name="Picture 2" descr="Image result for sample reports from cobol">
             <a:extLst>
               <a:ext uri="{FF2B5EF4-FFF2-40B4-BE49-F238E27FC236}">
-                <a16:creationId xmlns:a16="http://schemas.microsoft.com/office/drawing/2014/main" xmlns="" id="{66AE0027-428B-4018-80DC-52D61B3D2079}"/>
+                <a16:creationId xmlns:a16="http://schemas.microsoft.com/office/drawing/2014/main" id="{66AE0027-428B-4018-80DC-52D61B3D2079}"/>
               </a:ext>
             </a:extLst>
           </p:cNvPr>
@@ -33053,7 +33048,7 @@
           <p:cNvPr id="2" name="Title 1">
             <a:extLst>
               <a:ext uri="{FF2B5EF4-FFF2-40B4-BE49-F238E27FC236}">
-                <a16:creationId xmlns:a16="http://schemas.microsoft.com/office/drawing/2014/main" xmlns="" id="{0F87C70E-9621-41EC-A351-9410F7C31373}"/>
+                <a16:creationId xmlns:a16="http://schemas.microsoft.com/office/drawing/2014/main" id="{0F87C70E-9621-41EC-A351-9410F7C31373}"/>
               </a:ext>
             </a:extLst>
           </p:cNvPr>
@@ -33081,7 +33076,7 @@
           <p:cNvPr id="8194" name="Picture 2" descr="Image result for sample reports from IT">
             <a:extLst>
               <a:ext uri="{FF2B5EF4-FFF2-40B4-BE49-F238E27FC236}">
-                <a16:creationId xmlns:a16="http://schemas.microsoft.com/office/drawing/2014/main" xmlns="" id="{E4F0272A-9DFC-4A26-9385-D525A113E707}"/>
+                <a16:creationId xmlns:a16="http://schemas.microsoft.com/office/drawing/2014/main" id="{E4F0272A-9DFC-4A26-9385-D525A113E707}"/>
               </a:ext>
             </a:extLst>
           </p:cNvPr>
@@ -33171,10 +33166,9 @@
           <a:lstStyle/>
           <a:p>
             <a:r>
-              <a:rPr lang="en-CA" dirty="0" smtClean="0"/>
+              <a:rPr lang="en-CA" dirty="0"/>
               <a:t>RPG</a:t>
             </a:r>
-            <a:endParaRPr lang="en-CA" dirty="0"/>
           </a:p>
         </p:txBody>
       </p:sp>
@@ -33194,45 +33188,45 @@
           <a:lstStyle/>
           <a:p>
             <a:r>
-              <a:rPr lang="en-CA" dirty="0" smtClean="0"/>
+              <a:rPr lang="en-CA" dirty="0"/>
               <a:t>RPG is a high-</a:t>
             </a:r>
             <a:r>
-              <a:rPr lang="en-CA" dirty="0" err="1" smtClean="0"/>
+              <a:rPr lang="en-CA" dirty="0" err="1"/>
               <a:t>lvl</a:t>
             </a:r>
             <a:r>
-              <a:rPr lang="en-CA" dirty="0" smtClean="0"/>
+              <a:rPr lang="en-CA" dirty="0"/>
               <a:t> </a:t>
             </a:r>
             <a:r>
-              <a:rPr lang="en-CA" dirty="0" err="1" smtClean="0"/>
+              <a:rPr lang="en-CA" dirty="0" err="1"/>
               <a:t>prog</a:t>
             </a:r>
             <a:r>
-              <a:rPr lang="en-CA" dirty="0" smtClean="0"/>
+              <a:rPr lang="en-CA" dirty="0"/>
               <a:t> </a:t>
             </a:r>
             <a:r>
-              <a:rPr lang="en-CA" dirty="0" err="1" smtClean="0"/>
+              <a:rPr lang="en-CA" dirty="0" err="1"/>
               <a:t>lang</a:t>
             </a:r>
             <a:r>
-              <a:rPr lang="en-CA" dirty="0" smtClean="0"/>
+              <a:rPr lang="en-CA" dirty="0"/>
               <a:t> (HLL) for business apps</a:t>
             </a:r>
           </a:p>
           <a:p>
             <a:r>
-              <a:rPr lang="en-CA" dirty="0" smtClean="0"/>
+              <a:rPr lang="en-CA" dirty="0"/>
               <a:t>Is a IBM proprietary </a:t>
             </a:r>
             <a:r>
-              <a:rPr lang="en-CA" dirty="0" err="1" smtClean="0"/>
+              <a:rPr lang="en-CA" dirty="0" err="1"/>
               <a:t>lang</a:t>
             </a:r>
             <a:r>
-              <a:rPr lang="en-CA" dirty="0" smtClean="0"/>
+              <a:rPr lang="en-CA" dirty="0"/>
               <a:t> avail only on IBM OS/400-based sys</a:t>
             </a:r>
           </a:p>
@@ -33241,7 +33235,7 @@
           </a:p>
           <a:p>
             <a:r>
-              <a:rPr lang="en-CA" dirty="0" smtClean="0"/>
+              <a:rPr lang="en-CA" dirty="0"/>
               <a:t>Dev by IBM in 1959 as the Report Program Generator – tool to replicate punched card processing on IBM 1401</a:t>
             </a:r>
           </a:p>
@@ -33250,10 +33244,9 @@
           </a:p>
           <a:p>
             <a:r>
-              <a:rPr lang="en-CA" dirty="0" smtClean="0"/>
+              <a:rPr lang="en-CA" dirty="0"/>
               <a:t>Updated to PG II for the IBM System/3 in the late 1960s, since evolved into HLL equivalent for COBOL</a:t>
             </a:r>
-            <a:endParaRPr lang="en-CA" dirty="0"/>
           </a:p>
         </p:txBody>
       </p:sp>
@@ -33303,10 +33296,9 @@
           <a:lstStyle/>
           <a:p>
             <a:r>
-              <a:rPr lang="en-CA" dirty="0" smtClean="0"/>
+              <a:rPr lang="en-CA" dirty="0"/>
               <a:t>RPG</a:t>
             </a:r>
-            <a:endParaRPr lang="en-CA" dirty="0"/>
           </a:p>
         </p:txBody>
       </p:sp>
@@ -33326,7 +33318,7 @@
           <a:lstStyle/>
           <a:p>
             <a:r>
-              <a:rPr lang="en-CA" dirty="0" smtClean="0"/>
+              <a:rPr lang="en-CA" dirty="0"/>
               <a:t>Find sample file online, don’t need to know this on the test</a:t>
             </a:r>
           </a:p>
@@ -33381,10 +33373,9 @@
           <a:lstStyle/>
           <a:p>
             <a:r>
-              <a:rPr lang="en-CA" dirty="0" smtClean="0"/>
+              <a:rPr lang="en-CA" dirty="0"/>
               <a:t>RPG…</a:t>
             </a:r>
-            <a:endParaRPr lang="en-CA" dirty="0"/>
           </a:p>
         </p:txBody>
       </p:sp>
@@ -33404,18 +33395,17 @@
           <a:lstStyle/>
           <a:p>
             <a:r>
-              <a:rPr lang="en-CA" dirty="0" smtClean="0"/>
+              <a:rPr lang="en-CA" dirty="0"/>
               <a:t>Cont’d from </a:t>
             </a:r>
             <a:r>
-              <a:rPr lang="en-CA" dirty="0" err="1" smtClean="0"/>
+              <a:rPr lang="en-CA" dirty="0" err="1"/>
               <a:t>prev</a:t>
             </a:r>
             <a:r>
-              <a:rPr lang="en-CA" dirty="0" smtClean="0"/>
+              <a:rPr lang="en-CA" dirty="0"/>
               <a:t> slide, examples of RPG code</a:t>
             </a:r>
-            <a:endParaRPr lang="en-CA" dirty="0"/>
           </a:p>
         </p:txBody>
       </p:sp>
@@ -33721,7 +33711,7 @@
   <a:extraClrSchemeLst/>
   <a:extLst>
     <a:ext uri="{05A4C25C-085E-4340-85A3-A5531E510DB2}">
-      <thm15:themeFamily xmlns:thm15="http://schemas.microsoft.com/office/thememl/2012/main" xmlns="" name="Office Theme" id="{62F939B6-93AF-4DB8-9C6B-D6C7DFDC589F}" vid="{4A3C46E8-61CC-4603-A589-7422A47A8E4A}"/>
+      <thm15:themeFamily xmlns:thm15="http://schemas.microsoft.com/office/thememl/2012/main" name="Office Theme" id="{62F939B6-93AF-4DB8-9C6B-D6C7DFDC589F}" vid="{4A3C46E8-61CC-4603-A589-7422A47A8E4A}"/>
     </a:ext>
   </a:extLst>
 </a:theme>
@@ -34016,7 +34006,7 @@
   <a:extraClrSchemeLst/>
   <a:extLst>
     <a:ext uri="{05A4C25C-085E-4340-85A3-A5531E510DB2}">
-      <thm15:themeFamily xmlns:thm15="http://schemas.microsoft.com/office/thememl/2012/main" xmlns="" name="Office Theme" id="{62F939B6-93AF-4DB8-9C6B-D6C7DFDC589F}" vid="{4A3C46E8-61CC-4603-A589-7422A47A8E4A}"/>
+      <thm15:themeFamily xmlns:thm15="http://schemas.microsoft.com/office/thememl/2012/main" name="Office Theme" id="{62F939B6-93AF-4DB8-9C6B-D6C7DFDC589F}" vid="{4A3C46E8-61CC-4603-A589-7422A47A8E4A}"/>
     </a:ext>
   </a:extLst>
 </a:theme>

</xml_diff>